<commit_message>
Junit5 - extension - conditions
</commit_message>
<xml_diff>
--- a/ZJAVA/Junit5/Junit5 - ZJAVA.pptx
+++ b/ZJAVA/Junit5/Junit5 - ZJAVA.pptx
@@ -14681,7 +14681,195 @@
           <a:bodyPr/>
           <a:lstStyle/>
           <a:p>
-            <a:endParaRPr lang="pl-PL"/>
+            <a:r>
+              <a:rPr lang="pl-PL" sz="2000" dirty="0" err="1"/>
+              <a:t>Extention</a:t>
+            </a:r>
+            <a:r>
+              <a:rPr lang="pl-PL" sz="2000" dirty="0"/>
+              <a:t> </a:t>
+            </a:r>
+            <a:r>
+              <a:rPr lang="pl-PL" sz="2000" dirty="0" err="1"/>
+              <a:t>points</a:t>
+            </a:r>
+            <a:endParaRPr lang="pl-PL" sz="2000" dirty="0"/>
+          </a:p>
+          <a:p>
+            <a:r>
+              <a:rPr lang="pl-PL" sz="2000" dirty="0"/>
+              <a:t>Extension </a:t>
+            </a:r>
+            <a:r>
+              <a:rPr lang="pl-PL" sz="2000" dirty="0" err="1"/>
+              <a:t>Context</a:t>
+            </a:r>
+            <a:endParaRPr lang="pl-PL" sz="2000" dirty="0"/>
+          </a:p>
+          <a:p>
+            <a:r>
+              <a:rPr lang="pl-PL" sz="2000" dirty="0" err="1"/>
+              <a:t>Extentions</a:t>
+            </a:r>
+            <a:r>
+              <a:rPr lang="pl-PL" sz="2000" dirty="0"/>
+              <a:t> :</a:t>
+            </a:r>
+          </a:p>
+          <a:p>
+            <a:pPr lvl="1"/>
+            <a:r>
+              <a:rPr lang="pl-PL" sz="2000" dirty="0" err="1"/>
+              <a:t>Stateless</a:t>
+            </a:r>
+            <a:endParaRPr lang="pl-PL" sz="2000" dirty="0"/>
+          </a:p>
+          <a:p>
+            <a:pPr lvl="1"/>
+            <a:r>
+              <a:rPr lang="pl-PL" sz="2000" dirty="0" err="1"/>
+              <a:t>Use</a:t>
+            </a:r>
+            <a:r>
+              <a:rPr lang="pl-PL" sz="2000" dirty="0"/>
+              <a:t> Extension </a:t>
+            </a:r>
+            <a:r>
+              <a:rPr lang="pl-PL" sz="2000" dirty="0" err="1"/>
+              <a:t>Context</a:t>
+            </a:r>
+            <a:r>
+              <a:rPr lang="pl-PL" sz="2000" dirty="0"/>
+              <a:t> </a:t>
+            </a:r>
+            <a:r>
+              <a:rPr lang="pl-PL" sz="2000" dirty="0" err="1"/>
+              <a:t>Store</a:t>
+            </a:r>
+            <a:r>
+              <a:rPr lang="pl-PL" sz="2000" dirty="0"/>
+              <a:t> </a:t>
+            </a:r>
+            <a:r>
+              <a:rPr lang="pl-PL" sz="2000" dirty="0" err="1"/>
+              <a:t>which</a:t>
+            </a:r>
+            <a:r>
+              <a:rPr lang="pl-PL" sz="2000" dirty="0"/>
+              <a:t>:</a:t>
+            </a:r>
+          </a:p>
+          <a:p>
+            <a:pPr lvl="2"/>
+            <a:r>
+              <a:rPr lang="pl-PL" sz="2000" dirty="0" err="1"/>
+              <a:t>use</a:t>
+            </a:r>
+            <a:r>
+              <a:rPr lang="pl-PL" sz="2000" dirty="0"/>
+              <a:t> </a:t>
+            </a:r>
+            <a:r>
+              <a:rPr lang="pl-PL" sz="2000" dirty="0" err="1"/>
+              <a:t>namespace</a:t>
+            </a:r>
+            <a:r>
+              <a:rPr lang="pl-PL" sz="2000" dirty="0"/>
+              <a:t> to </a:t>
+            </a:r>
+            <a:r>
+              <a:rPr lang="pl-PL" sz="2000" dirty="0" err="1"/>
+              <a:t>separate</a:t>
+            </a:r>
+            <a:r>
+              <a:rPr lang="pl-PL" sz="2000" dirty="0"/>
+              <a:t> </a:t>
+            </a:r>
+            <a:r>
+              <a:rPr lang="pl-PL" sz="2000" dirty="0" err="1"/>
+              <a:t>extentions</a:t>
+            </a:r>
+            <a:r>
+              <a:rPr lang="pl-PL" sz="2000" dirty="0"/>
+              <a:t> data</a:t>
+            </a:r>
+          </a:p>
+          <a:p>
+            <a:pPr lvl="2"/>
+            <a:r>
+              <a:rPr lang="pl-PL" sz="2000" dirty="0" err="1"/>
+              <a:t>Use</a:t>
+            </a:r>
+            <a:r>
+              <a:rPr lang="pl-PL" sz="2000" dirty="0"/>
+              <a:t> hierarchy for </a:t>
+            </a:r>
+            <a:r>
+              <a:rPr lang="pl-PL" sz="2000" dirty="0" err="1"/>
+              <a:t>parent</a:t>
+            </a:r>
+            <a:r>
+              <a:rPr lang="pl-PL" sz="2000" dirty="0"/>
+              <a:t> / </a:t>
+            </a:r>
+            <a:r>
+              <a:rPr lang="pl-PL" sz="2000" dirty="0" err="1"/>
+              <a:t>child</a:t>
+            </a:r>
+            <a:r>
+              <a:rPr lang="pl-PL" sz="2000" dirty="0"/>
+              <a:t> test </a:t>
+            </a:r>
+            <a:r>
+              <a:rPr lang="pl-PL" sz="2000" dirty="0" err="1"/>
+              <a:t>node</a:t>
+            </a:r>
+            <a:r>
+              <a:rPr lang="pl-PL" sz="2000" dirty="0"/>
+              <a:t> data</a:t>
+            </a:r>
+          </a:p>
+          <a:p>
+            <a:pPr lvl="2"/>
+            <a:r>
+              <a:rPr lang="pl-PL" sz="2000" dirty="0"/>
+              <a:t>In the end </a:t>
+            </a:r>
+            <a:r>
+              <a:rPr lang="pl-PL" sz="2000" dirty="0" err="1"/>
+              <a:t>works</a:t>
+            </a:r>
+            <a:r>
+              <a:rPr lang="pl-PL" sz="2000" dirty="0"/>
+              <a:t> </a:t>
+            </a:r>
+            <a:r>
+              <a:rPr lang="pl-PL" sz="2000" dirty="0" err="1"/>
+              <a:t>like</a:t>
+            </a:r>
+            <a:r>
+              <a:rPr lang="pl-PL" sz="2000" dirty="0"/>
+              <a:t> </a:t>
+            </a:r>
+            <a:r>
+              <a:rPr lang="pl-PL" sz="2000" dirty="0" err="1"/>
+              <a:t>hash</a:t>
+            </a:r>
+            <a:r>
+              <a:rPr lang="pl-PL" sz="2000" dirty="0"/>
+              <a:t> map </a:t>
+            </a:r>
+            <a:r>
+              <a:rPr lang="pl-PL" sz="2000" dirty="0">
+                <a:sym typeface="Wingdings" panose="05000000000000000000" pitchFamily="2" charset="2"/>
+              </a:rPr>
+              <a:t> </a:t>
+            </a:r>
+            <a:endParaRPr lang="pl-PL" sz="2000" dirty="0"/>
+          </a:p>
+          <a:p>
+            <a:pPr lvl="1"/>
+            <a:endParaRPr lang="pl-PL" dirty="0"/>
           </a:p>
         </p:txBody>
       </p:sp>

</xml_diff>

<commit_message>
Junit5 - migration, recap
</commit_message>
<xml_diff>
--- a/ZJAVA/Junit5/Junit5 - ZJAVA.pptx
+++ b/ZJAVA/Junit5/Junit5 - ZJAVA.pptx
@@ -6,10 +6,10 @@
     <p:sldMasterId id="2147483736" r:id="rId6"/>
   </p:sldMasterIdLst>
   <p:notesMasterIdLst>
-    <p:notesMasterId r:id="rId25"/>
+    <p:notesMasterId r:id="rId26"/>
   </p:notesMasterIdLst>
   <p:handoutMasterIdLst>
-    <p:handoutMasterId r:id="rId26"/>
+    <p:handoutMasterId r:id="rId27"/>
   </p:handoutMasterIdLst>
   <p:sldIdLst>
     <p:sldId id="277" r:id="rId7"/>
@@ -30,6 +30,7 @@
     <p:sldId id="300" r:id="rId22"/>
     <p:sldId id="301" r:id="rId23"/>
     <p:sldId id="302" r:id="rId24"/>
+    <p:sldId id="309" r:id="rId25"/>
   </p:sldIdLst>
   <p:sldSz cx="9144000" cy="5143500" type="screen16x9"/>
   <p:notesSz cx="6858000" cy="9144000"/>
@@ -151,6 +152,7 @@
             <p14:sldId id="300"/>
             <p14:sldId id="301"/>
             <p14:sldId id="302"/>
+            <p14:sldId id="309"/>
           </p14:sldIdLst>
         </p14:section>
       </p14:sectionLst>
@@ -14592,13 +14594,8 @@
           <a:p>
             <a:r>
               <a:rPr lang="pl-PL" dirty="0"/>
-              <a:t>Test </a:t>
-            </a:r>
-            <a:r>
-              <a:rPr lang="pl-PL" dirty="0" err="1"/>
-              <a:t>Extention</a:t>
-            </a:r>
-            <a:endParaRPr lang="pl-PL" dirty="0"/>
+              <a:t>Test Extension</a:t>
+            </a:r>
           </a:p>
         </p:txBody>
       </p:sp>
@@ -14693,7 +14690,34 @@
               <a:rPr lang="pl-PL" sz="2000" dirty="0" err="1"/>
               <a:t>points</a:t>
             </a:r>
-            <a:endParaRPr lang="pl-PL" sz="2000" dirty="0"/>
+            <a:r>
+              <a:rPr lang="pl-PL" sz="2000" dirty="0"/>
+              <a:t> (</a:t>
+            </a:r>
+            <a:r>
+              <a:rPr lang="pl-PL" sz="2000" dirty="0" err="1"/>
+              <a:t>Lifecycle</a:t>
+            </a:r>
+            <a:r>
+              <a:rPr lang="pl-PL" sz="2000" dirty="0"/>
+              <a:t> </a:t>
+            </a:r>
+            <a:r>
+              <a:rPr lang="pl-PL" sz="2000" dirty="0" err="1"/>
+              <a:t>annotation</a:t>
+            </a:r>
+            <a:r>
+              <a:rPr lang="pl-PL" sz="2000" dirty="0"/>
+              <a:t> + much </a:t>
+            </a:r>
+            <a:r>
+              <a:rPr lang="pl-PL" sz="2000" dirty="0" err="1"/>
+              <a:t>more</a:t>
+            </a:r>
+            <a:r>
+              <a:rPr lang="pl-PL" sz="2000" dirty="0"/>
+              <a:t>)</a:t>
+            </a:r>
           </a:p>
           <a:p>
             <a:r>
@@ -14708,12 +14732,8 @@
           </a:p>
           <a:p>
             <a:r>
-              <a:rPr lang="pl-PL" sz="2000" dirty="0" err="1"/>
-              <a:t>Extentions</a:t>
-            </a:r>
-            <a:r>
               <a:rPr lang="pl-PL" sz="2000" dirty="0"/>
-              <a:t> :</a:t>
+              <a:t>Extensions :</a:t>
             </a:r>
           </a:p>
           <a:p>
@@ -14869,7 +14889,50 @@
           </a:p>
           <a:p>
             <a:pPr lvl="1"/>
-            <a:endParaRPr lang="pl-PL" dirty="0"/>
+            <a:r>
+              <a:rPr lang="pl-PL" sz="2000" dirty="0"/>
+              <a:t>Spring, </a:t>
+            </a:r>
+            <a:r>
+              <a:rPr lang="pl-PL" sz="2000" dirty="0" err="1"/>
+              <a:t>Mockito</a:t>
+            </a:r>
+            <a:r>
+              <a:rPr lang="pl-PL" sz="2000" dirty="0"/>
+              <a:t>, </a:t>
+            </a:r>
+            <a:r>
+              <a:rPr lang="pl-PL" sz="2000" dirty="0" err="1"/>
+              <a:t>Wiremock</a:t>
+            </a:r>
+            <a:r>
+              <a:rPr lang="pl-PL" sz="2000" dirty="0"/>
+              <a:t> etc. </a:t>
+            </a:r>
+            <a:r>
+              <a:rPr lang="pl-PL" sz="2000" dirty="0" err="1"/>
+              <a:t>tests</a:t>
+            </a:r>
+            <a:r>
+              <a:rPr lang="pl-PL" sz="2000" dirty="0"/>
+              <a:t> </a:t>
+            </a:r>
+            <a:r>
+              <a:rPr lang="pl-PL" sz="2000" dirty="0" err="1"/>
+              <a:t>based</a:t>
+            </a:r>
+            <a:r>
+              <a:rPr lang="pl-PL" sz="2000" dirty="0"/>
+              <a:t> </a:t>
+            </a:r>
+            <a:r>
+              <a:rPr lang="pl-PL" sz="2000" dirty="0" err="1"/>
+              <a:t>now</a:t>
+            </a:r>
+            <a:r>
+              <a:rPr lang="pl-PL" sz="2000" dirty="0"/>
+              <a:t> on Extensions</a:t>
+            </a:r>
           </a:p>
         </p:txBody>
       </p:sp>
@@ -15018,7 +15081,489 @@
           <a:bodyPr/>
           <a:lstStyle/>
           <a:p>
-            <a:endParaRPr lang="pl-PL"/>
+            <a:pPr marL="508000" lvl="1" indent="-342900">
+              <a:buFont typeface="+mj-lt"/>
+              <a:buAutoNum type="arabicPeriod"/>
+            </a:pPr>
+            <a:r>
+              <a:rPr lang="pl-PL" dirty="0"/>
+              <a:t>New </a:t>
+            </a:r>
+            <a:r>
+              <a:rPr lang="pl-PL" dirty="0" err="1"/>
+              <a:t>tests</a:t>
+            </a:r>
+            <a:r>
+              <a:rPr lang="pl-PL" dirty="0"/>
+              <a:t> in Junit-5, </a:t>
+            </a:r>
+            <a:r>
+              <a:rPr lang="pl-PL" dirty="0" err="1"/>
+              <a:t>old</a:t>
+            </a:r>
+            <a:r>
+              <a:rPr lang="pl-PL" dirty="0"/>
+              <a:t> </a:t>
+            </a:r>
+            <a:r>
+              <a:rPr lang="pl-PL" dirty="0" err="1"/>
+              <a:t>tests</a:t>
+            </a:r>
+            <a:r>
+              <a:rPr lang="pl-PL" dirty="0"/>
+              <a:t> </a:t>
+            </a:r>
+            <a:r>
+              <a:rPr lang="pl-PL" dirty="0" err="1"/>
+              <a:t>runned</a:t>
+            </a:r>
+            <a:r>
+              <a:rPr lang="pl-PL" dirty="0"/>
+              <a:t> by </a:t>
+            </a:r>
+            <a:r>
+              <a:rPr lang="pl-PL" dirty="0" err="1"/>
+              <a:t>vintage</a:t>
+            </a:r>
+            <a:r>
+              <a:rPr lang="pl-PL" dirty="0"/>
+              <a:t> </a:t>
+            </a:r>
+            <a:r>
+              <a:rPr lang="pl-PL" dirty="0" err="1"/>
+              <a:t>engine</a:t>
+            </a:r>
+            <a:endParaRPr lang="pl-PL" dirty="0"/>
+          </a:p>
+          <a:p>
+            <a:pPr marL="508000" lvl="1" indent="-342900">
+              <a:buFont typeface="+mj-lt"/>
+              <a:buAutoNum type="arabicPeriod"/>
+            </a:pPr>
+            <a:r>
+              <a:rPr lang="pl-PL" dirty="0" err="1"/>
+              <a:t>Migrate</a:t>
+            </a:r>
+            <a:r>
+              <a:rPr lang="pl-PL" dirty="0"/>
+              <a:t> </a:t>
+            </a:r>
+            <a:r>
+              <a:rPr lang="pl-PL" dirty="0" err="1"/>
+              <a:t>simple</a:t>
+            </a:r>
+            <a:r>
+              <a:rPr lang="pl-PL" dirty="0"/>
+              <a:t> test:</a:t>
+            </a:r>
+          </a:p>
+          <a:p>
+            <a:pPr lvl="2"/>
+            <a:r>
+              <a:rPr lang="pl-PL" dirty="0" err="1"/>
+              <a:t>Change</a:t>
+            </a:r>
+            <a:r>
+              <a:rPr lang="pl-PL" dirty="0"/>
+              <a:t> import </a:t>
+            </a:r>
+            <a:r>
+              <a:rPr lang="pl-PL" dirty="0" err="1"/>
+              <a:t>statements</a:t>
+            </a:r>
+            <a:r>
+              <a:rPr lang="pl-PL" dirty="0"/>
+              <a:t> for @Test and ‚</a:t>
+            </a:r>
+            <a:r>
+              <a:rPr lang="pl-PL" dirty="0" err="1"/>
+              <a:t>assertThat</a:t>
+            </a:r>
+            <a:r>
+              <a:rPr lang="pl-PL" dirty="0"/>
+              <a:t>’ </a:t>
+            </a:r>
+            <a:r>
+              <a:rPr lang="pl-PL" dirty="0" err="1"/>
+              <a:t>assertions</a:t>
+            </a:r>
+            <a:endParaRPr lang="pl-PL" dirty="0"/>
+          </a:p>
+          <a:p>
+            <a:pPr lvl="2"/>
+            <a:r>
+              <a:rPr lang="pl-PL" dirty="0" err="1"/>
+              <a:t>Remove</a:t>
+            </a:r>
+            <a:r>
+              <a:rPr lang="pl-PL" dirty="0"/>
+              <a:t> </a:t>
+            </a:r>
+            <a:r>
+              <a:rPr lang="pl-PL" dirty="0" err="1"/>
+              <a:t>expect</a:t>
+            </a:r>
+            <a:r>
+              <a:rPr lang="pl-PL" dirty="0"/>
+              <a:t> from test -&gt; </a:t>
+            </a:r>
+            <a:r>
+              <a:rPr lang="pl-PL" dirty="0" err="1"/>
+              <a:t>introduce</a:t>
+            </a:r>
+            <a:r>
+              <a:rPr lang="pl-PL" dirty="0"/>
+              <a:t> `</a:t>
+            </a:r>
+            <a:r>
+              <a:rPr lang="pl-PL" dirty="0" err="1"/>
+              <a:t>assertThrows</a:t>
+            </a:r>
+            <a:r>
+              <a:rPr lang="pl-PL" dirty="0"/>
+              <a:t>`</a:t>
+            </a:r>
+          </a:p>
+          <a:p>
+            <a:pPr lvl="2"/>
+            <a:r>
+              <a:rPr lang="pl-PL" dirty="0" err="1"/>
+              <a:t>Change</a:t>
+            </a:r>
+            <a:r>
+              <a:rPr lang="pl-PL" dirty="0"/>
+              <a:t>  </a:t>
+            </a:r>
+            <a:r>
+              <a:rPr lang="pl-PL" dirty="0" err="1"/>
+              <a:t>lifecycle</a:t>
+            </a:r>
+            <a:r>
+              <a:rPr lang="pl-PL" dirty="0"/>
+              <a:t> </a:t>
+            </a:r>
+            <a:r>
+              <a:rPr lang="pl-PL" dirty="0" err="1"/>
+              <a:t>annotation</a:t>
+            </a:r>
+            <a:r>
+              <a:rPr lang="pl-PL" dirty="0"/>
+              <a:t>, </a:t>
+            </a:r>
+            <a:r>
+              <a:rPr lang="pl-PL" dirty="0" err="1"/>
+              <a:t>f.e</a:t>
+            </a:r>
+            <a:r>
+              <a:rPr lang="pl-PL" dirty="0"/>
+              <a:t>. @</a:t>
+            </a:r>
+            <a:r>
+              <a:rPr lang="pl-PL" dirty="0" err="1"/>
+              <a:t>Before</a:t>
+            </a:r>
+            <a:r>
+              <a:rPr lang="pl-PL" dirty="0"/>
+              <a:t> -&gt; @</a:t>
+            </a:r>
+            <a:r>
+              <a:rPr lang="pl-PL" dirty="0" err="1"/>
+              <a:t>BeforeEeach</a:t>
+            </a:r>
+            <a:r>
+              <a:rPr lang="pl-PL" dirty="0"/>
+              <a:t>, @</a:t>
+            </a:r>
+            <a:r>
+              <a:rPr lang="pl-PL" dirty="0" err="1"/>
+              <a:t>BeforeClass</a:t>
+            </a:r>
+            <a:r>
+              <a:rPr lang="pl-PL" dirty="0"/>
+              <a:t> - &gt; @</a:t>
+            </a:r>
+            <a:r>
+              <a:rPr lang="pl-PL" dirty="0" err="1"/>
+              <a:t>BeforeAll</a:t>
+            </a:r>
+            <a:endParaRPr lang="pl-PL" dirty="0"/>
+          </a:p>
+          <a:p>
+            <a:pPr lvl="2"/>
+            <a:r>
+              <a:rPr lang="pl-PL" dirty="0" err="1"/>
+              <a:t>Move</a:t>
+            </a:r>
+            <a:r>
+              <a:rPr lang="pl-PL" dirty="0"/>
+              <a:t> </a:t>
+            </a:r>
+            <a:r>
+              <a:rPr lang="pl-PL" dirty="0" err="1"/>
+              <a:t>failure</a:t>
+            </a:r>
+            <a:r>
+              <a:rPr lang="pl-PL" dirty="0"/>
+              <a:t> </a:t>
+            </a:r>
+            <a:r>
+              <a:rPr lang="pl-PL" dirty="0" err="1"/>
+              <a:t>message</a:t>
+            </a:r>
+            <a:r>
+              <a:rPr lang="pl-PL" dirty="0"/>
+              <a:t> to 3th </a:t>
+            </a:r>
+            <a:r>
+              <a:rPr lang="pl-PL" dirty="0" err="1"/>
+              <a:t>possition</a:t>
+            </a:r>
+            <a:r>
+              <a:rPr lang="pl-PL" dirty="0"/>
+              <a:t> in </a:t>
+            </a:r>
+            <a:r>
+              <a:rPr lang="pl-PL" dirty="0" err="1"/>
+              <a:t>assertions</a:t>
+            </a:r>
+            <a:r>
+              <a:rPr lang="pl-PL" dirty="0"/>
+              <a:t> </a:t>
+            </a:r>
+          </a:p>
+          <a:p>
+            <a:pPr lvl="2"/>
+            <a:r>
+              <a:rPr lang="pl-PL" dirty="0" err="1"/>
+              <a:t>Consider</a:t>
+            </a:r>
+            <a:r>
+              <a:rPr lang="pl-PL" dirty="0"/>
+              <a:t> automation for </a:t>
+            </a:r>
+            <a:r>
+              <a:rPr lang="pl-PL" dirty="0" err="1"/>
+              <a:t>replacing</a:t>
+            </a:r>
+            <a:r>
+              <a:rPr lang="pl-PL" dirty="0"/>
+              <a:t> (</a:t>
+            </a:r>
+            <a:r>
+              <a:rPr lang="pl-PL" dirty="0" err="1"/>
+              <a:t>f.e</a:t>
+            </a:r>
+            <a:r>
+              <a:rPr lang="pl-PL" dirty="0"/>
+              <a:t>. </a:t>
+            </a:r>
+            <a:r>
+              <a:rPr lang="pl-PL" dirty="0" err="1"/>
+              <a:t>bash</a:t>
+            </a:r>
+            <a:r>
+              <a:rPr lang="pl-PL" dirty="0"/>
+              <a:t> with </a:t>
+            </a:r>
+            <a:r>
+              <a:rPr lang="pl-PL" dirty="0" err="1"/>
+              <a:t>sets</a:t>
+            </a:r>
+            <a:r>
+              <a:rPr lang="pl-PL" dirty="0"/>
+              <a:t> of `</a:t>
+            </a:r>
+            <a:r>
+              <a:rPr lang="pl-PL" dirty="0" err="1"/>
+              <a:t>sed</a:t>
+            </a:r>
+            <a:r>
+              <a:rPr lang="pl-PL" dirty="0"/>
+              <a:t> –i ` </a:t>
+            </a:r>
+            <a:r>
+              <a:rPr lang="pl-PL" dirty="0" err="1"/>
+              <a:t>commands</a:t>
+            </a:r>
+            <a:endParaRPr lang="pl-PL" dirty="0"/>
+          </a:p>
+          <a:p>
+            <a:pPr marL="508000" lvl="1" indent="-342900">
+              <a:buFont typeface="+mj-lt"/>
+              <a:buAutoNum type="arabicPeriod"/>
+            </a:pPr>
+            <a:r>
+              <a:rPr lang="pl-PL" dirty="0" err="1"/>
+              <a:t>Migrate</a:t>
+            </a:r>
+            <a:r>
+              <a:rPr lang="pl-PL" dirty="0"/>
+              <a:t> </a:t>
+            </a:r>
+            <a:r>
+              <a:rPr lang="pl-PL" dirty="0" err="1"/>
+              <a:t>complex</a:t>
+            </a:r>
+            <a:r>
+              <a:rPr lang="pl-PL" dirty="0"/>
+              <a:t> test</a:t>
+            </a:r>
+          </a:p>
+          <a:p>
+            <a:pPr lvl="2"/>
+            <a:r>
+              <a:rPr lang="pl-PL" dirty="0"/>
+              <a:t>Same </a:t>
+            </a:r>
+            <a:r>
+              <a:rPr lang="pl-PL" dirty="0" err="1"/>
+              <a:t>steps</a:t>
+            </a:r>
+            <a:r>
+              <a:rPr lang="pl-PL" dirty="0"/>
+              <a:t> </a:t>
+            </a:r>
+            <a:r>
+              <a:rPr lang="pl-PL" dirty="0" err="1"/>
+              <a:t>like</a:t>
+            </a:r>
+            <a:r>
+              <a:rPr lang="pl-PL" dirty="0"/>
+              <a:t> for </a:t>
+            </a:r>
+            <a:r>
+              <a:rPr lang="pl-PL" dirty="0" err="1"/>
+              <a:t>simple</a:t>
+            </a:r>
+            <a:r>
+              <a:rPr lang="pl-PL" dirty="0"/>
+              <a:t> </a:t>
+            </a:r>
+            <a:r>
+              <a:rPr lang="pl-PL" dirty="0" err="1"/>
+              <a:t>tests</a:t>
+            </a:r>
+            <a:endParaRPr lang="pl-PL" dirty="0"/>
+          </a:p>
+          <a:p>
+            <a:pPr lvl="2"/>
+            <a:r>
+              <a:rPr lang="pl-PL" dirty="0" err="1"/>
+              <a:t>Change</a:t>
+            </a:r>
+            <a:r>
+              <a:rPr lang="pl-PL" dirty="0"/>
+              <a:t> @</a:t>
+            </a:r>
+            <a:r>
+              <a:rPr lang="pl-PL" dirty="0" err="1"/>
+              <a:t>RunWith</a:t>
+            </a:r>
+            <a:r>
+              <a:rPr lang="pl-PL" dirty="0"/>
+              <a:t>(X) -&gt; @</a:t>
+            </a:r>
+            <a:r>
+              <a:rPr lang="pl-PL" dirty="0" err="1"/>
+              <a:t>ExtendWith</a:t>
+            </a:r>
+            <a:r>
+              <a:rPr lang="pl-PL" dirty="0"/>
+              <a:t> (Y)</a:t>
+            </a:r>
+          </a:p>
+          <a:p>
+            <a:pPr lvl="2"/>
+            <a:r>
+              <a:rPr lang="pl-PL" dirty="0" err="1"/>
+              <a:t>Work</a:t>
+            </a:r>
+            <a:r>
+              <a:rPr lang="pl-PL" dirty="0"/>
+              <a:t> with </a:t>
+            </a:r>
+            <a:r>
+              <a:rPr lang="pl-PL" dirty="0" err="1"/>
+              <a:t>used</a:t>
+            </a:r>
+            <a:r>
+              <a:rPr lang="pl-PL" dirty="0"/>
+              <a:t> @</a:t>
+            </a:r>
+            <a:r>
+              <a:rPr lang="pl-PL" dirty="0" err="1"/>
+              <a:t>Rules</a:t>
+            </a:r>
+            <a:r>
+              <a:rPr lang="pl-PL" dirty="0"/>
+              <a:t> – </a:t>
+            </a:r>
+            <a:r>
+              <a:rPr lang="pl-PL" dirty="0" err="1"/>
+              <a:t>replacement</a:t>
+            </a:r>
+            <a:r>
+              <a:rPr lang="pl-PL" dirty="0"/>
+              <a:t> </a:t>
+            </a:r>
+            <a:r>
+              <a:rPr lang="pl-PL" dirty="0" err="1"/>
+              <a:t>is</a:t>
+            </a:r>
+            <a:r>
+              <a:rPr lang="pl-PL" dirty="0"/>
+              <a:t> </a:t>
+            </a:r>
+            <a:r>
+              <a:rPr lang="pl-PL" dirty="0" err="1"/>
+              <a:t>well</a:t>
+            </a:r>
+            <a:r>
+              <a:rPr lang="pl-PL" dirty="0"/>
+              <a:t> </a:t>
+            </a:r>
+            <a:r>
+              <a:rPr lang="pl-PL" dirty="0" err="1"/>
+              <a:t>described</a:t>
+            </a:r>
+            <a:r>
+              <a:rPr lang="pl-PL" dirty="0"/>
+              <a:t> in web</a:t>
+            </a:r>
+          </a:p>
+        </p:txBody>
+      </p:sp>
+      <p:sp>
+        <p:nvSpPr>
+          <p:cNvPr id="6" name="Rectangle 5">
+            <a:extLst>
+              <a:ext uri="{FF2B5EF4-FFF2-40B4-BE49-F238E27FC236}">
+                <a16:creationId xmlns:a16="http://schemas.microsoft.com/office/drawing/2014/main" id="{F37E80DC-3E63-49EA-8C07-D58F8E1C98F8}"/>
+              </a:ext>
+            </a:extLst>
+          </p:cNvPr>
+          <p:cNvSpPr/>
+          <p:nvPr/>
+        </p:nvSpPr>
+        <p:spPr>
+          <a:xfrm>
+            <a:off x="3973118" y="2387084"/>
+            <a:ext cx="1197764" cy="369332"/>
+          </a:xfrm>
+          <a:prstGeom prst="rect">
+            <a:avLst/>
+          </a:prstGeom>
+        </p:spPr>
+        <p:txBody>
+          <a:bodyPr wrap="none">
+            <a:spAutoFit/>
+          </a:bodyPr>
+          <a:lstStyle/>
+          <a:p>
+            <a:r>
+              <a:rPr lang="pl-PL" dirty="0"/>
+              <a:t>Extension</a:t>
+            </a:r>
           </a:p>
         </p:txBody>
       </p:sp>
@@ -15026,6 +15571,251 @@
     <p:extLst>
       <p:ext uri="{BB962C8B-B14F-4D97-AF65-F5344CB8AC3E}">
         <p14:creationId xmlns:p14="http://schemas.microsoft.com/office/powerpoint/2010/main" val="1339769484"/>
+      </p:ext>
+    </p:extLst>
+  </p:cSld>
+  <p:clrMapOvr>
+    <a:masterClrMapping/>
+  </p:clrMapOvr>
+</p:sld>
+</file>
+
+<file path=ppt/slides/slide19.xml><?xml version="1.0" encoding="utf-8"?>
+<p:sld xmlns:a="http://schemas.openxmlformats.org/drawingml/2006/main" xmlns:r="http://schemas.openxmlformats.org/officeDocument/2006/relationships" xmlns:p="http://schemas.openxmlformats.org/presentationml/2006/main">
+  <p:cSld>
+    <p:spTree>
+      <p:nvGrpSpPr>
+        <p:cNvPr id="1" name=""/>
+        <p:cNvGrpSpPr/>
+        <p:nvPr/>
+      </p:nvGrpSpPr>
+      <p:grpSpPr>
+        <a:xfrm>
+          <a:off x="0" y="0"/>
+          <a:ext cx="0" cy="0"/>
+          <a:chOff x="0" y="0"/>
+          <a:chExt cx="0" cy="0"/>
+        </a:xfrm>
+      </p:grpSpPr>
+      <p:sp>
+        <p:nvSpPr>
+          <p:cNvPr id="2" name="Title 1">
+            <a:extLst>
+              <a:ext uri="{FF2B5EF4-FFF2-40B4-BE49-F238E27FC236}">
+                <a16:creationId xmlns:a16="http://schemas.microsoft.com/office/drawing/2014/main" id="{21CA427D-3D1C-45AB-80B1-F3BFD7A731B2}"/>
+              </a:ext>
+            </a:extLst>
+          </p:cNvPr>
+          <p:cNvSpPr>
+            <a:spLocks noGrp="1"/>
+          </p:cNvSpPr>
+          <p:nvPr>
+            <p:ph type="title"/>
+          </p:nvPr>
+        </p:nvSpPr>
+        <p:spPr/>
+        <p:txBody>
+          <a:bodyPr/>
+          <a:lstStyle/>
+          <a:p>
+            <a:r>
+              <a:rPr lang="pl-PL" dirty="0" err="1"/>
+              <a:t>Recap</a:t>
+            </a:r>
+            <a:r>
+              <a:rPr lang="pl-PL" dirty="0"/>
+              <a:t>	</a:t>
+            </a:r>
+          </a:p>
+        </p:txBody>
+      </p:sp>
+      <p:sp>
+        <p:nvSpPr>
+          <p:cNvPr id="3" name="Footer Placeholder 2">
+            <a:extLst>
+              <a:ext uri="{FF2B5EF4-FFF2-40B4-BE49-F238E27FC236}">
+                <a16:creationId xmlns:a16="http://schemas.microsoft.com/office/drawing/2014/main" id="{76C863BB-A124-46F6-82D9-39BC2878605C}"/>
+              </a:ext>
+            </a:extLst>
+          </p:cNvPr>
+          <p:cNvSpPr>
+            <a:spLocks noGrp="1"/>
+          </p:cNvSpPr>
+          <p:nvPr>
+            <p:ph type="ftr" sz="quarter" idx="16"/>
+          </p:nvPr>
+        </p:nvSpPr>
+        <p:spPr/>
+        <p:txBody>
+          <a:bodyPr/>
+          <a:lstStyle/>
+          <a:p>
+            <a:r>
+              <a:rPr lang="pl-PL"/>
+              <a:t>JUNIT 5</a:t>
+            </a:r>
+            <a:endParaRPr lang="pl-PL" dirty="0"/>
+          </a:p>
+        </p:txBody>
+      </p:sp>
+      <p:sp>
+        <p:nvSpPr>
+          <p:cNvPr id="4" name="Date Placeholder 3">
+            <a:extLst>
+              <a:ext uri="{FF2B5EF4-FFF2-40B4-BE49-F238E27FC236}">
+                <a16:creationId xmlns:a16="http://schemas.microsoft.com/office/drawing/2014/main" id="{E1B4D32C-57FD-41D9-948C-0FCF16799731}"/>
+              </a:ext>
+            </a:extLst>
+          </p:cNvPr>
+          <p:cNvSpPr>
+            <a:spLocks noGrp="1"/>
+          </p:cNvSpPr>
+          <p:nvPr>
+            <p:ph type="dt" sz="half" idx="15"/>
+          </p:nvPr>
+        </p:nvSpPr>
+        <p:spPr/>
+        <p:txBody>
+          <a:bodyPr/>
+          <a:lstStyle/>
+          <a:p>
+            <a:fld id="{6ABC2847-D563-405E-8397-0B7C61EE83E9}" type="datetime1">
+              <a:rPr lang="pl-PL" smtClean="0"/>
+              <a:t>31.12.2019</a:t>
+            </a:fld>
+            <a:endParaRPr lang="pl-PL" dirty="0"/>
+          </a:p>
+        </p:txBody>
+      </p:sp>
+      <p:sp>
+        <p:nvSpPr>
+          <p:cNvPr id="5" name="Text Placeholder 4">
+            <a:extLst>
+              <a:ext uri="{FF2B5EF4-FFF2-40B4-BE49-F238E27FC236}">
+                <a16:creationId xmlns:a16="http://schemas.microsoft.com/office/drawing/2014/main" id="{19B4E5C1-2993-40DA-8DD9-E35969CE286A}"/>
+              </a:ext>
+            </a:extLst>
+          </p:cNvPr>
+          <p:cNvSpPr>
+            <a:spLocks noGrp="1"/>
+          </p:cNvSpPr>
+          <p:nvPr>
+            <p:ph type="body" sz="quarter" idx="17"/>
+          </p:nvPr>
+        </p:nvSpPr>
+        <p:spPr/>
+        <p:txBody>
+          <a:bodyPr/>
+          <a:lstStyle/>
+          <a:p>
+            <a:r>
+              <a:rPr lang="en-US" sz="2000" dirty="0"/>
+              <a:t>Why Junit 5 was introduced</a:t>
+            </a:r>
+            <a:r>
+              <a:rPr lang="pl-PL" sz="2000" dirty="0"/>
+              <a:t> </a:t>
+            </a:r>
+          </a:p>
+          <a:p>
+            <a:r>
+              <a:rPr lang="pl-PL" sz="2000" dirty="0" err="1"/>
+              <a:t>Junit</a:t>
+            </a:r>
+            <a:r>
+              <a:rPr lang="pl-PL" sz="2000" dirty="0"/>
+              <a:t> 5 </a:t>
+            </a:r>
+            <a:r>
+              <a:rPr lang="pl-PL" sz="2000" dirty="0" err="1"/>
+              <a:t>architecture</a:t>
+            </a:r>
+            <a:endParaRPr lang="pl-PL" sz="2000" dirty="0"/>
+          </a:p>
+          <a:p>
+            <a:r>
+              <a:rPr lang="pl-PL" sz="2000" dirty="0"/>
+              <a:t>Basics</a:t>
+            </a:r>
+          </a:p>
+          <a:p>
+            <a:r>
+              <a:rPr lang="pl-PL" sz="2000" dirty="0" err="1"/>
+              <a:t>Conditional</a:t>
+            </a:r>
+            <a:r>
+              <a:rPr lang="pl-PL" sz="2000" dirty="0"/>
+              <a:t> </a:t>
+            </a:r>
+            <a:r>
+              <a:rPr lang="pl-PL" sz="2000" dirty="0" err="1"/>
+              <a:t>Tests</a:t>
+            </a:r>
+            <a:endParaRPr lang="pl-PL" sz="2000" dirty="0"/>
+          </a:p>
+          <a:p>
+            <a:r>
+              <a:rPr lang="pl-PL" sz="2000" dirty="0" err="1"/>
+              <a:t>Dynamic</a:t>
+            </a:r>
+            <a:r>
+              <a:rPr lang="pl-PL" sz="2000" dirty="0"/>
+              <a:t> </a:t>
+            </a:r>
+            <a:r>
+              <a:rPr lang="pl-PL" sz="2000" dirty="0" err="1"/>
+              <a:t>Tests</a:t>
+            </a:r>
+            <a:endParaRPr lang="pl-PL" sz="2000" dirty="0"/>
+          </a:p>
+          <a:p>
+            <a:r>
+              <a:rPr lang="pl-PL" sz="2000" dirty="0" err="1"/>
+              <a:t>Parameterized</a:t>
+            </a:r>
+            <a:r>
+              <a:rPr lang="pl-PL" sz="2000" dirty="0"/>
+              <a:t> </a:t>
+            </a:r>
+            <a:r>
+              <a:rPr lang="pl-PL" sz="2000" dirty="0" err="1"/>
+              <a:t>Tests</a:t>
+            </a:r>
+            <a:endParaRPr lang="pl-PL" sz="2000" dirty="0"/>
+          </a:p>
+          <a:p>
+            <a:r>
+              <a:rPr lang="pl-PL" sz="2000" dirty="0"/>
+              <a:t>Test Extension</a:t>
+            </a:r>
+          </a:p>
+          <a:p>
+            <a:r>
+              <a:rPr lang="pl-PL" sz="2000" dirty="0" err="1"/>
+              <a:t>Migrtion</a:t>
+            </a:r>
+            <a:r>
+              <a:rPr lang="pl-PL" sz="2000" dirty="0"/>
+              <a:t> </a:t>
+            </a:r>
+            <a:r>
+              <a:rPr lang="pl-PL" sz="2000" dirty="0" err="1"/>
+              <a:t>Junit</a:t>
+            </a:r>
+            <a:r>
+              <a:rPr lang="pl-PL" sz="2000" dirty="0"/>
+              <a:t> 4 -&gt; 5</a:t>
+            </a:r>
+          </a:p>
+          <a:p>
+            <a:endParaRPr lang="pl-PL" dirty="0"/>
+          </a:p>
+        </p:txBody>
+      </p:sp>
+    </p:spTree>
+    <p:extLst>
+      <p:ext uri="{BB962C8B-B14F-4D97-AF65-F5344CB8AC3E}">
+        <p14:creationId xmlns:p14="http://schemas.microsoft.com/office/powerpoint/2010/main" val="1683762192"/>
       </p:ext>
     </p:extLst>
   </p:cSld>
@@ -15592,13 +16382,8 @@
           <a:p>
             <a:r>
               <a:rPr lang="pl-PL" sz="2000" dirty="0"/>
-              <a:t>Test </a:t>
-            </a:r>
-            <a:r>
-              <a:rPr lang="pl-PL" sz="2000" dirty="0" err="1"/>
-              <a:t>Extention</a:t>
-            </a:r>
-            <a:endParaRPr lang="pl-PL" sz="2000" dirty="0"/>
+              <a:t>Test Extension</a:t>
+            </a:r>
           </a:p>
           <a:p>
             <a:r>

</xml_diff>

<commit_message>
Junit5 - fix wordings
</commit_message>
<xml_diff>
--- a/ZJAVA/Junit5/Junit5 - ZJAVA.pptx
+++ b/ZJAVA/Junit5/Junit5 - ZJAVA.pptx
@@ -1745,7 +1745,7 @@
         <a:lstStyle/>
         <a:p>
           <a:r>
-            <a:rPr lang="pl-PL" dirty="0"/>
+            <a:rPr lang="pl-PL"/>
             <a:t>Platform</a:t>
           </a:r>
         </a:p>
@@ -1781,10 +1781,10 @@
         <a:lstStyle/>
         <a:p>
           <a:r>
-            <a:rPr lang="pl-PL" dirty="0" err="1"/>
+            <a:rPr lang="pl-PL" err="1"/>
             <a:t>Vintage</a:t>
           </a:r>
-          <a:endParaRPr lang="pl-PL" dirty="0"/>
+          <a:endParaRPr lang="pl-PL"/>
         </a:p>
       </dgm:t>
     </dgm:pt>
@@ -1822,7 +1822,7 @@
         <a:lstStyle/>
         <a:p>
           <a:r>
-            <a:rPr lang="pl-PL" dirty="0"/>
+            <a:rPr lang="pl-PL"/>
             <a:t>Jupiter</a:t>
           </a:r>
         </a:p>
@@ -1862,18 +1862,18 @@
         <a:lstStyle/>
         <a:p>
           <a:r>
-            <a:rPr lang="pl-PL" dirty="0" err="1"/>
+            <a:rPr lang="pl-PL" err="1"/>
             <a:t>External</a:t>
           </a:r>
           <a:r>
-            <a:rPr lang="pl-PL" dirty="0"/>
+            <a:rPr lang="pl-PL"/>
             <a:t> </a:t>
           </a:r>
           <a:r>
-            <a:rPr lang="pl-PL" dirty="0" err="1"/>
+            <a:rPr lang="pl-PL" err="1"/>
             <a:t>libs</a:t>
           </a:r>
-          <a:endParaRPr lang="pl-PL" dirty="0"/>
+          <a:endParaRPr lang="pl-PL"/>
         </a:p>
       </dgm:t>
     </dgm:pt>
@@ -1907,27 +1907,27 @@
         <a:lstStyle/>
         <a:p>
           <a:r>
-            <a:rPr lang="pl-PL" dirty="0" err="1"/>
+            <a:rPr lang="pl-PL" err="1"/>
             <a:t>Old</a:t>
           </a:r>
           <a:r>
-            <a:rPr lang="pl-PL" dirty="0"/>
+            <a:rPr lang="pl-PL"/>
             <a:t> </a:t>
           </a:r>
           <a:r>
-            <a:rPr lang="pl-PL" dirty="0" err="1"/>
+            <a:rPr lang="pl-PL" err="1"/>
             <a:t>tests</a:t>
           </a:r>
           <a:r>
-            <a:rPr lang="pl-PL" dirty="0"/>
+            <a:rPr lang="pl-PL"/>
             <a:t> (</a:t>
           </a:r>
           <a:r>
-            <a:rPr lang="pl-PL" dirty="0" err="1"/>
+            <a:rPr lang="pl-PL" err="1"/>
             <a:t>Junit</a:t>
           </a:r>
           <a:r>
-            <a:rPr lang="pl-PL" dirty="0"/>
+            <a:rPr lang="pl-PL"/>
             <a:t> 4.12)</a:t>
           </a:r>
         </a:p>
@@ -1967,9 +1967,14 @@
         <a:lstStyle/>
         <a:p>
           <a:r>
-            <a:rPr lang="pl-PL" dirty="0"/>
-            <a:t>Nowe testy</a:t>
+            <a:rPr lang="pl-PL"/>
+            <a:t>New </a:t>
           </a:r>
+          <a:r>
+            <a:rPr lang="pl-PL" err="1"/>
+            <a:t>Tests</a:t>
+          </a:r>
+          <a:endParaRPr lang="pl-PL"/>
         </a:p>
       </dgm:t>
     </dgm:pt>
@@ -2007,11 +2012,11 @@
         <a:lstStyle/>
         <a:p>
           <a:r>
-            <a:rPr lang="pl-PL" dirty="0" err="1"/>
+            <a:rPr lang="pl-PL" err="1"/>
             <a:t>Wiremock</a:t>
           </a:r>
           <a:r>
-            <a:rPr lang="pl-PL" dirty="0"/>
+            <a:rPr lang="pl-PL"/>
             <a:t> etc.</a:t>
           </a:r>
         </a:p>
@@ -2051,7 +2056,7 @@
         <a:lstStyle/>
         <a:p>
           <a:r>
-            <a:rPr lang="pl-PL" dirty="0">
+            <a:rPr lang="pl-PL">
               <a:solidFill>
                 <a:schemeClr val="bg1"/>
               </a:solidFill>
@@ -2059,7 +2064,7 @@
             <a:t>IDE, </a:t>
           </a:r>
           <a:r>
-            <a:rPr lang="pl-PL" dirty="0" err="1">
+            <a:rPr lang="pl-PL" err="1">
               <a:solidFill>
                 <a:schemeClr val="bg1"/>
               </a:solidFill>
@@ -2067,7 +2072,7 @@
             <a:t>maven</a:t>
           </a:r>
           <a:r>
-            <a:rPr lang="pl-PL" dirty="0">
+            <a:rPr lang="pl-PL">
               <a:solidFill>
                 <a:schemeClr val="bg1"/>
               </a:solidFill>
@@ -2075,7 +2080,7 @@
             <a:t>, </a:t>
           </a:r>
           <a:r>
-            <a:rPr lang="pl-PL" dirty="0" err="1">
+            <a:rPr lang="pl-PL" err="1">
               <a:solidFill>
                 <a:schemeClr val="bg1"/>
               </a:solidFill>
@@ -2083,7 +2088,7 @@
             <a:t>gradle</a:t>
           </a:r>
           <a:r>
-            <a:rPr lang="pl-PL" dirty="0">
+            <a:rPr lang="pl-PL">
               <a:solidFill>
                 <a:schemeClr val="bg1"/>
               </a:solidFill>
@@ -2127,7 +2132,7 @@
         <a:lstStyle/>
         <a:p>
           <a:r>
-            <a:rPr lang="pl-PL" dirty="0">
+            <a:rPr lang="pl-PL">
               <a:solidFill>
                 <a:schemeClr val="bg1"/>
               </a:solidFill>
@@ -2135,14 +2140,14 @@
             <a:t>Test </a:t>
           </a:r>
           <a:r>
-            <a:rPr lang="pl-PL" dirty="0" err="1">
+            <a:rPr lang="pl-PL" err="1">
               <a:solidFill>
                 <a:schemeClr val="bg1"/>
               </a:solidFill>
             </a:rPr>
             <a:t>code</a:t>
           </a:r>
-          <a:endParaRPr lang="pl-PL" dirty="0">
+          <a:endParaRPr lang="pl-PL">
             <a:solidFill>
               <a:schemeClr val="bg1"/>
             </a:solidFill>
@@ -2459,10 +2464,10 @@
         <a:lstStyle/>
         <a:p>
           <a:r>
-            <a:rPr lang="pl-PL" dirty="0" err="1"/>
+            <a:rPr lang="pl-PL" err="1"/>
             <a:t>DynamicNode</a:t>
           </a:r>
-          <a:endParaRPr lang="pl-PL" dirty="0"/>
+          <a:endParaRPr lang="pl-PL"/>
         </a:p>
       </dgm:t>
     </dgm:pt>
@@ -2496,10 +2501,10 @@
         <a:lstStyle/>
         <a:p>
           <a:r>
-            <a:rPr lang="pl-PL" dirty="0" err="1"/>
+            <a:rPr lang="pl-PL" err="1"/>
             <a:t>DynamicContainer</a:t>
           </a:r>
-          <a:endParaRPr lang="pl-PL" dirty="0"/>
+          <a:endParaRPr lang="pl-PL"/>
         </a:p>
       </dgm:t>
     </dgm:pt>
@@ -2536,7 +2541,6 @@
             <a:rPr lang="pl-PL"/>
             <a:t>DynamicTest</a:t>
           </a:r>
-          <a:endParaRPr lang="pl-PL" dirty="0"/>
         </a:p>
       </dgm:t>
     </dgm:pt>
@@ -2786,7 +2790,7 @@
             <a:buNone/>
           </a:pPr>
           <a:r>
-            <a:rPr lang="pl-PL" sz="2000" kern="1200" dirty="0">
+            <a:rPr lang="pl-PL" sz="2000" kern="1200">
               <a:solidFill>
                 <a:schemeClr val="bg1"/>
               </a:solidFill>
@@ -2794,14 +2798,14 @@
             <a:t>Test </a:t>
           </a:r>
           <a:r>
-            <a:rPr lang="pl-PL" sz="2000" kern="1200" dirty="0" err="1">
+            <a:rPr lang="pl-PL" sz="2000" kern="1200" err="1">
               <a:solidFill>
                 <a:schemeClr val="bg1"/>
               </a:solidFill>
             </a:rPr>
             <a:t>code</a:t>
           </a:r>
-          <a:endParaRPr lang="pl-PL" sz="2000" kern="1200" dirty="0">
+          <a:endParaRPr lang="pl-PL" sz="2000" kern="1200">
             <a:solidFill>
               <a:schemeClr val="bg1"/>
             </a:solidFill>
@@ -2867,7 +2871,7 @@
             <a:buNone/>
           </a:pPr>
           <a:r>
-            <a:rPr lang="pl-PL" sz="2000" kern="1200" dirty="0">
+            <a:rPr lang="pl-PL" sz="2000" kern="1200">
               <a:solidFill>
                 <a:schemeClr val="bg1"/>
               </a:solidFill>
@@ -2875,7 +2879,7 @@
             <a:t>IDE, </a:t>
           </a:r>
           <a:r>
-            <a:rPr lang="pl-PL" sz="2000" kern="1200" dirty="0" err="1">
+            <a:rPr lang="pl-PL" sz="2000" kern="1200" err="1">
               <a:solidFill>
                 <a:schemeClr val="bg1"/>
               </a:solidFill>
@@ -2883,7 +2887,7 @@
             <a:t>maven</a:t>
           </a:r>
           <a:r>
-            <a:rPr lang="pl-PL" sz="2000" kern="1200" dirty="0">
+            <a:rPr lang="pl-PL" sz="2000" kern="1200">
               <a:solidFill>
                 <a:schemeClr val="bg1"/>
               </a:solidFill>
@@ -2891,7 +2895,7 @@
             <a:t>, </a:t>
           </a:r>
           <a:r>
-            <a:rPr lang="pl-PL" sz="2000" kern="1200" dirty="0" err="1">
+            <a:rPr lang="pl-PL" sz="2000" kern="1200" err="1">
               <a:solidFill>
                 <a:schemeClr val="bg1"/>
               </a:solidFill>
@@ -2899,7 +2903,7 @@
             <a:t>gradle</a:t>
           </a:r>
           <a:r>
-            <a:rPr lang="pl-PL" sz="2000" kern="1200" dirty="0">
+            <a:rPr lang="pl-PL" sz="2000" kern="1200">
               <a:solidFill>
                 <a:schemeClr val="bg1"/>
               </a:solidFill>
@@ -2977,7 +2981,7 @@
             <a:buNone/>
           </a:pPr>
           <a:r>
-            <a:rPr lang="pl-PL" sz="1400" kern="1200" dirty="0"/>
+            <a:rPr lang="pl-PL" sz="1400" kern="1200"/>
             <a:t>Platform</a:t>
           </a:r>
         </a:p>
@@ -3117,10 +3121,10 @@
             <a:buNone/>
           </a:pPr>
           <a:r>
-            <a:rPr lang="pl-PL" sz="1400" kern="1200" dirty="0" err="1"/>
+            <a:rPr lang="pl-PL" sz="1400" kern="1200" err="1"/>
             <a:t>Vintage</a:t>
           </a:r>
-          <a:endParaRPr lang="pl-PL" sz="1400" kern="1200" dirty="0"/>
+          <a:endParaRPr lang="pl-PL" sz="1400" kern="1200"/>
         </a:p>
       </dsp:txBody>
       <dsp:txXfrm>
@@ -3252,27 +3256,27 @@
             <a:buNone/>
           </a:pPr>
           <a:r>
-            <a:rPr lang="pl-PL" sz="1400" kern="1200" dirty="0" err="1"/>
+            <a:rPr lang="pl-PL" sz="1400" kern="1200" err="1"/>
             <a:t>Old</a:t>
           </a:r>
           <a:r>
-            <a:rPr lang="pl-PL" sz="1400" kern="1200" dirty="0"/>
+            <a:rPr lang="pl-PL" sz="1400" kern="1200"/>
             <a:t> </a:t>
           </a:r>
           <a:r>
-            <a:rPr lang="pl-PL" sz="1400" kern="1200" dirty="0" err="1"/>
+            <a:rPr lang="pl-PL" sz="1400" kern="1200" err="1"/>
             <a:t>tests</a:t>
           </a:r>
           <a:r>
-            <a:rPr lang="pl-PL" sz="1400" kern="1200" dirty="0"/>
+            <a:rPr lang="pl-PL" sz="1400" kern="1200"/>
             <a:t> (</a:t>
           </a:r>
           <a:r>
-            <a:rPr lang="pl-PL" sz="1400" kern="1200" dirty="0" err="1"/>
+            <a:rPr lang="pl-PL" sz="1400" kern="1200" err="1"/>
             <a:t>Junit</a:t>
           </a:r>
           <a:r>
-            <a:rPr lang="pl-PL" sz="1400" kern="1200" dirty="0"/>
+            <a:rPr lang="pl-PL" sz="1400" kern="1200"/>
             <a:t> 4.12)</a:t>
           </a:r>
         </a:p>
@@ -3401,7 +3405,7 @@
             <a:buNone/>
           </a:pPr>
           <a:r>
-            <a:rPr lang="pl-PL" sz="1400" kern="1200" dirty="0"/>
+            <a:rPr lang="pl-PL" sz="1400" kern="1200"/>
             <a:t>Jupiter</a:t>
           </a:r>
         </a:p>
@@ -3530,9 +3534,14 @@
             <a:buNone/>
           </a:pPr>
           <a:r>
-            <a:rPr lang="pl-PL" sz="1400" kern="1200" dirty="0"/>
-            <a:t>Nowe testy</a:t>
+            <a:rPr lang="pl-PL" sz="1400" kern="1200"/>
+            <a:t>New </a:t>
           </a:r>
+          <a:r>
+            <a:rPr lang="pl-PL" sz="1400" kern="1200" err="1"/>
+            <a:t>Tests</a:t>
+          </a:r>
+          <a:endParaRPr lang="pl-PL" sz="1400" kern="1200"/>
         </a:p>
       </dsp:txBody>
       <dsp:txXfrm>
@@ -3665,18 +3674,18 @@
             <a:buNone/>
           </a:pPr>
           <a:r>
-            <a:rPr lang="pl-PL" sz="1400" kern="1200" dirty="0" err="1"/>
+            <a:rPr lang="pl-PL" sz="1400" kern="1200" err="1"/>
             <a:t>External</a:t>
           </a:r>
           <a:r>
-            <a:rPr lang="pl-PL" sz="1400" kern="1200" dirty="0"/>
+            <a:rPr lang="pl-PL" sz="1400" kern="1200"/>
             <a:t> </a:t>
           </a:r>
           <a:r>
-            <a:rPr lang="pl-PL" sz="1400" kern="1200" dirty="0" err="1"/>
+            <a:rPr lang="pl-PL" sz="1400" kern="1200" err="1"/>
             <a:t>libs</a:t>
           </a:r>
-          <a:endParaRPr lang="pl-PL" sz="1400" kern="1200" dirty="0"/>
+          <a:endParaRPr lang="pl-PL" sz="1400" kern="1200"/>
         </a:p>
       </dsp:txBody>
       <dsp:txXfrm>
@@ -3803,11 +3812,11 @@
             <a:buNone/>
           </a:pPr>
           <a:r>
-            <a:rPr lang="pl-PL" sz="1400" kern="1200" dirty="0" err="1"/>
+            <a:rPr lang="pl-PL" sz="1400" kern="1200" err="1"/>
             <a:t>Wiremock</a:t>
           </a:r>
           <a:r>
-            <a:rPr lang="pl-PL" sz="1400" kern="1200" dirty="0"/>
+            <a:rPr lang="pl-PL" sz="1400" kern="1200"/>
             <a:t> etc.</a:t>
           </a:r>
         </a:p>
@@ -4099,7 +4108,6 @@
             <a:rPr lang="pl-PL" sz="1900" kern="1200"/>
             <a:t>DynamicTest</a:t>
           </a:r>
-          <a:endParaRPr lang="pl-PL" sz="1900" kern="1200" dirty="0"/>
         </a:p>
       </dsp:txBody>
       <dsp:txXfrm>
@@ -7999,7 +8007,7 @@
           <a:p>
             <a:fld id="{D767EAEA-49F6-47D1-81B5-6AE13276E2F7}" type="datetimeFigureOut">
               <a:rPr lang="pl-PL" smtClean="0"/>
-              <a:t>31.12.2019</a:t>
+              <a:t>07.01.2020</a:t>
             </a:fld>
             <a:endParaRPr lang="pl-PL"/>
           </a:p>
@@ -8168,7 +8176,7 @@
           <a:p>
             <a:fld id="{153FA37D-DE2B-47E9-A168-88AE1559A114}" type="datetimeFigureOut">
               <a:rPr lang="pl-PL" smtClean="0"/>
-              <a:t>31.12.2019</a:t>
+              <a:t>07.01.2020</a:t>
             </a:fld>
             <a:endParaRPr lang="pl-PL"/>
           </a:p>
@@ -8482,7 +8490,7 @@
               </a:lnSpc>
             </a:pPr>
             <a:r>
-              <a:rPr lang="en-US" sz="1800" kern="1200" baseline="0" dirty="0">
+              <a:rPr lang="en-US" sz="1800" kern="1200" baseline="0">
                 <a:solidFill>
                   <a:schemeClr val="accent1"/>
                 </a:solidFill>
@@ -8493,7 +8501,7 @@
               <a:t>Digital Transformation </a:t>
             </a:r>
             <a:r>
-              <a:rPr lang="en-US" baseline="0" dirty="0">
+              <a:rPr lang="en-US" baseline="0">
                 <a:solidFill>
                   <a:schemeClr val="accent1"/>
                 </a:solidFill>
@@ -8598,7 +8606,7 @@
               </a:lnSpc>
             </a:pPr>
             <a:r>
-              <a:rPr lang="en-US" sz="5200" b="1" i="0" kern="1200" baseline="0" dirty="0">
+              <a:rPr lang="en-US" sz="5200" b="1" i="0" kern="1200" baseline="0">
                 <a:solidFill>
                   <a:schemeClr val="accent1"/>
                 </a:solidFill>
@@ -8608,7 +8616,7 @@
               </a:rPr>
               <a:t>Open Day</a:t>
             </a:r>
-            <a:endParaRPr lang="en-US" sz="5200" b="1" i="0" baseline="0" dirty="0">
+            <a:endParaRPr lang="en-US" sz="5200" b="1" i="0" baseline="0">
               <a:solidFill>
                 <a:schemeClr val="accent1"/>
               </a:solidFill>
@@ -9428,7 +9436,7 @@
               </a:lnSpc>
             </a:pPr>
             <a:r>
-              <a:rPr lang="en-US" sz="1800" kern="1200" baseline="0" dirty="0">
+              <a:rPr lang="en-US" sz="1800" kern="1200" baseline="0">
                 <a:solidFill>
                   <a:schemeClr val="accent1"/>
                 </a:solidFill>
@@ -9439,7 +9447,7 @@
               <a:t>Digital Transformation </a:t>
             </a:r>
             <a:r>
-              <a:rPr lang="en-US" baseline="0" dirty="0">
+              <a:rPr lang="en-US" baseline="0">
                 <a:solidFill>
                   <a:schemeClr val="accent1"/>
                 </a:solidFill>
@@ -9630,7 +9638,7 @@
               </a:lnSpc>
             </a:pPr>
             <a:r>
-              <a:rPr lang="en-US" sz="1800" kern="1200" baseline="0" dirty="0">
+              <a:rPr lang="en-US" sz="1800" kern="1200" baseline="0">
                 <a:solidFill>
                   <a:schemeClr val="accent1"/>
                 </a:solidFill>
@@ -9641,7 +9649,7 @@
               <a:t>Digital Transformation </a:t>
             </a:r>
             <a:r>
-              <a:rPr lang="en-US" baseline="0" dirty="0">
+              <a:rPr lang="en-US" baseline="0">
                 <a:solidFill>
                   <a:schemeClr val="accent1"/>
                 </a:solidFill>
@@ -9915,7 +9923,6 @@
               <a:rPr lang="pl-PL"/>
               <a:t>JUNIT 5</a:t>
             </a:r>
-            <a:endParaRPr lang="pl-PL" dirty="0"/>
           </a:p>
         </p:txBody>
       </p:sp>
@@ -9953,9 +9960,9 @@
           <a:p>
             <a:fld id="{6ABC2847-D563-405E-8397-0B7C61EE83E9}" type="datetime1">
               <a:rPr lang="pl-PL" smtClean="0"/>
-              <a:t>31.12.2019</a:t>
+              <a:t>07.01.2020</a:t>
             </a:fld>
-            <a:endParaRPr lang="pl-PL" dirty="0"/>
+            <a:endParaRPr lang="pl-PL"/>
           </a:p>
         </p:txBody>
       </p:sp>
@@ -10285,7 +10292,6 @@
               <a:rPr lang="pl-PL"/>
               <a:t>JUNIT 5</a:t>
             </a:r>
-            <a:endParaRPr lang="pl-PL" dirty="0"/>
           </a:p>
         </p:txBody>
       </p:sp>
@@ -10323,9 +10329,9 @@
           <a:p>
             <a:fld id="{7C9DD6BB-ED29-4DF0-A5F8-CDA9ED809944}" type="datetime1">
               <a:rPr lang="pl-PL" smtClean="0"/>
-              <a:t>31.12.2019</a:t>
+              <a:t>07.01.2020</a:t>
             </a:fld>
-            <a:endParaRPr lang="pl-PL" dirty="0"/>
+            <a:endParaRPr lang="pl-PL"/>
           </a:p>
         </p:txBody>
       </p:sp>
@@ -11324,7 +11330,6 @@
               <a:rPr lang="pl-PL"/>
               <a:t>JUNIT 5</a:t>
             </a:r>
-            <a:endParaRPr lang="pl-PL" dirty="0"/>
           </a:p>
         </p:txBody>
       </p:sp>
@@ -11362,9 +11367,9 @@
           <a:p>
             <a:fld id="{363E84D8-904F-4DD6-BA64-931BA3F071FC}" type="datetime1">
               <a:rPr lang="pl-PL" smtClean="0"/>
-              <a:t>31.12.2019</a:t>
+              <a:t>07.01.2020</a:t>
             </a:fld>
-            <a:endParaRPr lang="pl-PL" dirty="0"/>
+            <a:endParaRPr lang="pl-PL"/>
           </a:p>
         </p:txBody>
       </p:sp>
@@ -11714,7 +11719,6 @@
               <a:rPr lang="pl-PL"/>
               <a:t>JUNIT 5</a:t>
             </a:r>
-            <a:endParaRPr lang="pl-PL" dirty="0"/>
           </a:p>
         </p:txBody>
       </p:sp>
@@ -11752,9 +11756,9 @@
           <a:p>
             <a:fld id="{5521C838-4F92-4FBA-97C6-BD232D33B69C}" type="datetime1">
               <a:rPr lang="pl-PL" smtClean="0"/>
-              <a:t>31.12.2019</a:t>
+              <a:t>07.01.2020</a:t>
             </a:fld>
-            <a:endParaRPr lang="pl-PL" dirty="0"/>
+            <a:endParaRPr lang="pl-PL"/>
           </a:p>
         </p:txBody>
       </p:sp>
@@ -12241,7 +12245,7 @@
           <a:p>
             <a:fld id="{8F0F4DB8-546D-48B8-840B-A6FFE720481C}" type="datetime1">
               <a:rPr lang="pl-PL" smtClean="0"/>
-              <a:t>31.12.2019</a:t>
+              <a:t>07.01.2020</a:t>
             </a:fld>
             <a:endParaRPr lang="pl-PL"/>
           </a:p>
@@ -12755,14 +12759,14 @@
           <a:lstStyle/>
           <a:p>
             <a:r>
-              <a:rPr lang="pl-PL" sz="2800" dirty="0"/>
+              <a:rPr lang="pl-PL" sz="2800"/>
               <a:t>Basics: Test </a:t>
             </a:r>
             <a:r>
-              <a:rPr lang="pl-PL" sz="2800" dirty="0" err="1"/>
+              <a:rPr lang="pl-PL" sz="2800" err="1"/>
               <a:t>Naming</a:t>
             </a:r>
-            <a:endParaRPr lang="pl-PL" dirty="0"/>
+            <a:endParaRPr lang="pl-PL"/>
           </a:p>
         </p:txBody>
       </p:sp>
@@ -12791,7 +12795,6 @@
               <a:rPr lang="pl-PL"/>
               <a:t>JUNIT 5</a:t>
             </a:r>
-            <a:endParaRPr lang="pl-PL" dirty="0"/>
           </a:p>
         </p:txBody>
       </p:sp>
@@ -12818,9 +12821,9 @@
           <a:p>
             <a:fld id="{6ABC2847-D563-405E-8397-0B7C61EE83E9}" type="datetime1">
               <a:rPr lang="pl-PL" smtClean="0"/>
-              <a:t>31.12.2019</a:t>
+              <a:t>07.01.2020</a:t>
             </a:fld>
-            <a:endParaRPr lang="pl-PL" dirty="0"/>
+            <a:endParaRPr lang="pl-PL"/>
           </a:p>
         </p:txBody>
       </p:sp>
@@ -12846,99 +12849,99 @@
           <a:lstStyle/>
           <a:p>
             <a:r>
-              <a:rPr lang="pl-PL" sz="2800" dirty="0" err="1"/>
+              <a:rPr lang="pl-PL" sz="2800" err="1"/>
               <a:t>Change</a:t>
             </a:r>
             <a:r>
-              <a:rPr lang="pl-PL" sz="2800" dirty="0"/>
+              <a:rPr lang="pl-PL" sz="2800"/>
               <a:t> </a:t>
             </a:r>
             <a:r>
-              <a:rPr lang="pl-PL" sz="2800" dirty="0" err="1"/>
+              <a:rPr lang="pl-PL" sz="2800" err="1"/>
               <a:t>default</a:t>
             </a:r>
             <a:r>
-              <a:rPr lang="pl-PL" sz="2800" dirty="0"/>
+              <a:rPr lang="pl-PL" sz="2800"/>
               <a:t> </a:t>
             </a:r>
             <a:r>
-              <a:rPr lang="pl-PL" sz="2800" dirty="0" err="1"/>
+              <a:rPr lang="pl-PL" sz="2800" err="1"/>
               <a:t>name</a:t>
             </a:r>
-            <a:endParaRPr lang="pl-PL" sz="2800" dirty="0"/>
-          </a:p>
-          <a:p>
-            <a:r>
-              <a:rPr lang="pl-PL" sz="2800" dirty="0"/>
+            <a:endParaRPr lang="pl-PL" sz="2800"/>
+          </a:p>
+          <a:p>
+            <a:r>
+              <a:rPr lang="pl-PL" sz="2800"/>
               <a:t>@</a:t>
             </a:r>
             <a:r>
-              <a:rPr lang="pl-PL" sz="2800" dirty="0" err="1"/>
+              <a:rPr lang="pl-PL" sz="2800" err="1"/>
               <a:t>DisplayName</a:t>
             </a:r>
             <a:r>
-              <a:rPr lang="pl-PL" sz="2800" dirty="0"/>
+              <a:rPr lang="pl-PL" sz="2800"/>
               <a:t> (for standard </a:t>
             </a:r>
             <a:r>
-              <a:rPr lang="pl-PL" sz="2800" dirty="0" err="1"/>
+              <a:rPr lang="pl-PL" sz="2800" err="1"/>
               <a:t>tests</a:t>
             </a:r>
             <a:r>
-              <a:rPr lang="pl-PL" sz="2800" dirty="0"/>
+              <a:rPr lang="pl-PL" sz="2800"/>
               <a:t>)</a:t>
             </a:r>
           </a:p>
           <a:p>
             <a:r>
-              <a:rPr lang="pl-PL" sz="2800" dirty="0" err="1"/>
+              <a:rPr lang="pl-PL" sz="2800" err="1"/>
               <a:t>Mostly</a:t>
             </a:r>
             <a:r>
-              <a:rPr lang="pl-PL" sz="2800" dirty="0"/>
+              <a:rPr lang="pl-PL" sz="2800"/>
               <a:t> </a:t>
             </a:r>
             <a:r>
-              <a:rPr lang="pl-PL" sz="2800" dirty="0" err="1"/>
+              <a:rPr lang="pl-PL" sz="2800" err="1"/>
               <a:t>used</a:t>
             </a:r>
             <a:r>
-              <a:rPr lang="pl-PL" sz="2800" dirty="0"/>
+              <a:rPr lang="pl-PL" sz="2800"/>
               <a:t> in </a:t>
             </a:r>
             <a:r>
-              <a:rPr lang="pl-PL" sz="2800" dirty="0" err="1"/>
+              <a:rPr lang="pl-PL" sz="2800" err="1"/>
               <a:t>Dynamic</a:t>
             </a:r>
             <a:r>
-              <a:rPr lang="pl-PL" sz="2800" dirty="0"/>
+              <a:rPr lang="pl-PL" sz="2800"/>
               <a:t> / </a:t>
             </a:r>
             <a:r>
-              <a:rPr lang="pl-PL" sz="2800" dirty="0" err="1"/>
+              <a:rPr lang="pl-PL" sz="2800" err="1"/>
               <a:t>Parameterized</a:t>
             </a:r>
             <a:r>
-              <a:rPr lang="pl-PL" sz="2800" dirty="0"/>
+              <a:rPr lang="pl-PL" sz="2800"/>
               <a:t> </a:t>
             </a:r>
             <a:r>
-              <a:rPr lang="pl-PL" sz="2800" dirty="0" err="1"/>
+              <a:rPr lang="pl-PL" sz="2800" err="1"/>
               <a:t>Tests</a:t>
             </a:r>
-            <a:endParaRPr lang="pl-PL" sz="2800" dirty="0"/>
+            <a:endParaRPr lang="pl-PL" sz="2800"/>
           </a:p>
           <a:p>
             <a:pPr marL="0" indent="0">
               <a:buNone/>
             </a:pPr>
-            <a:endParaRPr lang="pl-PL" sz="2800" dirty="0"/>
+            <a:endParaRPr lang="pl-PL" sz="2800"/>
           </a:p>
           <a:p>
             <a:pPr marL="0" indent="0">
               <a:buNone/>
             </a:pPr>
-            <a:endParaRPr lang="pl-PL" sz="2800" dirty="0"/>
+            <a:endParaRPr lang="pl-PL" sz="2800"/>
           </a:p>
         </p:txBody>
       </p:sp>
@@ -12994,14 +12997,14 @@
           <a:lstStyle/>
           <a:p>
             <a:r>
-              <a:rPr lang="pl-PL" dirty="0"/>
+              <a:rPr lang="pl-PL"/>
               <a:t>Basics: Test </a:t>
             </a:r>
             <a:r>
-              <a:rPr lang="pl-PL" dirty="0" err="1"/>
+              <a:rPr lang="pl-PL" err="1"/>
               <a:t>Lifecyce</a:t>
             </a:r>
-            <a:endParaRPr lang="pl-PL" dirty="0"/>
+            <a:endParaRPr lang="pl-PL"/>
           </a:p>
         </p:txBody>
       </p:sp>
@@ -13030,7 +13033,6 @@
               <a:rPr lang="pl-PL"/>
               <a:t>JUNIT 5</a:t>
             </a:r>
-            <a:endParaRPr lang="pl-PL" dirty="0"/>
           </a:p>
         </p:txBody>
       </p:sp>
@@ -13057,9 +13059,9 @@
           <a:p>
             <a:fld id="{6ABC2847-D563-405E-8397-0B7C61EE83E9}" type="datetime1">
               <a:rPr lang="pl-PL" smtClean="0"/>
-              <a:t>31.12.2019</a:t>
+              <a:t>07.01.2020</a:t>
             </a:fld>
-            <a:endParaRPr lang="pl-PL" dirty="0"/>
+            <a:endParaRPr lang="pl-PL"/>
           </a:p>
         </p:txBody>
       </p:sp>
@@ -13098,14 +13100,14 @@
               <a:buSzTx/>
             </a:pPr>
             <a:r>
-              <a:rPr lang="pl-PL" altLang="pl-PL" sz="2400" dirty="0"/>
+              <a:rPr lang="pl-PL" altLang="pl-PL" sz="2400"/>
               <a:t>@</a:t>
             </a:r>
             <a:r>
-              <a:rPr lang="pl-PL" altLang="pl-PL" sz="2400" dirty="0" err="1"/>
+              <a:rPr lang="pl-PL" altLang="pl-PL" sz="2400" err="1"/>
               <a:t>BeforeAll</a:t>
             </a:r>
-            <a:endParaRPr lang="pl-PL" altLang="pl-PL" sz="2400" dirty="0"/>
+            <a:endParaRPr lang="pl-PL" altLang="pl-PL" sz="2400"/>
           </a:p>
           <a:p>
             <a:pPr lvl="1" eaLnBrk="0" fontAlgn="base" hangingPunct="0">
@@ -13122,14 +13124,14 @@
               <a:buSzTx/>
             </a:pPr>
             <a:r>
-              <a:rPr lang="pl-PL" altLang="pl-PL" sz="2400" dirty="0"/>
+              <a:rPr lang="pl-PL" altLang="pl-PL" sz="2400"/>
               <a:t>@</a:t>
             </a:r>
             <a:r>
-              <a:rPr lang="pl-PL" altLang="pl-PL" sz="2400" dirty="0" err="1"/>
+              <a:rPr lang="pl-PL" altLang="pl-PL" sz="2400" err="1"/>
               <a:t>BeforeEach</a:t>
             </a:r>
-            <a:endParaRPr lang="pl-PL" altLang="pl-PL" sz="2400" dirty="0"/>
+            <a:endParaRPr lang="pl-PL" altLang="pl-PL" sz="2400"/>
           </a:p>
           <a:p>
             <a:pPr lvl="2" eaLnBrk="0" fontAlgn="base" hangingPunct="0">
@@ -13146,7 +13148,7 @@
               <a:buSzTx/>
             </a:pPr>
             <a:r>
-              <a:rPr lang="pl-PL" altLang="pl-PL" sz="2400" dirty="0"/>
+              <a:rPr lang="pl-PL" altLang="pl-PL" sz="2400"/>
               <a:t>@Test</a:t>
             </a:r>
           </a:p>
@@ -13165,14 +13167,14 @@
               <a:buSzTx/>
             </a:pPr>
             <a:r>
-              <a:rPr lang="pl-PL" altLang="pl-PL" sz="2400" dirty="0"/>
+              <a:rPr lang="pl-PL" altLang="pl-PL" sz="2400"/>
               <a:t>@</a:t>
             </a:r>
             <a:r>
-              <a:rPr lang="pl-PL" altLang="pl-PL" sz="2400" dirty="0" err="1"/>
+              <a:rPr lang="pl-PL" altLang="pl-PL" sz="2400" err="1"/>
               <a:t>AfterEach</a:t>
             </a:r>
-            <a:endParaRPr lang="pl-PL" altLang="pl-PL" sz="2400" dirty="0"/>
+            <a:endParaRPr lang="pl-PL" altLang="pl-PL" sz="2400"/>
           </a:p>
           <a:p>
             <a:pPr eaLnBrk="0" fontAlgn="base" hangingPunct="0">
@@ -13189,17 +13191,17 @@
               <a:buSzTx/>
             </a:pPr>
             <a:r>
-              <a:rPr lang="pl-PL" altLang="pl-PL" sz="2400" dirty="0"/>
+              <a:rPr lang="pl-PL" altLang="pl-PL" sz="2400"/>
               <a:t>@</a:t>
             </a:r>
             <a:r>
-              <a:rPr lang="pl-PL" altLang="pl-PL" sz="2400" dirty="0" err="1"/>
+              <a:rPr lang="pl-PL" altLang="pl-PL" sz="2400" err="1"/>
               <a:t>AfterAll</a:t>
             </a:r>
-            <a:endParaRPr lang="pl-PL" altLang="pl-PL" sz="2400" dirty="0"/>
-          </a:p>
-          <a:p>
-            <a:endParaRPr lang="pl-PL" dirty="0"/>
+            <a:endParaRPr lang="pl-PL" altLang="pl-PL" sz="2400"/>
+          </a:p>
+          <a:p>
+            <a:endParaRPr lang="pl-PL"/>
           </a:p>
         </p:txBody>
       </p:sp>
@@ -13255,22 +13257,22 @@
           <a:lstStyle/>
           <a:p>
             <a:r>
-              <a:rPr lang="pl-PL" dirty="0"/>
+              <a:rPr lang="pl-PL"/>
               <a:t>Basics: </a:t>
             </a:r>
             <a:r>
-              <a:rPr lang="pl-PL" dirty="0" err="1"/>
+              <a:rPr lang="pl-PL" err="1"/>
               <a:t>Nested</a:t>
             </a:r>
             <a:r>
-              <a:rPr lang="pl-PL" dirty="0"/>
+              <a:rPr lang="pl-PL"/>
               <a:t> </a:t>
             </a:r>
             <a:r>
-              <a:rPr lang="pl-PL" dirty="0" err="1"/>
+              <a:rPr lang="pl-PL" err="1"/>
               <a:t>Tests</a:t>
             </a:r>
-            <a:endParaRPr lang="pl-PL" dirty="0"/>
+            <a:endParaRPr lang="pl-PL"/>
           </a:p>
         </p:txBody>
       </p:sp>
@@ -13299,7 +13301,6 @@
               <a:rPr lang="pl-PL"/>
               <a:t>JUNIT 5</a:t>
             </a:r>
-            <a:endParaRPr lang="pl-PL" dirty="0"/>
           </a:p>
         </p:txBody>
       </p:sp>
@@ -13326,9 +13327,9 @@
           <a:p>
             <a:fld id="{6ABC2847-D563-405E-8397-0B7C61EE83E9}" type="datetime1">
               <a:rPr lang="pl-PL" smtClean="0"/>
-              <a:t>31.12.2019</a:t>
+              <a:t>07.01.2020</a:t>
             </a:fld>
-            <a:endParaRPr lang="pl-PL" dirty="0"/>
+            <a:endParaRPr lang="pl-PL"/>
           </a:p>
         </p:txBody>
       </p:sp>
@@ -13367,23 +13368,23 @@
               <a:buSzTx/>
             </a:pPr>
             <a:r>
-              <a:rPr lang="pl-PL" altLang="pl-PL" sz="2400" dirty="0"/>
+              <a:rPr lang="pl-PL" altLang="pl-PL" sz="2400"/>
               <a:t>Using </a:t>
             </a:r>
             <a:r>
-              <a:rPr lang="pl-PL" altLang="pl-PL" sz="2400" dirty="0" err="1"/>
+              <a:rPr lang="pl-PL" altLang="pl-PL" sz="2400" err="1"/>
               <a:t>inner</a:t>
             </a:r>
             <a:r>
-              <a:rPr lang="pl-PL" altLang="pl-PL" sz="2400" dirty="0"/>
+              <a:rPr lang="pl-PL" altLang="pl-PL" sz="2400"/>
               <a:t> </a:t>
             </a:r>
             <a:r>
-              <a:rPr lang="pl-PL" altLang="pl-PL" sz="2400" dirty="0" err="1"/>
+              <a:rPr lang="pl-PL" altLang="pl-PL" sz="2400" err="1"/>
               <a:t>classes</a:t>
             </a:r>
             <a:r>
-              <a:rPr lang="pl-PL" altLang="pl-PL" sz="2400" dirty="0"/>
+              <a:rPr lang="pl-PL" altLang="pl-PL" sz="2400"/>
               <a:t> :</a:t>
             </a:r>
           </a:p>
@@ -13402,31 +13403,31 @@
               <a:buSzTx/>
             </a:pPr>
             <a:r>
-              <a:rPr lang="pl-PL" altLang="pl-PL" sz="2400" dirty="0"/>
+              <a:rPr lang="pl-PL" altLang="pl-PL" sz="2400"/>
               <a:t> `</a:t>
             </a:r>
             <a:r>
-              <a:rPr lang="pl-PL" altLang="pl-PL" sz="2400" dirty="0" err="1"/>
+              <a:rPr lang="pl-PL" altLang="pl-PL" sz="2400" err="1"/>
               <a:t>similar</a:t>
             </a:r>
             <a:r>
-              <a:rPr lang="pl-PL" altLang="pl-PL" sz="2400" dirty="0"/>
+              <a:rPr lang="pl-PL" altLang="pl-PL" sz="2400"/>
               <a:t>` to </a:t>
             </a:r>
             <a:r>
-              <a:rPr lang="pl-PL" altLang="pl-PL" sz="2400" dirty="0" err="1"/>
+              <a:rPr lang="pl-PL" altLang="pl-PL" sz="2400" err="1"/>
               <a:t>describe</a:t>
             </a:r>
             <a:r>
-              <a:rPr lang="pl-PL" altLang="pl-PL" sz="2400" dirty="0"/>
+              <a:rPr lang="pl-PL" altLang="pl-PL" sz="2400"/>
               <a:t> &amp; </a:t>
             </a:r>
             <a:r>
-              <a:rPr lang="pl-PL" altLang="pl-PL" sz="2400" dirty="0" err="1"/>
+              <a:rPr lang="pl-PL" altLang="pl-PL" sz="2400" err="1"/>
               <a:t>it</a:t>
             </a:r>
             <a:r>
-              <a:rPr lang="pl-PL" altLang="pl-PL" sz="2400" dirty="0"/>
+              <a:rPr lang="pl-PL" altLang="pl-PL" sz="2400"/>
               <a:t> in jest, karma etc. </a:t>
             </a:r>
           </a:p>
@@ -13445,46 +13446,46 @@
               <a:buSzTx/>
             </a:pPr>
             <a:r>
-              <a:rPr lang="pl-PL" altLang="pl-PL" sz="2400" dirty="0"/>
+              <a:rPr lang="pl-PL" altLang="pl-PL" sz="2400"/>
               <a:t>@</a:t>
             </a:r>
             <a:r>
-              <a:rPr lang="pl-PL" altLang="pl-PL" sz="2400" dirty="0" err="1"/>
+              <a:rPr lang="pl-PL" altLang="pl-PL" sz="2400" err="1"/>
               <a:t>BeforeAll</a:t>
             </a:r>
             <a:r>
-              <a:rPr lang="pl-PL" altLang="pl-PL" sz="2400" dirty="0"/>
+              <a:rPr lang="pl-PL" altLang="pl-PL" sz="2400"/>
               <a:t> / @</a:t>
             </a:r>
             <a:r>
-              <a:rPr lang="pl-PL" altLang="pl-PL" sz="2400" dirty="0" err="1"/>
+              <a:rPr lang="pl-PL" altLang="pl-PL" sz="2400" err="1"/>
               <a:t>AfterAll</a:t>
             </a:r>
             <a:r>
-              <a:rPr lang="pl-PL" altLang="pl-PL" sz="2400" dirty="0"/>
+              <a:rPr lang="pl-PL" altLang="pl-PL" sz="2400"/>
               <a:t> </a:t>
             </a:r>
             <a:r>
-              <a:rPr lang="pl-PL" altLang="pl-PL" sz="2400" dirty="0" err="1"/>
+              <a:rPr lang="pl-PL" altLang="pl-PL" sz="2400" err="1"/>
               <a:t>works</a:t>
             </a:r>
             <a:r>
-              <a:rPr lang="pl-PL" altLang="pl-PL" sz="2400" dirty="0"/>
+              <a:rPr lang="pl-PL" altLang="pl-PL" sz="2400"/>
               <a:t> </a:t>
             </a:r>
             <a:r>
-              <a:rPr lang="pl-PL" altLang="pl-PL" sz="2400" dirty="0" err="1"/>
+              <a:rPr lang="pl-PL" altLang="pl-PL" sz="2400" err="1"/>
               <a:t>without</a:t>
             </a:r>
             <a:r>
-              <a:rPr lang="pl-PL" altLang="pl-PL" sz="2400" dirty="0"/>
+              <a:rPr lang="pl-PL" altLang="pl-PL" sz="2400"/>
               <a:t> </a:t>
             </a:r>
             <a:r>
-              <a:rPr lang="pl-PL" altLang="pl-PL" sz="2400" dirty="0" err="1"/>
+              <a:rPr lang="pl-PL" altLang="pl-PL" sz="2400" err="1"/>
               <a:t>change</a:t>
             </a:r>
-            <a:endParaRPr lang="pl-PL" altLang="pl-PL" sz="2400" dirty="0"/>
+            <a:endParaRPr lang="pl-PL" altLang="pl-PL" sz="2400"/>
           </a:p>
           <a:p>
             <a:pPr lvl="1" eaLnBrk="0" fontAlgn="base" hangingPunct="0">
@@ -13501,34 +13502,34 @@
               <a:buSzTx/>
             </a:pPr>
             <a:r>
-              <a:rPr lang="pl-PL" altLang="pl-PL" sz="2400" dirty="0" err="1"/>
+              <a:rPr lang="pl-PL" altLang="pl-PL" sz="2400" err="1"/>
               <a:t>Custom</a:t>
             </a:r>
             <a:r>
-              <a:rPr lang="pl-PL" altLang="pl-PL" sz="2400" dirty="0"/>
+              <a:rPr lang="pl-PL" altLang="pl-PL" sz="2400"/>
               <a:t> `</a:t>
             </a:r>
             <a:r>
-              <a:rPr lang="pl-PL" altLang="pl-PL" sz="2400" dirty="0" err="1"/>
+              <a:rPr lang="pl-PL" altLang="pl-PL" sz="2400" err="1"/>
               <a:t>extending</a:t>
             </a:r>
             <a:r>
-              <a:rPr lang="pl-PL" altLang="pl-PL" sz="2400" dirty="0"/>
+              <a:rPr lang="pl-PL" altLang="pl-PL" sz="2400"/>
               <a:t>` of @</a:t>
             </a:r>
             <a:r>
-              <a:rPr lang="pl-PL" altLang="pl-PL" sz="2400" dirty="0" err="1"/>
+              <a:rPr lang="pl-PL" altLang="pl-PL" sz="2400" err="1"/>
               <a:t>BeforeEach</a:t>
             </a:r>
             <a:r>
-              <a:rPr lang="pl-PL" altLang="pl-PL" sz="2400" dirty="0"/>
+              <a:rPr lang="pl-PL" altLang="pl-PL" sz="2400"/>
               <a:t> / @</a:t>
             </a:r>
             <a:r>
-              <a:rPr lang="pl-PL" altLang="pl-PL" sz="2400" dirty="0" err="1"/>
+              <a:rPr lang="pl-PL" altLang="pl-PL" sz="2400" err="1"/>
               <a:t>AfterEach</a:t>
             </a:r>
-            <a:endParaRPr lang="pl-PL" altLang="pl-PL" sz="2400" dirty="0"/>
+            <a:endParaRPr lang="pl-PL" altLang="pl-PL" sz="2400"/>
           </a:p>
           <a:p>
             <a:pPr lvl="1" eaLnBrk="0" fontAlgn="base" hangingPunct="0">
@@ -13545,18 +13546,18 @@
               <a:buSzTx/>
             </a:pPr>
             <a:r>
-              <a:rPr lang="pl-PL" altLang="pl-PL" sz="2400" dirty="0" err="1"/>
+              <a:rPr lang="pl-PL" altLang="pl-PL" sz="2400" err="1"/>
               <a:t>Logical</a:t>
             </a:r>
             <a:r>
-              <a:rPr lang="pl-PL" altLang="pl-PL" sz="2400" dirty="0"/>
+              <a:rPr lang="pl-PL" altLang="pl-PL" sz="2400"/>
               <a:t> </a:t>
             </a:r>
             <a:r>
-              <a:rPr lang="pl-PL" altLang="pl-PL" sz="2400" dirty="0" err="1"/>
+              <a:rPr lang="pl-PL" altLang="pl-PL" sz="2400" err="1"/>
               <a:t>grouping</a:t>
             </a:r>
-            <a:endParaRPr lang="pl-PL" altLang="pl-PL" sz="2400" dirty="0"/>
+            <a:endParaRPr lang="pl-PL" altLang="pl-PL" sz="2400"/>
           </a:p>
           <a:p>
             <a:pPr lvl="1" eaLnBrk="0" fontAlgn="base" hangingPunct="0">
@@ -13572,7 +13573,7 @@
               <a:buClrTx/>
               <a:buSzTx/>
             </a:pPr>
-            <a:endParaRPr lang="pl-PL" altLang="pl-PL" sz="2400" dirty="0"/>
+            <a:endParaRPr lang="pl-PL" altLang="pl-PL" sz="2400"/>
           </a:p>
         </p:txBody>
       </p:sp>
@@ -13628,14 +13629,14 @@
           <a:lstStyle/>
           <a:p>
             <a:r>
-              <a:rPr lang="pl-PL" dirty="0"/>
+              <a:rPr lang="pl-PL"/>
               <a:t>Basics: </a:t>
             </a:r>
             <a:r>
-              <a:rPr lang="pl-PL" dirty="0" err="1"/>
+              <a:rPr lang="pl-PL" err="1"/>
               <a:t>Tags</a:t>
             </a:r>
-            <a:endParaRPr lang="pl-PL" dirty="0"/>
+            <a:endParaRPr lang="pl-PL"/>
           </a:p>
         </p:txBody>
       </p:sp>
@@ -13664,7 +13665,6 @@
               <a:rPr lang="pl-PL"/>
               <a:t>JUNIT 5</a:t>
             </a:r>
-            <a:endParaRPr lang="pl-PL" dirty="0"/>
           </a:p>
         </p:txBody>
       </p:sp>
@@ -13691,9 +13691,9 @@
           <a:p>
             <a:fld id="{6ABC2847-D563-405E-8397-0B7C61EE83E9}" type="datetime1">
               <a:rPr lang="pl-PL" smtClean="0"/>
-              <a:t>31.12.2019</a:t>
+              <a:t>07.01.2020</a:t>
             </a:fld>
-            <a:endParaRPr lang="pl-PL" dirty="0"/>
+            <a:endParaRPr lang="pl-PL"/>
           </a:p>
         </p:txBody>
       </p:sp>
@@ -13732,15 +13732,15 @@
               <a:buSzTx/>
             </a:pPr>
             <a:r>
-              <a:rPr lang="pl-PL" altLang="pl-PL" sz="2400" dirty="0"/>
+              <a:rPr lang="pl-PL" altLang="pl-PL" sz="2400"/>
               <a:t> Test </a:t>
             </a:r>
             <a:r>
-              <a:rPr lang="pl-PL" altLang="pl-PL" sz="2400" dirty="0" err="1"/>
+              <a:rPr lang="pl-PL" altLang="pl-PL" sz="2400" err="1"/>
               <a:t>grouping</a:t>
             </a:r>
             <a:r>
-              <a:rPr lang="pl-PL" altLang="pl-PL" sz="2400" dirty="0"/>
+              <a:rPr lang="pl-PL" altLang="pl-PL" sz="2400"/>
               <a:t> </a:t>
             </a:r>
           </a:p>
@@ -13759,22 +13759,22 @@
               <a:buSzTx/>
             </a:pPr>
             <a:r>
-              <a:rPr lang="pl-PL" altLang="pl-PL" sz="2400" dirty="0"/>
+              <a:rPr lang="pl-PL" altLang="pl-PL" sz="2400"/>
               <a:t>Junit4 @</a:t>
             </a:r>
             <a:r>
-              <a:rPr lang="pl-PL" altLang="pl-PL" sz="2400" dirty="0" err="1"/>
+              <a:rPr lang="pl-PL" altLang="pl-PL" sz="2400" err="1"/>
               <a:t>IncludeCategory</a:t>
             </a:r>
             <a:r>
-              <a:rPr lang="pl-PL" altLang="pl-PL" sz="2400" dirty="0"/>
+              <a:rPr lang="pl-PL" altLang="pl-PL" sz="2400"/>
               <a:t> / @</a:t>
             </a:r>
             <a:r>
-              <a:rPr lang="pl-PL" altLang="pl-PL" sz="2400" dirty="0" err="1"/>
+              <a:rPr lang="pl-PL" altLang="pl-PL" sz="2400" err="1"/>
               <a:t>ExcludeCategory</a:t>
             </a:r>
-            <a:endParaRPr lang="pl-PL" altLang="pl-PL" sz="2400" dirty="0"/>
+            <a:endParaRPr lang="pl-PL" altLang="pl-PL" sz="2400"/>
           </a:p>
         </p:txBody>
       </p:sp>
@@ -13830,18 +13830,18 @@
           <a:lstStyle/>
           <a:p>
             <a:r>
-              <a:rPr lang="pl-PL" dirty="0" err="1"/>
+              <a:rPr lang="pl-PL" err="1"/>
               <a:t>Conditional</a:t>
             </a:r>
             <a:r>
-              <a:rPr lang="pl-PL" dirty="0"/>
+              <a:rPr lang="pl-PL"/>
               <a:t> </a:t>
             </a:r>
             <a:r>
-              <a:rPr lang="pl-PL" dirty="0" err="1"/>
+              <a:rPr lang="pl-PL" err="1"/>
               <a:t>Tests</a:t>
             </a:r>
-            <a:endParaRPr lang="pl-PL" dirty="0"/>
+            <a:endParaRPr lang="pl-PL"/>
           </a:p>
         </p:txBody>
       </p:sp>
@@ -13867,7 +13867,7 @@
           <a:lstStyle/>
           <a:p>
             <a:r>
-              <a:rPr lang="pl-PL" dirty="0"/>
+              <a:rPr lang="pl-PL"/>
               <a:t>JUNIT 5</a:t>
             </a:r>
           </a:p>
@@ -13896,9 +13896,9 @@
           <a:p>
             <a:fld id="{6ABC2847-D563-405E-8397-0B7C61EE83E9}" type="datetime1">
               <a:rPr lang="pl-PL" smtClean="0"/>
-              <a:t>31.12.2019</a:t>
+              <a:t>07.01.2020</a:t>
             </a:fld>
-            <a:endParaRPr lang="pl-PL" dirty="0"/>
+            <a:endParaRPr lang="pl-PL"/>
           </a:p>
         </p:txBody>
       </p:sp>
@@ -13924,107 +13924,107 @@
           <a:lstStyle/>
           <a:p>
             <a:r>
-              <a:rPr lang="pl-PL" sz="2000" dirty="0"/>
+              <a:rPr lang="pl-PL" sz="2000"/>
               <a:t>@</a:t>
             </a:r>
             <a:r>
-              <a:rPr lang="pl-PL" sz="2000" dirty="0" err="1"/>
+              <a:rPr lang="pl-PL" sz="2000" err="1"/>
               <a:t>Disabled</a:t>
             </a:r>
-            <a:endParaRPr lang="pl-PL" sz="2000" dirty="0"/>
-          </a:p>
-          <a:p>
-            <a:r>
-              <a:rPr lang="pl-PL" sz="2000" dirty="0"/>
+            <a:endParaRPr lang="pl-PL" sz="2000"/>
+          </a:p>
+          <a:p>
+            <a:r>
+              <a:rPr lang="pl-PL" sz="2000"/>
               <a:t>@</a:t>
             </a:r>
             <a:r>
-              <a:rPr lang="pl-PL" sz="2000" dirty="0" err="1"/>
+              <a:rPr lang="pl-PL" sz="2000" err="1"/>
               <a:t>DisabledOnOs</a:t>
             </a:r>
             <a:r>
-              <a:rPr lang="pl-PL" sz="2000" dirty="0"/>
+              <a:rPr lang="pl-PL" sz="2000"/>
               <a:t> / @</a:t>
             </a:r>
             <a:r>
-              <a:rPr lang="pl-PL" sz="2000" dirty="0" err="1"/>
+              <a:rPr lang="pl-PL" sz="2000" err="1"/>
               <a:t>EnabledOnOs</a:t>
             </a:r>
-            <a:endParaRPr lang="pl-PL" sz="2000" dirty="0"/>
-          </a:p>
-          <a:p>
-            <a:r>
-              <a:rPr lang="pl-PL" sz="2000" dirty="0"/>
+            <a:endParaRPr lang="pl-PL" sz="2000"/>
+          </a:p>
+          <a:p>
+            <a:r>
+              <a:rPr lang="pl-PL" sz="2000"/>
               <a:t>@</a:t>
             </a:r>
             <a:r>
-              <a:rPr lang="pl-PL" sz="2000" dirty="0" err="1"/>
+              <a:rPr lang="pl-PL" sz="2000" err="1"/>
               <a:t>DisabledOnJre</a:t>
             </a:r>
             <a:r>
-              <a:rPr lang="pl-PL" sz="2000" dirty="0"/>
+              <a:rPr lang="pl-PL" sz="2000"/>
               <a:t> / @</a:t>
             </a:r>
             <a:r>
-              <a:rPr lang="pl-PL" sz="2000" dirty="0" err="1"/>
+              <a:rPr lang="pl-PL" sz="2000" err="1"/>
               <a:t>EnabledOnJre</a:t>
             </a:r>
-            <a:endParaRPr lang="pl-PL" sz="2000" dirty="0"/>
-          </a:p>
-          <a:p>
-            <a:r>
-              <a:rPr lang="pl-PL" sz="2000" dirty="0"/>
+            <a:endParaRPr lang="pl-PL" sz="2000"/>
+          </a:p>
+          <a:p>
+            <a:r>
+              <a:rPr lang="pl-PL" sz="2000"/>
               <a:t>@</a:t>
             </a:r>
             <a:r>
-              <a:rPr lang="pl-PL" sz="2000" dirty="0" err="1"/>
+              <a:rPr lang="pl-PL" sz="2000" err="1"/>
               <a:t>DisabledIfSystemProperty</a:t>
             </a:r>
             <a:r>
-              <a:rPr lang="pl-PL" sz="2000" dirty="0"/>
+              <a:rPr lang="pl-PL" sz="2000"/>
               <a:t> / @</a:t>
             </a:r>
             <a:r>
-              <a:rPr lang="pl-PL" sz="2000" dirty="0" err="1"/>
+              <a:rPr lang="pl-PL" sz="2000" err="1"/>
               <a:t>EnabledIfSystemProperty</a:t>
             </a:r>
-            <a:endParaRPr lang="pl-PL" sz="2000" dirty="0"/>
-          </a:p>
-          <a:p>
-            <a:r>
-              <a:rPr lang="pl-PL" sz="2000" dirty="0"/>
+            <a:endParaRPr lang="pl-PL" sz="2000"/>
+          </a:p>
+          <a:p>
+            <a:r>
+              <a:rPr lang="pl-PL" sz="2000"/>
               <a:t>@</a:t>
             </a:r>
             <a:r>
-              <a:rPr lang="pl-PL" sz="2000" dirty="0" err="1"/>
+              <a:rPr lang="pl-PL" sz="2000" err="1"/>
               <a:t>DisabledIfEnvironmentVariable</a:t>
             </a:r>
             <a:r>
-              <a:rPr lang="pl-PL" sz="2000" dirty="0"/>
+              <a:rPr lang="pl-PL" sz="2000"/>
               <a:t> / @</a:t>
             </a:r>
             <a:r>
-              <a:rPr lang="pl-PL" sz="2000" dirty="0" err="1"/>
+              <a:rPr lang="pl-PL" sz="2000" err="1"/>
               <a:t>EnabledIfEnvironmentVariable</a:t>
             </a:r>
-            <a:endParaRPr lang="pl-PL" sz="2000" dirty="0"/>
-          </a:p>
-          <a:p>
-            <a:r>
-              <a:rPr lang="pl-PL" sz="2000" dirty="0"/>
+            <a:endParaRPr lang="pl-PL" sz="2000"/>
+          </a:p>
+          <a:p>
+            <a:r>
+              <a:rPr lang="pl-PL" sz="2000"/>
               <a:t>Test </a:t>
             </a:r>
             <a:r>
-              <a:rPr lang="pl-PL" sz="2000" dirty="0" err="1"/>
+              <a:rPr lang="pl-PL" sz="2000" err="1"/>
               <a:t>Extention</a:t>
             </a:r>
             <a:r>
-              <a:rPr lang="pl-PL" sz="2000" dirty="0"/>
+              <a:rPr lang="pl-PL" sz="2000"/>
               <a:t> </a:t>
             </a:r>
           </a:p>
           <a:p>
-            <a:endParaRPr lang="pl-PL" dirty="0"/>
+            <a:endParaRPr lang="pl-PL"/>
           </a:p>
         </p:txBody>
       </p:sp>
@@ -14080,18 +14080,18 @@
           <a:lstStyle/>
           <a:p>
             <a:r>
-              <a:rPr lang="pl-PL" dirty="0" err="1"/>
+              <a:rPr lang="pl-PL" err="1"/>
               <a:t>Dynamic</a:t>
             </a:r>
             <a:r>
-              <a:rPr lang="pl-PL" dirty="0"/>
+              <a:rPr lang="pl-PL"/>
               <a:t> </a:t>
             </a:r>
             <a:r>
-              <a:rPr lang="pl-PL" dirty="0" err="1"/>
+              <a:rPr lang="pl-PL" err="1"/>
               <a:t>Tests</a:t>
             </a:r>
-            <a:endParaRPr lang="pl-PL" dirty="0"/>
+            <a:endParaRPr lang="pl-PL"/>
           </a:p>
         </p:txBody>
       </p:sp>
@@ -14120,7 +14120,6 @@
               <a:rPr lang="pl-PL"/>
               <a:t>JUNIT 5</a:t>
             </a:r>
-            <a:endParaRPr lang="pl-PL" dirty="0"/>
           </a:p>
         </p:txBody>
       </p:sp>
@@ -14147,9 +14146,9 @@
           <a:p>
             <a:fld id="{6ABC2847-D563-405E-8397-0B7C61EE83E9}" type="datetime1">
               <a:rPr lang="pl-PL" smtClean="0"/>
-              <a:t>31.12.2019</a:t>
+              <a:t>07.01.2020</a:t>
             </a:fld>
-            <a:endParaRPr lang="pl-PL" dirty="0"/>
+            <a:endParaRPr lang="pl-PL"/>
           </a:p>
         </p:txBody>
       </p:sp>
@@ -14175,89 +14174,89 @@
           <a:lstStyle/>
           <a:p>
             <a:r>
-              <a:rPr lang="pl-PL" sz="2400" dirty="0"/>
+              <a:rPr lang="pl-PL" sz="2400"/>
               <a:t>We </a:t>
             </a:r>
             <a:r>
-              <a:rPr lang="pl-PL" sz="2400" dirty="0" err="1"/>
+              <a:rPr lang="pl-PL" sz="2400" err="1"/>
               <a:t>can</a:t>
             </a:r>
             <a:r>
-              <a:rPr lang="pl-PL" sz="2400" dirty="0"/>
+              <a:rPr lang="pl-PL" sz="2400"/>
               <a:t> </a:t>
             </a:r>
             <a:r>
-              <a:rPr lang="pl-PL" sz="2400" dirty="0" err="1"/>
+              <a:rPr lang="pl-PL" sz="2400" err="1"/>
               <a:t>add</a:t>
             </a:r>
             <a:r>
-              <a:rPr lang="pl-PL" sz="2400" dirty="0"/>
+              <a:rPr lang="pl-PL" sz="2400"/>
               <a:t> test </a:t>
             </a:r>
             <a:r>
-              <a:rPr lang="pl-PL" sz="2400" dirty="0" err="1"/>
+              <a:rPr lang="pl-PL" sz="2400" err="1"/>
               <a:t>at</a:t>
             </a:r>
             <a:r>
-              <a:rPr lang="pl-PL" sz="2400" dirty="0"/>
+              <a:rPr lang="pl-PL" sz="2400"/>
               <a:t> </a:t>
             </a:r>
             <a:r>
-              <a:rPr lang="pl-PL" sz="2400" dirty="0" err="1"/>
+              <a:rPr lang="pl-PL" sz="2400" err="1"/>
               <a:t>runtime</a:t>
             </a:r>
-            <a:endParaRPr lang="pl-PL" sz="2400" dirty="0"/>
-          </a:p>
-          <a:p>
-            <a:r>
-              <a:rPr lang="pl-PL" sz="2400" dirty="0"/>
+            <a:endParaRPr lang="pl-PL" sz="2400"/>
+          </a:p>
+          <a:p>
+            <a:r>
+              <a:rPr lang="pl-PL" sz="2400"/>
               <a:t>We </a:t>
             </a:r>
             <a:r>
-              <a:rPr lang="pl-PL" sz="2400" dirty="0" err="1"/>
+              <a:rPr lang="pl-PL" sz="2400" err="1"/>
               <a:t>can</a:t>
             </a:r>
             <a:r>
-              <a:rPr lang="pl-PL" sz="2400" dirty="0"/>
+              <a:rPr lang="pl-PL" sz="2400"/>
               <a:t> </a:t>
             </a:r>
             <a:r>
-              <a:rPr lang="pl-PL" sz="2400" dirty="0" err="1"/>
+              <a:rPr lang="pl-PL" sz="2400" err="1"/>
               <a:t>generate</a:t>
             </a:r>
             <a:r>
-              <a:rPr lang="pl-PL" sz="2400" dirty="0"/>
+              <a:rPr lang="pl-PL" sz="2400"/>
               <a:t> </a:t>
             </a:r>
             <a:r>
-              <a:rPr lang="pl-PL" sz="2400" dirty="0" err="1"/>
+              <a:rPr lang="pl-PL" sz="2400" err="1"/>
               <a:t>tests</a:t>
             </a:r>
             <a:r>
-              <a:rPr lang="pl-PL" sz="2400" dirty="0"/>
+              <a:rPr lang="pl-PL" sz="2400"/>
               <a:t> </a:t>
             </a:r>
             <a:r>
-              <a:rPr lang="pl-PL" sz="2400" dirty="0" err="1"/>
+              <a:rPr lang="pl-PL" sz="2400" err="1"/>
               <a:t>instead</a:t>
             </a:r>
             <a:r>
-              <a:rPr lang="pl-PL" sz="2400" dirty="0"/>
+              <a:rPr lang="pl-PL" sz="2400"/>
               <a:t> </a:t>
             </a:r>
             <a:r>
-              <a:rPr lang="pl-PL" sz="2400" dirty="0" err="1"/>
+              <a:rPr lang="pl-PL" sz="2400" err="1"/>
               <a:t>copy</a:t>
             </a:r>
             <a:r>
-              <a:rPr lang="pl-PL" sz="2400" dirty="0"/>
+              <a:rPr lang="pl-PL" sz="2400"/>
               <a:t> / </a:t>
             </a:r>
             <a:r>
-              <a:rPr lang="pl-PL" sz="2400" dirty="0" err="1"/>
+              <a:rPr lang="pl-PL" sz="2400" err="1"/>
               <a:t>paste</a:t>
             </a:r>
-            <a:endParaRPr lang="pl-PL" sz="2400" dirty="0"/>
+            <a:endParaRPr lang="pl-PL" sz="2400"/>
           </a:p>
         </p:txBody>
       </p:sp>
@@ -14346,18 +14345,18 @@
           <a:lstStyle/>
           <a:p>
             <a:r>
-              <a:rPr lang="pl-PL" dirty="0" err="1"/>
+              <a:rPr lang="pl-PL" err="1"/>
               <a:t>Parameterized</a:t>
             </a:r>
             <a:r>
-              <a:rPr lang="pl-PL" dirty="0"/>
+              <a:rPr lang="pl-PL"/>
               <a:t> </a:t>
             </a:r>
             <a:r>
-              <a:rPr lang="pl-PL" dirty="0" err="1"/>
+              <a:rPr lang="pl-PL" err="1"/>
               <a:t>tests</a:t>
             </a:r>
-            <a:endParaRPr lang="pl-PL" dirty="0"/>
+            <a:endParaRPr lang="pl-PL"/>
           </a:p>
         </p:txBody>
       </p:sp>
@@ -14386,7 +14385,6 @@
               <a:rPr lang="pl-PL"/>
               <a:t>JUNIT 5</a:t>
             </a:r>
-            <a:endParaRPr lang="pl-PL" dirty="0"/>
           </a:p>
         </p:txBody>
       </p:sp>
@@ -14413,9 +14411,9 @@
           <a:p>
             <a:fld id="{6ABC2847-D563-405E-8397-0B7C61EE83E9}" type="datetime1">
               <a:rPr lang="pl-PL" smtClean="0"/>
-              <a:t>31.12.2019</a:t>
+              <a:t>07.01.2020</a:t>
             </a:fld>
-            <a:endParaRPr lang="pl-PL" dirty="0"/>
+            <a:endParaRPr lang="pl-PL"/>
           </a:p>
         </p:txBody>
       </p:sp>
@@ -14441,103 +14439,102 @@
           <a:lstStyle/>
           <a:p>
             <a:r>
-              <a:rPr lang="pl-PL" sz="2400" dirty="0"/>
+              <a:rPr lang="pl-PL" sz="2400"/>
               <a:t>org.junit.jupiter:junit-jupiter-params:5*  (5.5.2)</a:t>
             </a:r>
           </a:p>
           <a:p>
-            <a:endParaRPr lang="pl-PL" sz="2400" dirty="0"/>
-          </a:p>
-          <a:p>
-            <a:r>
-              <a:rPr lang="pl-PL" sz="2400" dirty="0" err="1"/>
+            <a:endParaRPr lang="pl-PL" sz="2400"/>
+          </a:p>
+          <a:p>
+            <a:r>
+              <a:rPr lang="pl-PL" sz="2400" err="1"/>
               <a:t>Instad</a:t>
-            </a:r>
-            <a:r>
-              <a:rPr lang="pl-PL" sz="2400" dirty="0"/>
-              <a:t> </a:t>
-            </a:r>
-            <a:r>
-              <a:rPr lang="pl-PL" sz="2400" dirty="0" err="1"/>
-              <a:t>Generate</a:t>
-            </a:r>
-            <a:r>
-              <a:rPr lang="pl-PL" sz="2400" dirty="0"/>
-              <a:t> </a:t>
-            </a:r>
-            <a:r>
-              <a:rPr lang="pl-PL" sz="2400" dirty="0" err="1"/>
-              <a:t>Tests</a:t>
-            </a:r>
-            <a:r>
-              <a:rPr lang="pl-PL" sz="2400" dirty="0"/>
-              <a:t> – pass </a:t>
-            </a:r>
-            <a:r>
-              <a:rPr lang="pl-PL" sz="2400" dirty="0" err="1"/>
-              <a:t>parameters</a:t>
-            </a:r>
-            <a:r>
-              <a:rPr lang="pl-PL" sz="2400" dirty="0"/>
-              <a:t> to </a:t>
-            </a:r>
-            <a:r>
-              <a:rPr lang="pl-PL" sz="2400" dirty="0" err="1"/>
-              <a:t>tests</a:t>
             </a:r>
             <a:r>
               <a:rPr lang="pl-PL" sz="2400"/>
               <a:t> </a:t>
             </a:r>
-            <a:endParaRPr lang="pl-PL" sz="2400" dirty="0"/>
-          </a:p>
-          <a:p>
-            <a:r>
-              <a:rPr lang="pl-PL" sz="2400" dirty="0"/>
+            <a:r>
+              <a:rPr lang="pl-PL" sz="2400" err="1"/>
+              <a:t>Generate</a:t>
+            </a:r>
+            <a:r>
+              <a:rPr lang="pl-PL" sz="2400"/>
+              <a:t> </a:t>
+            </a:r>
+            <a:r>
+              <a:rPr lang="pl-PL" sz="2400" err="1"/>
+              <a:t>Tests</a:t>
+            </a:r>
+            <a:r>
+              <a:rPr lang="pl-PL" sz="2400"/>
+              <a:t> – pass </a:t>
+            </a:r>
+            <a:r>
+              <a:rPr lang="pl-PL" sz="2400" err="1"/>
+              <a:t>parameters</a:t>
+            </a:r>
+            <a:r>
+              <a:rPr lang="pl-PL" sz="2400"/>
+              <a:t> to </a:t>
+            </a:r>
+            <a:r>
+              <a:rPr lang="pl-PL" sz="2400" err="1"/>
+              <a:t>tests</a:t>
+            </a:r>
+            <a:r>
+              <a:rPr lang="pl-PL" sz="2400"/>
+              <a:t> </a:t>
+            </a:r>
+          </a:p>
+          <a:p>
+            <a:r>
+              <a:rPr lang="pl-PL" sz="2400"/>
               <a:t>@</a:t>
             </a:r>
             <a:r>
-              <a:rPr lang="pl-PL" sz="2400" dirty="0" err="1"/>
+              <a:rPr lang="pl-PL" sz="2400" err="1"/>
               <a:t>ParameterizedTest</a:t>
             </a:r>
-            <a:endParaRPr lang="pl-PL" sz="2400" dirty="0"/>
-          </a:p>
-          <a:p>
-            <a:r>
-              <a:rPr lang="pl-PL" sz="2400" dirty="0" err="1"/>
+            <a:endParaRPr lang="pl-PL" sz="2400"/>
+          </a:p>
+          <a:p>
+            <a:r>
+              <a:rPr lang="pl-PL" sz="2400" err="1"/>
               <a:t>Some</a:t>
             </a:r>
             <a:r>
-              <a:rPr lang="pl-PL" sz="2400" dirty="0"/>
+              <a:rPr lang="pl-PL" sz="2400"/>
               <a:t> </a:t>
             </a:r>
             <a:r>
-              <a:rPr lang="pl-PL" sz="2400" dirty="0" err="1"/>
+              <a:rPr lang="pl-PL" sz="2400" err="1"/>
               <a:t>kind</a:t>
             </a:r>
             <a:r>
-              <a:rPr lang="pl-PL" sz="2400" dirty="0"/>
+              <a:rPr lang="pl-PL" sz="2400"/>
               <a:t> of </a:t>
             </a:r>
             <a:r>
-              <a:rPr lang="pl-PL" sz="2400" dirty="0" err="1"/>
+              <a:rPr lang="pl-PL" sz="2400" err="1"/>
               <a:t>source</a:t>
             </a:r>
             <a:r>
-              <a:rPr lang="pl-PL" sz="2400" dirty="0"/>
+              <a:rPr lang="pl-PL" sz="2400"/>
               <a:t> of </a:t>
             </a:r>
             <a:r>
-              <a:rPr lang="pl-PL" sz="2400" dirty="0" err="1"/>
+              <a:rPr lang="pl-PL" sz="2400" err="1"/>
               <a:t>parameters</a:t>
             </a:r>
-            <a:endParaRPr lang="pl-PL" sz="2400" dirty="0"/>
-          </a:p>
-          <a:p>
-            <a:endParaRPr lang="pl-PL" sz="2400" dirty="0"/>
-          </a:p>
-          <a:p>
-            <a:endParaRPr lang="pl-PL" dirty="0"/>
+            <a:endParaRPr lang="pl-PL" sz="2400"/>
+          </a:p>
+          <a:p>
+            <a:endParaRPr lang="pl-PL" sz="2400"/>
+          </a:p>
+          <a:p>
+            <a:endParaRPr lang="pl-PL"/>
           </a:p>
         </p:txBody>
       </p:sp>
@@ -14593,7 +14590,7 @@
           <a:lstStyle/>
           <a:p>
             <a:r>
-              <a:rPr lang="pl-PL" dirty="0"/>
+              <a:rPr lang="pl-PL"/>
               <a:t>Test Extension</a:t>
             </a:r>
           </a:p>
@@ -14624,7 +14621,6 @@
               <a:rPr lang="pl-PL"/>
               <a:t>JUNIT 5</a:t>
             </a:r>
-            <a:endParaRPr lang="pl-PL" dirty="0"/>
           </a:p>
         </p:txBody>
       </p:sp>
@@ -14651,9 +14647,9 @@
           <a:p>
             <a:fld id="{6ABC2847-D563-405E-8397-0B7C61EE83E9}" type="datetime1">
               <a:rPr lang="pl-PL" smtClean="0"/>
-              <a:t>31.12.2019</a:t>
+              <a:t>07.01.2020</a:t>
             </a:fld>
-            <a:endParaRPr lang="pl-PL" dirty="0"/>
+            <a:endParaRPr lang="pl-PL"/>
           </a:p>
         </p:txBody>
       </p:sp>
@@ -14679,258 +14675,258 @@
           <a:lstStyle/>
           <a:p>
             <a:r>
-              <a:rPr lang="pl-PL" sz="2000" dirty="0" err="1"/>
+              <a:rPr lang="pl-PL" sz="2000" err="1"/>
               <a:t>Extention</a:t>
             </a:r>
             <a:r>
-              <a:rPr lang="pl-PL" sz="2000" dirty="0"/>
+              <a:rPr lang="pl-PL" sz="2000"/>
               <a:t> </a:t>
             </a:r>
             <a:r>
-              <a:rPr lang="pl-PL" sz="2000" dirty="0" err="1"/>
+              <a:rPr lang="pl-PL" sz="2000" err="1"/>
               <a:t>points</a:t>
             </a:r>
             <a:r>
-              <a:rPr lang="pl-PL" sz="2000" dirty="0"/>
+              <a:rPr lang="pl-PL" sz="2000"/>
               <a:t> (</a:t>
             </a:r>
             <a:r>
-              <a:rPr lang="pl-PL" sz="2000" dirty="0" err="1"/>
+              <a:rPr lang="pl-PL" sz="2000" err="1"/>
               <a:t>Lifecycle</a:t>
             </a:r>
             <a:r>
-              <a:rPr lang="pl-PL" sz="2000" dirty="0"/>
+              <a:rPr lang="pl-PL" sz="2000"/>
               <a:t> </a:t>
             </a:r>
             <a:r>
-              <a:rPr lang="pl-PL" sz="2000" dirty="0" err="1"/>
+              <a:rPr lang="pl-PL" sz="2000" err="1"/>
               <a:t>annotation</a:t>
             </a:r>
             <a:r>
-              <a:rPr lang="pl-PL" sz="2000" dirty="0"/>
+              <a:rPr lang="pl-PL" sz="2000"/>
               <a:t> + much </a:t>
             </a:r>
             <a:r>
-              <a:rPr lang="pl-PL" sz="2000" dirty="0" err="1"/>
+              <a:rPr lang="pl-PL" sz="2000" err="1"/>
               <a:t>more</a:t>
             </a:r>
             <a:r>
-              <a:rPr lang="pl-PL" sz="2000" dirty="0"/>
+              <a:rPr lang="pl-PL" sz="2000"/>
               <a:t>)</a:t>
             </a:r>
           </a:p>
           <a:p>
             <a:r>
-              <a:rPr lang="pl-PL" sz="2000" dirty="0"/>
+              <a:rPr lang="pl-PL" sz="2000"/>
               <a:t>Extension </a:t>
             </a:r>
             <a:r>
-              <a:rPr lang="pl-PL" sz="2000" dirty="0" err="1"/>
+              <a:rPr lang="pl-PL" sz="2000" err="1"/>
               <a:t>Context</a:t>
             </a:r>
-            <a:endParaRPr lang="pl-PL" sz="2000" dirty="0"/>
-          </a:p>
-          <a:p>
-            <a:r>
-              <a:rPr lang="pl-PL" sz="2000" dirty="0"/>
+            <a:endParaRPr lang="pl-PL" sz="2000"/>
+          </a:p>
+          <a:p>
+            <a:r>
+              <a:rPr lang="pl-PL" sz="2000"/>
               <a:t>Extensions :</a:t>
             </a:r>
           </a:p>
           <a:p>
             <a:pPr lvl="1"/>
             <a:r>
-              <a:rPr lang="pl-PL" sz="2000" dirty="0" err="1"/>
+              <a:rPr lang="pl-PL" sz="2000" err="1"/>
               <a:t>Stateless</a:t>
             </a:r>
-            <a:endParaRPr lang="pl-PL" sz="2000" dirty="0"/>
+            <a:endParaRPr lang="pl-PL" sz="2000"/>
           </a:p>
           <a:p>
             <a:pPr lvl="1"/>
             <a:r>
-              <a:rPr lang="pl-PL" sz="2000" dirty="0" err="1"/>
+              <a:rPr lang="pl-PL" sz="2000" err="1"/>
               <a:t>Use</a:t>
             </a:r>
             <a:r>
-              <a:rPr lang="pl-PL" sz="2000" dirty="0"/>
+              <a:rPr lang="pl-PL" sz="2000"/>
               <a:t> Extension </a:t>
             </a:r>
             <a:r>
-              <a:rPr lang="pl-PL" sz="2000" dirty="0" err="1"/>
+              <a:rPr lang="pl-PL" sz="2000" err="1"/>
               <a:t>Context</a:t>
             </a:r>
             <a:r>
-              <a:rPr lang="pl-PL" sz="2000" dirty="0"/>
+              <a:rPr lang="pl-PL" sz="2000"/>
               <a:t> </a:t>
             </a:r>
             <a:r>
-              <a:rPr lang="pl-PL" sz="2000" dirty="0" err="1"/>
+              <a:rPr lang="pl-PL" sz="2000" err="1"/>
               <a:t>Store</a:t>
             </a:r>
             <a:r>
-              <a:rPr lang="pl-PL" sz="2000" dirty="0"/>
+              <a:rPr lang="pl-PL" sz="2000"/>
               <a:t> </a:t>
             </a:r>
             <a:r>
-              <a:rPr lang="pl-PL" sz="2000" dirty="0" err="1"/>
+              <a:rPr lang="pl-PL" sz="2000" err="1"/>
               <a:t>which</a:t>
             </a:r>
             <a:r>
-              <a:rPr lang="pl-PL" sz="2000" dirty="0"/>
+              <a:rPr lang="pl-PL" sz="2000"/>
               <a:t>:</a:t>
             </a:r>
           </a:p>
           <a:p>
             <a:pPr lvl="2"/>
             <a:r>
-              <a:rPr lang="pl-PL" sz="2000" dirty="0" err="1"/>
+              <a:rPr lang="pl-PL" sz="2000" err="1"/>
               <a:t>use</a:t>
             </a:r>
             <a:r>
-              <a:rPr lang="pl-PL" sz="2000" dirty="0"/>
+              <a:rPr lang="pl-PL" sz="2000"/>
               <a:t> </a:t>
             </a:r>
             <a:r>
-              <a:rPr lang="pl-PL" sz="2000" dirty="0" err="1"/>
+              <a:rPr lang="pl-PL" sz="2000" err="1"/>
               <a:t>namespace</a:t>
             </a:r>
             <a:r>
-              <a:rPr lang="pl-PL" sz="2000" dirty="0"/>
+              <a:rPr lang="pl-PL" sz="2000"/>
               <a:t> to </a:t>
             </a:r>
             <a:r>
-              <a:rPr lang="pl-PL" sz="2000" dirty="0" err="1"/>
+              <a:rPr lang="pl-PL" sz="2000" err="1"/>
               <a:t>separate</a:t>
             </a:r>
             <a:r>
-              <a:rPr lang="pl-PL" sz="2000" dirty="0"/>
+              <a:rPr lang="pl-PL" sz="2000"/>
               <a:t> </a:t>
             </a:r>
             <a:r>
-              <a:rPr lang="pl-PL" sz="2000" dirty="0" err="1"/>
+              <a:rPr lang="pl-PL" sz="2000" err="1"/>
               <a:t>extentions</a:t>
             </a:r>
             <a:r>
-              <a:rPr lang="pl-PL" sz="2000" dirty="0"/>
+              <a:rPr lang="pl-PL" sz="2000"/>
               <a:t> data</a:t>
             </a:r>
           </a:p>
           <a:p>
             <a:pPr lvl="2"/>
             <a:r>
-              <a:rPr lang="pl-PL" sz="2000" dirty="0" err="1"/>
+              <a:rPr lang="pl-PL" sz="2000" err="1"/>
               <a:t>Use</a:t>
             </a:r>
             <a:r>
-              <a:rPr lang="pl-PL" sz="2000" dirty="0"/>
+              <a:rPr lang="pl-PL" sz="2000"/>
               <a:t> hierarchy for </a:t>
             </a:r>
             <a:r>
-              <a:rPr lang="pl-PL" sz="2000" dirty="0" err="1"/>
+              <a:rPr lang="pl-PL" sz="2000" err="1"/>
               <a:t>parent</a:t>
             </a:r>
             <a:r>
-              <a:rPr lang="pl-PL" sz="2000" dirty="0"/>
+              <a:rPr lang="pl-PL" sz="2000"/>
               <a:t> / </a:t>
             </a:r>
             <a:r>
-              <a:rPr lang="pl-PL" sz="2000" dirty="0" err="1"/>
+              <a:rPr lang="pl-PL" sz="2000" err="1"/>
               <a:t>child</a:t>
             </a:r>
             <a:r>
-              <a:rPr lang="pl-PL" sz="2000" dirty="0"/>
+              <a:rPr lang="pl-PL" sz="2000"/>
               <a:t> test </a:t>
             </a:r>
             <a:r>
-              <a:rPr lang="pl-PL" sz="2000" dirty="0" err="1"/>
+              <a:rPr lang="pl-PL" sz="2000" err="1"/>
               <a:t>node</a:t>
             </a:r>
             <a:r>
-              <a:rPr lang="pl-PL" sz="2000" dirty="0"/>
+              <a:rPr lang="pl-PL" sz="2000"/>
               <a:t> data</a:t>
             </a:r>
           </a:p>
           <a:p>
             <a:pPr lvl="2"/>
             <a:r>
-              <a:rPr lang="pl-PL" sz="2000" dirty="0"/>
+              <a:rPr lang="pl-PL" sz="2000"/>
               <a:t>In the end </a:t>
             </a:r>
             <a:r>
-              <a:rPr lang="pl-PL" sz="2000" dirty="0" err="1"/>
+              <a:rPr lang="pl-PL" sz="2000" err="1"/>
               <a:t>works</a:t>
             </a:r>
             <a:r>
-              <a:rPr lang="pl-PL" sz="2000" dirty="0"/>
+              <a:rPr lang="pl-PL" sz="2000"/>
               <a:t> </a:t>
             </a:r>
             <a:r>
-              <a:rPr lang="pl-PL" sz="2000" dirty="0" err="1"/>
+              <a:rPr lang="pl-PL" sz="2000" err="1"/>
               <a:t>like</a:t>
             </a:r>
             <a:r>
-              <a:rPr lang="pl-PL" sz="2000" dirty="0"/>
+              <a:rPr lang="pl-PL" sz="2000"/>
               <a:t> </a:t>
             </a:r>
             <a:r>
-              <a:rPr lang="pl-PL" sz="2000" dirty="0" err="1"/>
+              <a:rPr lang="pl-PL" sz="2000" err="1"/>
               <a:t>hash</a:t>
             </a:r>
             <a:r>
-              <a:rPr lang="pl-PL" sz="2000" dirty="0"/>
+              <a:rPr lang="pl-PL" sz="2000"/>
               <a:t> map </a:t>
             </a:r>
             <a:r>
-              <a:rPr lang="pl-PL" sz="2000" dirty="0">
+              <a:rPr lang="pl-PL" sz="2000">
                 <a:sym typeface="Wingdings" panose="05000000000000000000" pitchFamily="2" charset="2"/>
               </a:rPr>
               <a:t> </a:t>
             </a:r>
-            <a:endParaRPr lang="pl-PL" sz="2000" dirty="0"/>
+            <a:endParaRPr lang="pl-PL" sz="2000"/>
           </a:p>
           <a:p>
             <a:pPr lvl="1"/>
             <a:r>
-              <a:rPr lang="pl-PL" sz="2000" dirty="0"/>
+              <a:rPr lang="pl-PL" sz="2000"/>
               <a:t>Spring, </a:t>
             </a:r>
             <a:r>
-              <a:rPr lang="pl-PL" sz="2000" dirty="0" err="1"/>
+              <a:rPr lang="pl-PL" sz="2000" err="1"/>
               <a:t>Mockito</a:t>
             </a:r>
             <a:r>
-              <a:rPr lang="pl-PL" sz="2000" dirty="0"/>
+              <a:rPr lang="pl-PL" sz="2000"/>
               <a:t>, </a:t>
             </a:r>
             <a:r>
-              <a:rPr lang="pl-PL" sz="2000" dirty="0" err="1"/>
+              <a:rPr lang="pl-PL" sz="2000" err="1"/>
               <a:t>Wiremock</a:t>
             </a:r>
             <a:r>
-              <a:rPr lang="pl-PL" sz="2000" dirty="0"/>
+              <a:rPr lang="pl-PL" sz="2000"/>
               <a:t> etc. </a:t>
             </a:r>
             <a:r>
-              <a:rPr lang="pl-PL" sz="2000" dirty="0" err="1"/>
+              <a:rPr lang="pl-PL" sz="2000" err="1"/>
               <a:t>tests</a:t>
             </a:r>
             <a:r>
-              <a:rPr lang="pl-PL" sz="2000" dirty="0"/>
+              <a:rPr lang="pl-PL" sz="2000"/>
               <a:t> </a:t>
             </a:r>
             <a:r>
-              <a:rPr lang="pl-PL" sz="2000" dirty="0" err="1"/>
+              <a:rPr lang="pl-PL" sz="2000" err="1"/>
               <a:t>based</a:t>
             </a:r>
             <a:r>
-              <a:rPr lang="pl-PL" sz="2000" dirty="0"/>
+              <a:rPr lang="pl-PL" sz="2000"/>
               <a:t> </a:t>
             </a:r>
             <a:r>
-              <a:rPr lang="pl-PL" sz="2000" dirty="0" err="1"/>
+              <a:rPr lang="pl-PL" sz="2000" err="1"/>
               <a:t>now</a:t>
             </a:r>
             <a:r>
-              <a:rPr lang="pl-PL" sz="2000" dirty="0"/>
+              <a:rPr lang="pl-PL" sz="2000"/>
               <a:t> on Extensions</a:t>
             </a:r>
           </a:p>
@@ -14988,15 +14984,15 @@
           <a:lstStyle/>
           <a:p>
             <a:r>
-              <a:rPr lang="pl-PL" dirty="0"/>
+              <a:rPr lang="pl-PL"/>
               <a:t>Migration </a:t>
             </a:r>
             <a:r>
-              <a:rPr lang="pl-PL" dirty="0" err="1"/>
+              <a:rPr lang="pl-PL" err="1"/>
               <a:t>Junit</a:t>
             </a:r>
             <a:r>
-              <a:rPr lang="pl-PL" dirty="0"/>
+              <a:rPr lang="pl-PL"/>
               <a:t> 4 - 5</a:t>
             </a:r>
           </a:p>
@@ -15027,7 +15023,6 @@
               <a:rPr lang="pl-PL"/>
               <a:t>JUNIT 5</a:t>
             </a:r>
-            <a:endParaRPr lang="pl-PL" dirty="0"/>
           </a:p>
         </p:txBody>
       </p:sp>
@@ -15054,9 +15049,9 @@
           <a:p>
             <a:fld id="{6ABC2847-D563-405E-8397-0B7C61EE83E9}" type="datetime1">
               <a:rPr lang="pl-PL" smtClean="0"/>
-              <a:t>31.12.2019</a:t>
+              <a:t>07.01.2020</a:t>
             </a:fld>
-            <a:endParaRPr lang="pl-PL" dirty="0"/>
+            <a:endParaRPr lang="pl-PL"/>
           </a:p>
         </p:txBody>
       </p:sp>
@@ -15086,54 +15081,54 @@
               <a:buAutoNum type="arabicPeriod"/>
             </a:pPr>
             <a:r>
-              <a:rPr lang="pl-PL" dirty="0"/>
+              <a:rPr lang="pl-PL"/>
               <a:t>New </a:t>
             </a:r>
             <a:r>
-              <a:rPr lang="pl-PL" dirty="0" err="1"/>
+              <a:rPr lang="pl-PL" err="1"/>
               <a:t>tests</a:t>
             </a:r>
             <a:r>
-              <a:rPr lang="pl-PL" dirty="0"/>
+              <a:rPr lang="pl-PL"/>
               <a:t> in Junit-5, </a:t>
             </a:r>
             <a:r>
-              <a:rPr lang="pl-PL" dirty="0" err="1"/>
+              <a:rPr lang="pl-PL" err="1"/>
               <a:t>old</a:t>
             </a:r>
             <a:r>
-              <a:rPr lang="pl-PL" dirty="0"/>
+              <a:rPr lang="pl-PL"/>
               <a:t> </a:t>
             </a:r>
             <a:r>
-              <a:rPr lang="pl-PL" dirty="0" err="1"/>
+              <a:rPr lang="pl-PL" err="1"/>
               <a:t>tests</a:t>
             </a:r>
             <a:r>
-              <a:rPr lang="pl-PL" dirty="0"/>
+              <a:rPr lang="pl-PL"/>
               <a:t> </a:t>
             </a:r>
             <a:r>
-              <a:rPr lang="pl-PL" dirty="0" err="1"/>
+              <a:rPr lang="pl-PL" err="1"/>
               <a:t>runned</a:t>
             </a:r>
             <a:r>
-              <a:rPr lang="pl-PL" dirty="0"/>
+              <a:rPr lang="pl-PL"/>
               <a:t> by </a:t>
             </a:r>
             <a:r>
-              <a:rPr lang="pl-PL" dirty="0" err="1"/>
+              <a:rPr lang="pl-PL" err="1"/>
               <a:t>vintage</a:t>
             </a:r>
             <a:r>
-              <a:rPr lang="pl-PL" dirty="0"/>
+              <a:rPr lang="pl-PL"/>
               <a:t> </a:t>
             </a:r>
             <a:r>
-              <a:rPr lang="pl-PL" dirty="0" err="1"/>
+              <a:rPr lang="pl-PL" err="1"/>
               <a:t>engine</a:t>
             </a:r>
-            <a:endParaRPr lang="pl-PL" dirty="0"/>
+            <a:endParaRPr lang="pl-PL"/>
           </a:p>
           <a:p>
             <a:pPr marL="508000" lvl="1" indent="-342900">
@@ -15141,251 +15136,251 @@
               <a:buAutoNum type="arabicPeriod"/>
             </a:pPr>
             <a:r>
-              <a:rPr lang="pl-PL" dirty="0" err="1"/>
+              <a:rPr lang="pl-PL" err="1"/>
               <a:t>Migrate</a:t>
             </a:r>
             <a:r>
-              <a:rPr lang="pl-PL" dirty="0"/>
+              <a:rPr lang="pl-PL"/>
               <a:t> </a:t>
             </a:r>
             <a:r>
-              <a:rPr lang="pl-PL" dirty="0" err="1"/>
+              <a:rPr lang="pl-PL" err="1"/>
               <a:t>simple</a:t>
             </a:r>
             <a:r>
-              <a:rPr lang="pl-PL" dirty="0"/>
+              <a:rPr lang="pl-PL"/>
               <a:t> test:</a:t>
             </a:r>
           </a:p>
           <a:p>
             <a:pPr lvl="2"/>
             <a:r>
-              <a:rPr lang="pl-PL" dirty="0" err="1"/>
+              <a:rPr lang="pl-PL" err="1"/>
               <a:t>Change</a:t>
             </a:r>
             <a:r>
-              <a:rPr lang="pl-PL" dirty="0"/>
+              <a:rPr lang="pl-PL"/>
               <a:t> import </a:t>
             </a:r>
             <a:r>
-              <a:rPr lang="pl-PL" dirty="0" err="1"/>
+              <a:rPr lang="pl-PL" err="1"/>
               <a:t>statements</a:t>
             </a:r>
             <a:r>
-              <a:rPr lang="pl-PL" dirty="0"/>
+              <a:rPr lang="pl-PL"/>
               <a:t> for @Test and ‚</a:t>
             </a:r>
             <a:r>
-              <a:rPr lang="pl-PL" dirty="0" err="1"/>
+              <a:rPr lang="pl-PL" err="1"/>
               <a:t>assertThat</a:t>
             </a:r>
             <a:r>
-              <a:rPr lang="pl-PL" dirty="0"/>
+              <a:rPr lang="pl-PL"/>
               <a:t>’ </a:t>
             </a:r>
             <a:r>
-              <a:rPr lang="pl-PL" dirty="0" err="1"/>
+              <a:rPr lang="pl-PL" err="1"/>
               <a:t>assertions</a:t>
             </a:r>
-            <a:endParaRPr lang="pl-PL" dirty="0"/>
+            <a:endParaRPr lang="pl-PL"/>
           </a:p>
           <a:p>
             <a:pPr lvl="2"/>
             <a:r>
-              <a:rPr lang="pl-PL" dirty="0" err="1"/>
+              <a:rPr lang="pl-PL" err="1"/>
               <a:t>Remove</a:t>
             </a:r>
             <a:r>
-              <a:rPr lang="pl-PL" dirty="0"/>
+              <a:rPr lang="pl-PL"/>
               <a:t> </a:t>
             </a:r>
             <a:r>
-              <a:rPr lang="pl-PL" dirty="0" err="1"/>
+              <a:rPr lang="pl-PL" err="1"/>
               <a:t>expect</a:t>
             </a:r>
             <a:r>
-              <a:rPr lang="pl-PL" dirty="0"/>
+              <a:rPr lang="pl-PL"/>
               <a:t> from test -&gt; </a:t>
             </a:r>
             <a:r>
-              <a:rPr lang="pl-PL" dirty="0" err="1"/>
+              <a:rPr lang="pl-PL" err="1"/>
               <a:t>introduce</a:t>
             </a:r>
             <a:r>
-              <a:rPr lang="pl-PL" dirty="0"/>
+              <a:rPr lang="pl-PL"/>
               <a:t> `</a:t>
             </a:r>
             <a:r>
-              <a:rPr lang="pl-PL" dirty="0" err="1"/>
+              <a:rPr lang="pl-PL" err="1"/>
               <a:t>assertThrows</a:t>
             </a:r>
             <a:r>
-              <a:rPr lang="pl-PL" dirty="0"/>
+              <a:rPr lang="pl-PL"/>
               <a:t>`</a:t>
             </a:r>
           </a:p>
           <a:p>
             <a:pPr lvl="2"/>
             <a:r>
-              <a:rPr lang="pl-PL" dirty="0" err="1"/>
+              <a:rPr lang="pl-PL" err="1"/>
               <a:t>Change</a:t>
             </a:r>
             <a:r>
-              <a:rPr lang="pl-PL" dirty="0"/>
+              <a:rPr lang="pl-PL"/>
               <a:t>  </a:t>
             </a:r>
             <a:r>
-              <a:rPr lang="pl-PL" dirty="0" err="1"/>
+              <a:rPr lang="pl-PL" err="1"/>
               <a:t>lifecycle</a:t>
             </a:r>
             <a:r>
-              <a:rPr lang="pl-PL" dirty="0"/>
+              <a:rPr lang="pl-PL"/>
               <a:t> </a:t>
             </a:r>
             <a:r>
-              <a:rPr lang="pl-PL" dirty="0" err="1"/>
+              <a:rPr lang="pl-PL" err="1"/>
               <a:t>annotation</a:t>
             </a:r>
             <a:r>
-              <a:rPr lang="pl-PL" dirty="0"/>
+              <a:rPr lang="pl-PL"/>
               <a:t>, </a:t>
             </a:r>
             <a:r>
-              <a:rPr lang="pl-PL" dirty="0" err="1"/>
+              <a:rPr lang="pl-PL" err="1"/>
               <a:t>f.e</a:t>
             </a:r>
             <a:r>
-              <a:rPr lang="pl-PL" dirty="0"/>
+              <a:rPr lang="pl-PL"/>
               <a:t>. @</a:t>
             </a:r>
             <a:r>
-              <a:rPr lang="pl-PL" dirty="0" err="1"/>
+              <a:rPr lang="pl-PL" err="1"/>
               <a:t>Before</a:t>
             </a:r>
             <a:r>
-              <a:rPr lang="pl-PL" dirty="0"/>
+              <a:rPr lang="pl-PL"/>
               <a:t> -&gt; @</a:t>
             </a:r>
             <a:r>
-              <a:rPr lang="pl-PL" dirty="0" err="1"/>
+              <a:rPr lang="pl-PL" err="1"/>
               <a:t>BeforeEeach</a:t>
             </a:r>
             <a:r>
-              <a:rPr lang="pl-PL" dirty="0"/>
+              <a:rPr lang="pl-PL"/>
               <a:t>, @</a:t>
             </a:r>
             <a:r>
-              <a:rPr lang="pl-PL" dirty="0" err="1"/>
+              <a:rPr lang="pl-PL" err="1"/>
               <a:t>BeforeClass</a:t>
             </a:r>
             <a:r>
-              <a:rPr lang="pl-PL" dirty="0"/>
+              <a:rPr lang="pl-PL"/>
               <a:t> - &gt; @</a:t>
             </a:r>
             <a:r>
-              <a:rPr lang="pl-PL" dirty="0" err="1"/>
+              <a:rPr lang="pl-PL" err="1"/>
               <a:t>BeforeAll</a:t>
             </a:r>
-            <a:endParaRPr lang="pl-PL" dirty="0"/>
+            <a:endParaRPr lang="pl-PL"/>
           </a:p>
           <a:p>
             <a:pPr lvl="2"/>
             <a:r>
-              <a:rPr lang="pl-PL" dirty="0" err="1"/>
+              <a:rPr lang="pl-PL" err="1"/>
               <a:t>Move</a:t>
             </a:r>
             <a:r>
-              <a:rPr lang="pl-PL" dirty="0"/>
+              <a:rPr lang="pl-PL"/>
               <a:t> </a:t>
             </a:r>
             <a:r>
-              <a:rPr lang="pl-PL" dirty="0" err="1"/>
+              <a:rPr lang="pl-PL" err="1"/>
               <a:t>failure</a:t>
             </a:r>
             <a:r>
-              <a:rPr lang="pl-PL" dirty="0"/>
+              <a:rPr lang="pl-PL"/>
               <a:t> </a:t>
             </a:r>
             <a:r>
-              <a:rPr lang="pl-PL" dirty="0" err="1"/>
+              <a:rPr lang="pl-PL" err="1"/>
               <a:t>message</a:t>
             </a:r>
             <a:r>
-              <a:rPr lang="pl-PL" dirty="0"/>
+              <a:rPr lang="pl-PL"/>
               <a:t> to 3th </a:t>
             </a:r>
             <a:r>
-              <a:rPr lang="pl-PL" dirty="0" err="1"/>
+              <a:rPr lang="pl-PL" err="1"/>
               <a:t>possition</a:t>
             </a:r>
             <a:r>
-              <a:rPr lang="pl-PL" dirty="0"/>
+              <a:rPr lang="pl-PL"/>
               <a:t> in </a:t>
             </a:r>
             <a:r>
-              <a:rPr lang="pl-PL" dirty="0" err="1"/>
+              <a:rPr lang="pl-PL" err="1"/>
               <a:t>assertions</a:t>
             </a:r>
             <a:r>
-              <a:rPr lang="pl-PL" dirty="0"/>
+              <a:rPr lang="pl-PL"/>
               <a:t> </a:t>
             </a:r>
           </a:p>
           <a:p>
             <a:pPr lvl="2"/>
             <a:r>
-              <a:rPr lang="pl-PL" dirty="0" err="1"/>
+              <a:rPr lang="pl-PL" err="1"/>
               <a:t>Consider</a:t>
             </a:r>
             <a:r>
-              <a:rPr lang="pl-PL" dirty="0"/>
+              <a:rPr lang="pl-PL"/>
               <a:t> automation for </a:t>
             </a:r>
             <a:r>
-              <a:rPr lang="pl-PL" dirty="0" err="1"/>
+              <a:rPr lang="pl-PL" err="1"/>
               <a:t>replacing</a:t>
             </a:r>
             <a:r>
-              <a:rPr lang="pl-PL" dirty="0"/>
+              <a:rPr lang="pl-PL"/>
               <a:t> (</a:t>
             </a:r>
             <a:r>
-              <a:rPr lang="pl-PL" dirty="0" err="1"/>
+              <a:rPr lang="pl-PL" err="1"/>
               <a:t>f.e</a:t>
             </a:r>
             <a:r>
-              <a:rPr lang="pl-PL" dirty="0"/>
+              <a:rPr lang="pl-PL"/>
               <a:t>. </a:t>
             </a:r>
             <a:r>
-              <a:rPr lang="pl-PL" dirty="0" err="1"/>
+              <a:rPr lang="pl-PL" err="1"/>
               <a:t>bash</a:t>
             </a:r>
             <a:r>
-              <a:rPr lang="pl-PL" dirty="0"/>
+              <a:rPr lang="pl-PL"/>
               <a:t> with </a:t>
             </a:r>
             <a:r>
-              <a:rPr lang="pl-PL" dirty="0" err="1"/>
+              <a:rPr lang="pl-PL" err="1"/>
               <a:t>sets</a:t>
             </a:r>
             <a:r>
-              <a:rPr lang="pl-PL" dirty="0"/>
+              <a:rPr lang="pl-PL"/>
               <a:t> of `</a:t>
             </a:r>
             <a:r>
-              <a:rPr lang="pl-PL" dirty="0" err="1"/>
+              <a:rPr lang="pl-PL" err="1"/>
               <a:t>sed</a:t>
             </a:r>
             <a:r>
-              <a:rPr lang="pl-PL" dirty="0"/>
+              <a:rPr lang="pl-PL"/>
               <a:t> –i ` </a:t>
             </a:r>
             <a:r>
-              <a:rPr lang="pl-PL" dirty="0" err="1"/>
+              <a:rPr lang="pl-PL" err="1"/>
               <a:t>commands</a:t>
             </a:r>
-            <a:endParaRPr lang="pl-PL" dirty="0"/>
+            <a:endParaRPr lang="pl-PL"/>
           </a:p>
           <a:p>
             <a:pPr marL="508000" lvl="1" indent="-342900">
@@ -15393,176 +15388,142 @@
               <a:buAutoNum type="arabicPeriod"/>
             </a:pPr>
             <a:r>
-              <a:rPr lang="pl-PL" dirty="0" err="1"/>
+              <a:rPr lang="pl-PL" err="1"/>
               <a:t>Migrate</a:t>
             </a:r>
             <a:r>
-              <a:rPr lang="pl-PL" dirty="0"/>
+              <a:rPr lang="pl-PL"/>
               <a:t> </a:t>
             </a:r>
             <a:r>
-              <a:rPr lang="pl-PL" dirty="0" err="1"/>
+              <a:rPr lang="pl-PL" err="1"/>
               <a:t>complex</a:t>
             </a:r>
             <a:r>
-              <a:rPr lang="pl-PL" dirty="0"/>
+              <a:rPr lang="pl-PL"/>
               <a:t> test</a:t>
             </a:r>
           </a:p>
           <a:p>
             <a:pPr lvl="2"/>
             <a:r>
-              <a:rPr lang="pl-PL" dirty="0"/>
+              <a:rPr lang="pl-PL"/>
               <a:t>Same </a:t>
             </a:r>
             <a:r>
-              <a:rPr lang="pl-PL" dirty="0" err="1"/>
+              <a:rPr lang="pl-PL" err="1"/>
               <a:t>steps</a:t>
             </a:r>
             <a:r>
-              <a:rPr lang="pl-PL" dirty="0"/>
+              <a:rPr lang="pl-PL"/>
               <a:t> </a:t>
             </a:r>
             <a:r>
-              <a:rPr lang="pl-PL" dirty="0" err="1"/>
+              <a:rPr lang="pl-PL" err="1"/>
               <a:t>like</a:t>
             </a:r>
             <a:r>
-              <a:rPr lang="pl-PL" dirty="0"/>
+              <a:rPr lang="pl-PL"/>
               <a:t> for </a:t>
             </a:r>
             <a:r>
-              <a:rPr lang="pl-PL" dirty="0" err="1"/>
+              <a:rPr lang="pl-PL" err="1"/>
               <a:t>simple</a:t>
             </a:r>
             <a:r>
-              <a:rPr lang="pl-PL" dirty="0"/>
+              <a:rPr lang="pl-PL"/>
               <a:t> </a:t>
             </a:r>
             <a:r>
-              <a:rPr lang="pl-PL" dirty="0" err="1"/>
+              <a:rPr lang="pl-PL" err="1"/>
               <a:t>tests</a:t>
             </a:r>
-            <a:endParaRPr lang="pl-PL" dirty="0"/>
+            <a:endParaRPr lang="pl-PL"/>
           </a:p>
           <a:p>
             <a:pPr lvl="2"/>
             <a:r>
-              <a:rPr lang="pl-PL" dirty="0" err="1"/>
+              <a:rPr lang="pl-PL" err="1"/>
               <a:t>Change</a:t>
             </a:r>
             <a:r>
-              <a:rPr lang="pl-PL" dirty="0"/>
+              <a:rPr lang="pl-PL"/>
               <a:t> @</a:t>
             </a:r>
             <a:r>
-              <a:rPr lang="pl-PL" dirty="0" err="1"/>
+              <a:rPr lang="pl-PL" err="1"/>
               <a:t>RunWith</a:t>
             </a:r>
             <a:r>
-              <a:rPr lang="pl-PL" dirty="0"/>
+              <a:rPr lang="pl-PL"/>
               <a:t>(X) -&gt; @</a:t>
             </a:r>
             <a:r>
-              <a:rPr lang="pl-PL" dirty="0" err="1"/>
+              <a:rPr lang="pl-PL" err="1"/>
               <a:t>ExtendWith</a:t>
             </a:r>
             <a:r>
-              <a:rPr lang="pl-PL" dirty="0"/>
+              <a:rPr lang="pl-PL"/>
               <a:t> (Y)</a:t>
             </a:r>
           </a:p>
           <a:p>
             <a:pPr lvl="2"/>
             <a:r>
-              <a:rPr lang="pl-PL" dirty="0" err="1"/>
+              <a:rPr lang="pl-PL" err="1"/>
               <a:t>Work</a:t>
             </a:r>
             <a:r>
-              <a:rPr lang="pl-PL" dirty="0"/>
+              <a:rPr lang="pl-PL"/>
               <a:t> with </a:t>
             </a:r>
             <a:r>
-              <a:rPr lang="pl-PL" dirty="0" err="1"/>
+              <a:rPr lang="pl-PL" err="1"/>
               <a:t>used</a:t>
             </a:r>
             <a:r>
-              <a:rPr lang="pl-PL" dirty="0"/>
+              <a:rPr lang="pl-PL"/>
               <a:t> @</a:t>
             </a:r>
             <a:r>
-              <a:rPr lang="pl-PL" dirty="0" err="1"/>
+              <a:rPr lang="pl-PL" err="1"/>
               <a:t>Rules</a:t>
             </a:r>
             <a:r>
-              <a:rPr lang="pl-PL" dirty="0"/>
+              <a:rPr lang="pl-PL"/>
               <a:t> – </a:t>
             </a:r>
             <a:r>
-              <a:rPr lang="pl-PL" dirty="0" err="1"/>
+              <a:rPr lang="pl-PL" err="1"/>
               <a:t>replacement</a:t>
             </a:r>
             <a:r>
-              <a:rPr lang="pl-PL" dirty="0"/>
+              <a:rPr lang="pl-PL"/>
               <a:t> </a:t>
             </a:r>
             <a:r>
-              <a:rPr lang="pl-PL" dirty="0" err="1"/>
+              <a:rPr lang="pl-PL" err="1"/>
               <a:t>is</a:t>
             </a:r>
             <a:r>
-              <a:rPr lang="pl-PL" dirty="0"/>
+              <a:rPr lang="pl-PL"/>
               <a:t> </a:t>
             </a:r>
             <a:r>
-              <a:rPr lang="pl-PL" dirty="0" err="1"/>
+              <a:rPr lang="pl-PL" err="1"/>
               <a:t>well</a:t>
             </a:r>
             <a:r>
-              <a:rPr lang="pl-PL" dirty="0"/>
+              <a:rPr lang="pl-PL"/>
               <a:t> </a:t>
             </a:r>
             <a:r>
-              <a:rPr lang="pl-PL" dirty="0" err="1"/>
+              <a:rPr lang="pl-PL" err="1"/>
               <a:t>described</a:t>
             </a:r>
             <a:r>
-              <a:rPr lang="pl-PL" dirty="0"/>
+              <a:rPr lang="pl-PL"/>
               <a:t> in web</a:t>
-            </a:r>
-          </a:p>
-        </p:txBody>
-      </p:sp>
-      <p:sp>
-        <p:nvSpPr>
-          <p:cNvPr id="6" name="Rectangle 5">
-            <a:extLst>
-              <a:ext uri="{FF2B5EF4-FFF2-40B4-BE49-F238E27FC236}">
-                <a16:creationId xmlns:a16="http://schemas.microsoft.com/office/drawing/2014/main" id="{F37E80DC-3E63-49EA-8C07-D58F8E1C98F8}"/>
-              </a:ext>
-            </a:extLst>
-          </p:cNvPr>
-          <p:cNvSpPr/>
-          <p:nvPr/>
-        </p:nvSpPr>
-        <p:spPr>
-          <a:xfrm>
-            <a:off x="3973118" y="2387084"/>
-            <a:ext cx="1197764" cy="369332"/>
-          </a:xfrm>
-          <a:prstGeom prst="rect">
-            <a:avLst/>
-          </a:prstGeom>
-        </p:spPr>
-        <p:txBody>
-          <a:bodyPr wrap="none">
-            <a:spAutoFit/>
-          </a:bodyPr>
-          <a:lstStyle/>
-          <a:p>
-            <a:r>
-              <a:rPr lang="pl-PL" dirty="0"/>
-              <a:t>Extension</a:t>
             </a:r>
           </a:p>
         </p:txBody>
@@ -15619,11 +15580,11 @@
           <a:lstStyle/>
           <a:p>
             <a:r>
-              <a:rPr lang="pl-PL" dirty="0" err="1"/>
+              <a:rPr lang="pl-PL" err="1"/>
               <a:t>Recap</a:t>
             </a:r>
             <a:r>
-              <a:rPr lang="pl-PL" dirty="0"/>
+              <a:rPr lang="pl-PL"/>
               <a:t>	</a:t>
             </a:r>
           </a:p>
@@ -15654,7 +15615,6 @@
               <a:rPr lang="pl-PL"/>
               <a:t>JUNIT 5</a:t>
             </a:r>
-            <a:endParaRPr lang="pl-PL" dirty="0"/>
           </a:p>
         </p:txBody>
       </p:sp>
@@ -15681,9 +15641,9 @@
           <a:p>
             <a:fld id="{6ABC2847-D563-405E-8397-0B7C61EE83E9}" type="datetime1">
               <a:rPr lang="pl-PL" smtClean="0"/>
-              <a:t>31.12.2019</a:t>
+              <a:t>07.01.2020</a:t>
             </a:fld>
-            <a:endParaRPr lang="pl-PL" dirty="0"/>
+            <a:endParaRPr lang="pl-PL"/>
           </a:p>
         </p:txBody>
       </p:sp>
@@ -15709,106 +15669,106 @@
           <a:lstStyle/>
           <a:p>
             <a:r>
-              <a:rPr lang="en-US" sz="2000" dirty="0"/>
+              <a:rPr lang="en-US" sz="2000"/>
               <a:t>Why Junit 5 was introduced</a:t>
             </a:r>
             <a:r>
-              <a:rPr lang="pl-PL" sz="2000" dirty="0"/>
+              <a:rPr lang="pl-PL" sz="2000"/>
               <a:t> </a:t>
             </a:r>
           </a:p>
           <a:p>
             <a:r>
-              <a:rPr lang="pl-PL" sz="2000" dirty="0" err="1"/>
+              <a:rPr lang="pl-PL" sz="2000" err="1"/>
               <a:t>Junit</a:t>
             </a:r>
             <a:r>
-              <a:rPr lang="pl-PL" sz="2000" dirty="0"/>
+              <a:rPr lang="pl-PL" sz="2000"/>
               <a:t> 5 </a:t>
             </a:r>
             <a:r>
-              <a:rPr lang="pl-PL" sz="2000" dirty="0" err="1"/>
+              <a:rPr lang="pl-PL" sz="2000" err="1"/>
               <a:t>architecture</a:t>
             </a:r>
-            <a:endParaRPr lang="pl-PL" sz="2000" dirty="0"/>
-          </a:p>
-          <a:p>
-            <a:r>
-              <a:rPr lang="pl-PL" sz="2000" dirty="0"/>
+            <a:endParaRPr lang="pl-PL" sz="2000"/>
+          </a:p>
+          <a:p>
+            <a:r>
+              <a:rPr lang="pl-PL" sz="2000"/>
               <a:t>Basics</a:t>
             </a:r>
           </a:p>
           <a:p>
             <a:r>
-              <a:rPr lang="pl-PL" sz="2000" dirty="0" err="1"/>
+              <a:rPr lang="pl-PL" sz="2000" err="1"/>
               <a:t>Conditional</a:t>
             </a:r>
             <a:r>
-              <a:rPr lang="pl-PL" sz="2000" dirty="0"/>
+              <a:rPr lang="pl-PL" sz="2000"/>
               <a:t> </a:t>
             </a:r>
             <a:r>
-              <a:rPr lang="pl-PL" sz="2000" dirty="0" err="1"/>
+              <a:rPr lang="pl-PL" sz="2000" err="1"/>
               <a:t>Tests</a:t>
             </a:r>
-            <a:endParaRPr lang="pl-PL" sz="2000" dirty="0"/>
-          </a:p>
-          <a:p>
-            <a:r>
-              <a:rPr lang="pl-PL" sz="2000" dirty="0" err="1"/>
+            <a:endParaRPr lang="pl-PL" sz="2000"/>
+          </a:p>
+          <a:p>
+            <a:r>
+              <a:rPr lang="pl-PL" sz="2000" err="1"/>
               <a:t>Dynamic</a:t>
             </a:r>
             <a:r>
-              <a:rPr lang="pl-PL" sz="2000" dirty="0"/>
+              <a:rPr lang="pl-PL" sz="2000"/>
               <a:t> </a:t>
             </a:r>
             <a:r>
-              <a:rPr lang="pl-PL" sz="2000" dirty="0" err="1"/>
+              <a:rPr lang="pl-PL" sz="2000" err="1"/>
               <a:t>Tests</a:t>
             </a:r>
-            <a:endParaRPr lang="pl-PL" sz="2000" dirty="0"/>
-          </a:p>
-          <a:p>
-            <a:r>
-              <a:rPr lang="pl-PL" sz="2000" dirty="0" err="1"/>
+            <a:endParaRPr lang="pl-PL" sz="2000"/>
+          </a:p>
+          <a:p>
+            <a:r>
+              <a:rPr lang="pl-PL" sz="2000" err="1"/>
               <a:t>Parameterized</a:t>
             </a:r>
             <a:r>
-              <a:rPr lang="pl-PL" sz="2000" dirty="0"/>
+              <a:rPr lang="pl-PL" sz="2000"/>
               <a:t> </a:t>
             </a:r>
             <a:r>
-              <a:rPr lang="pl-PL" sz="2000" dirty="0" err="1"/>
+              <a:rPr lang="pl-PL" sz="2000" err="1"/>
               <a:t>Tests</a:t>
             </a:r>
-            <a:endParaRPr lang="pl-PL" sz="2000" dirty="0"/>
-          </a:p>
-          <a:p>
-            <a:r>
-              <a:rPr lang="pl-PL" sz="2000" dirty="0"/>
+            <a:endParaRPr lang="pl-PL" sz="2000"/>
+          </a:p>
+          <a:p>
+            <a:r>
+              <a:rPr lang="pl-PL" sz="2000"/>
               <a:t>Test Extension</a:t>
             </a:r>
           </a:p>
           <a:p>
             <a:r>
-              <a:rPr lang="pl-PL" sz="2000" dirty="0" err="1"/>
+              <a:rPr lang="pl-PL" sz="2000" err="1"/>
               <a:t>Migrtion</a:t>
             </a:r>
             <a:r>
-              <a:rPr lang="pl-PL" sz="2000" dirty="0"/>
+              <a:rPr lang="pl-PL" sz="2000"/>
               <a:t> </a:t>
             </a:r>
             <a:r>
-              <a:rPr lang="pl-PL" sz="2000" dirty="0" err="1"/>
+              <a:rPr lang="pl-PL" sz="2000" err="1"/>
               <a:t>Junit</a:t>
             </a:r>
             <a:r>
-              <a:rPr lang="pl-PL" sz="2000" dirty="0"/>
+              <a:rPr lang="pl-PL" sz="2000"/>
               <a:t> 4 -&gt; 5</a:t>
             </a:r>
           </a:p>
           <a:p>
-            <a:endParaRPr lang="pl-PL" dirty="0"/>
+            <a:endParaRPr lang="pl-PL"/>
           </a:p>
         </p:txBody>
       </p:sp>
@@ -15915,7 +15875,7 @@
               <a:rPr lang="pl-PL" sz="1800" dirty="0" err="1"/>
               <a:t>Objectivity</a:t>
             </a:r>
-            <a:endParaRPr lang="pl-PL" sz="1800" dirty="0"/>
+            <a:endParaRPr lang="pl-PL" sz="1800"/>
           </a:p>
           <a:p>
             <a:pPr>
@@ -15924,7 +15884,7 @@
               </a:lnSpc>
             </a:pPr>
             <a:r>
-              <a:rPr lang="pl-PL" sz="1800" dirty="0"/>
+              <a:rPr lang="pl-PL" sz="1800"/>
               <a:t>4 lata w AWS</a:t>
             </a:r>
           </a:p>
@@ -15953,9 +15913,9 @@
           <a:p>
             <a:fld id="{57E9CAB2-F81A-43C6-9BCA-3A3C14B54C24}" type="datetime1">
               <a:rPr lang="pl-PL" smtClean="0"/>
-              <a:t>31.12.2019</a:t>
+              <a:t>07.01.2020</a:t>
             </a:fld>
-            <a:endParaRPr lang="pl-PL" dirty="0"/>
+            <a:endParaRPr lang="pl-PL"/>
           </a:p>
         </p:txBody>
       </p:sp>
@@ -15981,7 +15941,7 @@
           <a:lstStyle/>
           <a:p>
             <a:r>
-              <a:rPr lang="pl-PL" dirty="0"/>
+              <a:rPr lang="pl-PL"/>
               <a:t>JUNIT 5</a:t>
             </a:r>
           </a:p>
@@ -16219,7 +16179,7 @@
           <a:lstStyle/>
           <a:p>
             <a:r>
-              <a:rPr lang="pl-PL" dirty="0"/>
+              <a:rPr lang="pl-PL"/>
               <a:t>Agenda</a:t>
             </a:r>
           </a:p>
@@ -16250,7 +16210,6 @@
               <a:rPr lang="pl-PL"/>
               <a:t>JUNIT 5</a:t>
             </a:r>
-            <a:endParaRPr lang="pl-PL" dirty="0"/>
           </a:p>
         </p:txBody>
       </p:sp>
@@ -16277,9 +16236,9 @@
           <a:p>
             <a:fld id="{6ABC2847-D563-405E-8397-0B7C61EE83E9}" type="datetime1">
               <a:rPr lang="pl-PL" smtClean="0"/>
-              <a:t>31.12.2019</a:t>
+              <a:t>07.01.2020</a:t>
             </a:fld>
-            <a:endParaRPr lang="pl-PL" dirty="0"/>
+            <a:endParaRPr lang="pl-PL"/>
           </a:p>
         </p:txBody>
       </p:sp>
@@ -16323,10 +16282,9 @@
               <a:t> 5 </a:t>
             </a:r>
             <a:r>
-              <a:rPr lang="pl-PL" sz="2000" dirty="0" err="1"/>
+              <a:rPr lang="en-US" sz="2000" dirty="0"/>
               <a:t>architecture</a:t>
             </a:r>
-            <a:endParaRPr lang="pl-PL" sz="2000" dirty="0"/>
           </a:p>
           <a:p>
             <a:r>
@@ -16344,14 +16302,13 @@
               <a:t> </a:t>
             </a:r>
             <a:r>
-              <a:rPr lang="pl-PL" sz="2000" dirty="0" err="1"/>
+              <a:rPr lang="en-US" sz="2000" dirty="0"/>
               <a:t>Tests</a:t>
             </a:r>
-            <a:endParaRPr lang="pl-PL" sz="2000" dirty="0"/>
-          </a:p>
-          <a:p>
-            <a:r>
-              <a:rPr lang="pl-PL" sz="2000" dirty="0" err="1"/>
+          </a:p>
+          <a:p>
+            <a:r>
+              <a:rPr lang="en-GB" sz="2000" dirty="0"/>
               <a:t>Dynamic</a:t>
             </a:r>
             <a:r>
@@ -16359,10 +16316,9 @@
               <a:t> </a:t>
             </a:r>
             <a:r>
-              <a:rPr lang="pl-PL" sz="2000" dirty="0" err="1"/>
+              <a:rPr lang="en-US" sz="2000" dirty="0"/>
               <a:t>Tests</a:t>
             </a:r>
-            <a:endParaRPr lang="pl-PL" sz="2000" dirty="0"/>
           </a:p>
           <a:p>
             <a:r>
@@ -16460,26 +16416,26 @@
           <a:lstStyle/>
           <a:p>
             <a:r>
-              <a:rPr lang="pl-PL" dirty="0" err="1"/>
+              <a:rPr lang="pl-PL" err="1"/>
               <a:t>Why</a:t>
             </a:r>
             <a:r>
-              <a:rPr lang="pl-PL" dirty="0"/>
+              <a:rPr lang="pl-PL"/>
               <a:t> </a:t>
             </a:r>
             <a:r>
-              <a:rPr lang="pl-PL" dirty="0" err="1"/>
+              <a:rPr lang="pl-PL" err="1"/>
               <a:t>Junit</a:t>
             </a:r>
             <a:r>
-              <a:rPr lang="pl-PL" dirty="0"/>
+              <a:rPr lang="pl-PL"/>
               <a:t> 5 was </a:t>
             </a:r>
             <a:r>
-              <a:rPr lang="pl-PL" dirty="0" err="1"/>
+              <a:rPr lang="pl-PL" err="1"/>
               <a:t>introduced</a:t>
             </a:r>
-            <a:endParaRPr lang="pl-PL" dirty="0"/>
+            <a:endParaRPr lang="pl-PL"/>
           </a:p>
         </p:txBody>
       </p:sp>
@@ -16508,7 +16464,6 @@
               <a:rPr lang="pl-PL"/>
               <a:t>JUNIT 5</a:t>
             </a:r>
-            <a:endParaRPr lang="pl-PL" dirty="0"/>
           </a:p>
         </p:txBody>
       </p:sp>
@@ -16535,9 +16490,9 @@
           <a:p>
             <a:fld id="{6ABC2847-D563-405E-8397-0B7C61EE83E9}" type="datetime1">
               <a:rPr lang="pl-PL" smtClean="0"/>
-              <a:t>31.12.2019</a:t>
+              <a:t>07.01.2020</a:t>
             </a:fld>
-            <a:endParaRPr lang="pl-PL" dirty="0"/>
+            <a:endParaRPr lang="pl-PL"/>
           </a:p>
         </p:txBody>
       </p:sp>
@@ -16563,152 +16518,152 @@
           <a:lstStyle/>
           <a:p>
             <a:r>
-              <a:rPr lang="pl-PL" sz="2400" dirty="0" err="1"/>
+              <a:rPr lang="pl-PL" sz="2400" err="1"/>
               <a:t>Cleanup</a:t>
             </a:r>
             <a:r>
-              <a:rPr lang="pl-PL" sz="2400" dirty="0"/>
+              <a:rPr lang="pl-PL" sz="2400"/>
               <a:t> </a:t>
             </a:r>
             <a:r>
-              <a:rPr lang="pl-PL" sz="2400" dirty="0" err="1"/>
+              <a:rPr lang="pl-PL" sz="2400" err="1"/>
               <a:t>Junit</a:t>
             </a:r>
             <a:r>
-              <a:rPr lang="pl-PL" sz="2400" dirty="0"/>
+              <a:rPr lang="pl-PL" sz="2400"/>
               <a:t> 4</a:t>
             </a:r>
           </a:p>
           <a:p>
             <a:pPr lvl="1"/>
             <a:r>
-              <a:rPr lang="pl-PL" sz="2400" dirty="0"/>
+              <a:rPr lang="pl-PL" sz="2400"/>
               <a:t>1 jar </a:t>
             </a:r>
             <a:r>
-              <a:rPr lang="pl-PL" sz="2400" dirty="0" err="1"/>
+              <a:rPr lang="pl-PL" sz="2400" err="1"/>
               <a:t>included</a:t>
             </a:r>
             <a:r>
-              <a:rPr lang="pl-PL" sz="2400" dirty="0"/>
+              <a:rPr lang="pl-PL" sz="2400"/>
               <a:t> by </a:t>
             </a:r>
             <a:r>
-              <a:rPr lang="pl-PL" sz="2400" dirty="0" err="1"/>
+              <a:rPr lang="pl-PL" sz="2400" err="1"/>
               <a:t>many</a:t>
             </a:r>
             <a:r>
-              <a:rPr lang="pl-PL" sz="2400" dirty="0"/>
+              <a:rPr lang="pl-PL" sz="2400"/>
               <a:t> </a:t>
             </a:r>
             <a:r>
-              <a:rPr lang="pl-PL" sz="2400" dirty="0" err="1"/>
+              <a:rPr lang="pl-PL" sz="2400" err="1"/>
               <a:t>libs</a:t>
             </a:r>
-            <a:endParaRPr lang="pl-PL" sz="2400" dirty="0"/>
+            <a:endParaRPr lang="pl-PL" sz="2400"/>
           </a:p>
           <a:p>
             <a:pPr lvl="1"/>
             <a:r>
-              <a:rPr lang="pl-PL" sz="2400" dirty="0" err="1"/>
+              <a:rPr lang="pl-PL" sz="2400" err="1"/>
               <a:t>Own</a:t>
             </a:r>
             <a:r>
-              <a:rPr lang="pl-PL" sz="2400" dirty="0"/>
+              <a:rPr lang="pl-PL" sz="2400"/>
               <a:t> </a:t>
             </a:r>
             <a:r>
-              <a:rPr lang="pl-PL" sz="2400" dirty="0" err="1"/>
+              <a:rPr lang="pl-PL" sz="2400" err="1"/>
               <a:t>implementation</a:t>
             </a:r>
             <a:r>
-              <a:rPr lang="pl-PL" sz="2400" dirty="0"/>
+              <a:rPr lang="pl-PL" sz="2400"/>
               <a:t> in </a:t>
             </a:r>
             <a:r>
-              <a:rPr lang="pl-PL" sz="2400" dirty="0" err="1"/>
+              <a:rPr lang="pl-PL" sz="2400" err="1"/>
               <a:t>IDEs</a:t>
             </a:r>
             <a:r>
-              <a:rPr lang="pl-PL" sz="2400" dirty="0"/>
+              <a:rPr lang="pl-PL" sz="2400"/>
               <a:t>, </a:t>
             </a:r>
             <a:r>
-              <a:rPr lang="pl-PL" sz="2400" dirty="0" err="1"/>
+              <a:rPr lang="pl-PL" sz="2400" err="1"/>
               <a:t>maven</a:t>
             </a:r>
             <a:r>
-              <a:rPr lang="pl-PL" sz="2400" dirty="0"/>
+              <a:rPr lang="pl-PL" sz="2400"/>
               <a:t>, </a:t>
             </a:r>
             <a:r>
-              <a:rPr lang="pl-PL" sz="2400" dirty="0" err="1"/>
+              <a:rPr lang="pl-PL" sz="2400" err="1"/>
               <a:t>gradle</a:t>
             </a:r>
-            <a:endParaRPr lang="pl-PL" sz="2400" dirty="0"/>
+            <a:endParaRPr lang="pl-PL" sz="2400"/>
           </a:p>
           <a:p>
             <a:pPr lvl="1"/>
             <a:r>
-              <a:rPr lang="pl-PL" sz="2400" dirty="0"/>
+              <a:rPr lang="pl-PL" sz="2400"/>
               <a:t>Using </a:t>
             </a:r>
             <a:r>
-              <a:rPr lang="pl-PL" sz="2400" dirty="0" err="1"/>
+              <a:rPr lang="pl-PL" sz="2400" err="1"/>
               <a:t>private</a:t>
             </a:r>
             <a:r>
-              <a:rPr lang="pl-PL" sz="2400" dirty="0"/>
+              <a:rPr lang="pl-PL" sz="2400"/>
               <a:t> </a:t>
             </a:r>
             <a:r>
-              <a:rPr lang="pl-PL" sz="2400" dirty="0" err="1"/>
+              <a:rPr lang="pl-PL" sz="2400" err="1"/>
               <a:t>members</a:t>
             </a:r>
             <a:r>
-              <a:rPr lang="pl-PL" sz="2400" dirty="0"/>
+              <a:rPr lang="pl-PL" sz="2400"/>
               <a:t> by </a:t>
             </a:r>
             <a:r>
-              <a:rPr lang="pl-PL" sz="2400" dirty="0" err="1"/>
+              <a:rPr lang="pl-PL" sz="2400" err="1"/>
               <a:t>reflection</a:t>
             </a:r>
             <a:r>
-              <a:rPr lang="pl-PL" sz="2400" dirty="0"/>
+              <a:rPr lang="pl-PL" sz="2400"/>
               <a:t> in </a:t>
             </a:r>
             <a:r>
-              <a:rPr lang="pl-PL" sz="2400" dirty="0" err="1"/>
+              <a:rPr lang="pl-PL" sz="2400" err="1"/>
               <a:t>libs</a:t>
             </a:r>
             <a:r>
-              <a:rPr lang="pl-PL" sz="2400" dirty="0"/>
+              <a:rPr lang="pl-PL" sz="2400"/>
               <a:t>, </a:t>
             </a:r>
             <a:r>
-              <a:rPr lang="pl-PL" sz="2400" dirty="0" err="1"/>
+              <a:rPr lang="pl-PL" sz="2400" err="1"/>
               <a:t>tools</a:t>
             </a:r>
-            <a:endParaRPr lang="pl-PL" sz="2400" dirty="0"/>
+            <a:endParaRPr lang="pl-PL" sz="2400"/>
           </a:p>
           <a:p>
             <a:pPr lvl="1"/>
             <a:r>
-              <a:rPr lang="pl-PL" sz="2400" dirty="0" err="1"/>
+              <a:rPr lang="pl-PL" sz="2400" err="1"/>
               <a:t>Blocked</a:t>
             </a:r>
             <a:r>
-              <a:rPr lang="pl-PL" sz="2400" dirty="0"/>
+              <a:rPr lang="pl-PL" sz="2400"/>
               <a:t> development </a:t>
             </a:r>
             <a:r>
-              <a:rPr lang="pl-PL" sz="2400" dirty="0" err="1"/>
+              <a:rPr lang="pl-PL" sz="2400" err="1"/>
               <a:t>path</a:t>
             </a:r>
-            <a:endParaRPr lang="pl-PL" sz="2400" dirty="0"/>
-          </a:p>
-          <a:p>
-            <a:endParaRPr lang="pl-PL" dirty="0"/>
+            <a:endParaRPr lang="pl-PL" sz="2400"/>
+          </a:p>
+          <a:p>
+            <a:endParaRPr lang="pl-PL"/>
           </a:p>
         </p:txBody>
       </p:sp>
@@ -16769,18 +16724,18 @@
           <a:lstStyle/>
           <a:p>
             <a:r>
-              <a:rPr lang="pl-PL" dirty="0" err="1"/>
+              <a:rPr lang="pl-PL" err="1"/>
               <a:t>Junit</a:t>
             </a:r>
             <a:r>
-              <a:rPr lang="pl-PL" dirty="0"/>
+              <a:rPr lang="pl-PL"/>
               <a:t> 5 </a:t>
             </a:r>
             <a:r>
-              <a:rPr lang="pl-PL" dirty="0" err="1"/>
+              <a:rPr lang="pl-PL" err="1"/>
               <a:t>architecture</a:t>
             </a:r>
-            <a:endParaRPr lang="pl-PL" dirty="0"/>
+            <a:endParaRPr lang="pl-PL"/>
           </a:p>
         </p:txBody>
       </p:sp>
@@ -16809,7 +16764,6 @@
               <a:rPr lang="pl-PL"/>
               <a:t>JUNIT 5</a:t>
             </a:r>
-            <a:endParaRPr lang="pl-PL" dirty="0"/>
           </a:p>
         </p:txBody>
       </p:sp>
@@ -16836,9 +16790,9 @@
           <a:p>
             <a:fld id="{6ABC2847-D563-405E-8397-0B7C61EE83E9}" type="datetime1">
               <a:rPr lang="pl-PL" smtClean="0"/>
-              <a:t>31.12.2019</a:t>
+              <a:t>07.01.2020</a:t>
             </a:fld>
-            <a:endParaRPr lang="pl-PL" dirty="0"/>
+            <a:endParaRPr lang="pl-PL"/>
           </a:p>
         </p:txBody>
       </p:sp>
@@ -16855,7 +16809,7 @@
           <p:nvPr>
             <p:extLst>
               <p:ext uri="{D42A27DB-BD31-4B8C-83A1-F6EECF244321}">
-                <p14:modId xmlns:p14="http://schemas.microsoft.com/office/powerpoint/2010/main" val="3348622655"/>
+                <p14:modId xmlns:p14="http://schemas.microsoft.com/office/powerpoint/2010/main" val="1227933519"/>
               </p:ext>
             </p:extLst>
           </p:nvPr>
@@ -16921,7 +16875,7 @@
           <a:lstStyle/>
           <a:p>
             <a:pPr algn="ctr"/>
-            <a:endParaRPr lang="pl-PL" dirty="0">
+            <a:endParaRPr lang="pl-PL">
               <a:solidFill>
                 <a:schemeClr val="tx1">
                   <a:lumMod val="50000"/>
@@ -16960,7 +16914,7 @@
           <a:p>
             <a:pPr algn="ctr"/>
             <a:r>
-              <a:rPr lang="pl-PL" dirty="0" err="1">
+              <a:rPr lang="pl-PL" err="1">
                 <a:solidFill>
                   <a:schemeClr val="tx1">
                     <a:lumMod val="50000"/>
@@ -16970,7 +16924,7 @@
               <a:t>Junit</a:t>
             </a:r>
             <a:r>
-              <a:rPr lang="pl-PL" dirty="0">
+              <a:rPr lang="pl-PL">
                 <a:solidFill>
                   <a:schemeClr val="tx1">
                     <a:lumMod val="50000"/>
@@ -17034,10 +16988,10 @@
           <a:lstStyle/>
           <a:p>
             <a:r>
-              <a:rPr lang="pl-PL" sz="2800" dirty="0"/>
+              <a:rPr lang="pl-PL" sz="2800"/>
               <a:t>Basics</a:t>
             </a:r>
-            <a:endParaRPr lang="pl-PL" dirty="0"/>
+            <a:endParaRPr lang="pl-PL"/>
           </a:p>
         </p:txBody>
       </p:sp>
@@ -17066,7 +17020,6 @@
               <a:rPr lang="pl-PL"/>
               <a:t>JUNIT 5</a:t>
             </a:r>
-            <a:endParaRPr lang="pl-PL" dirty="0"/>
           </a:p>
         </p:txBody>
       </p:sp>
@@ -17093,9 +17046,9 @@
           <a:p>
             <a:fld id="{6ABC2847-D563-405E-8397-0B7C61EE83E9}" type="datetime1">
               <a:rPr lang="pl-PL" smtClean="0"/>
-              <a:t>31.12.2019</a:t>
+              <a:t>07.01.2020</a:t>
             </a:fld>
-            <a:endParaRPr lang="pl-PL" dirty="0"/>
+            <a:endParaRPr lang="pl-PL"/>
           </a:p>
         </p:txBody>
       </p:sp>
@@ -17121,71 +17074,71 @@
           <a:lstStyle/>
           <a:p>
             <a:r>
-              <a:rPr lang="pl-PL" sz="2400" dirty="0" err="1"/>
+              <a:rPr lang="pl-PL" sz="2400" err="1"/>
               <a:t>Assertions</a:t>
             </a:r>
             <a:r>
-              <a:rPr lang="pl-PL" sz="2400" dirty="0"/>
+              <a:rPr lang="pl-PL" sz="2400"/>
               <a:t> </a:t>
             </a:r>
           </a:p>
           <a:p>
             <a:r>
-              <a:rPr lang="pl-PL" sz="2400" dirty="0" err="1"/>
+              <a:rPr lang="pl-PL" sz="2400" err="1"/>
               <a:t>assertAll</a:t>
             </a:r>
-            <a:endParaRPr lang="pl-PL" sz="2400" dirty="0"/>
-          </a:p>
-          <a:p>
-            <a:r>
-              <a:rPr lang="pl-PL" sz="2400" dirty="0" err="1"/>
+            <a:endParaRPr lang="pl-PL" sz="2400"/>
+          </a:p>
+          <a:p>
+            <a:r>
+              <a:rPr lang="pl-PL" sz="2400" err="1"/>
               <a:t>assertThrows</a:t>
             </a:r>
-            <a:endParaRPr lang="pl-PL" sz="2400" dirty="0"/>
-          </a:p>
-          <a:p>
-            <a:r>
-              <a:rPr lang="pl-PL" sz="2400" dirty="0"/>
+            <a:endParaRPr lang="pl-PL" sz="2400"/>
+          </a:p>
+          <a:p>
+            <a:r>
+              <a:rPr lang="pl-PL" sz="2400"/>
               <a:t>Test </a:t>
             </a:r>
             <a:r>
-              <a:rPr lang="pl-PL" sz="2400" dirty="0" err="1"/>
+              <a:rPr lang="pl-PL" sz="2400" err="1"/>
               <a:t>Naming</a:t>
             </a:r>
-            <a:endParaRPr lang="pl-PL" sz="2400" dirty="0"/>
-          </a:p>
-          <a:p>
-            <a:r>
-              <a:rPr lang="pl-PL" sz="2400" dirty="0"/>
+            <a:endParaRPr lang="pl-PL" sz="2400"/>
+          </a:p>
+          <a:p>
+            <a:r>
+              <a:rPr lang="pl-PL" sz="2400"/>
               <a:t>Test </a:t>
             </a:r>
             <a:r>
-              <a:rPr lang="pl-PL" sz="2400" dirty="0" err="1"/>
+              <a:rPr lang="pl-PL" sz="2400" err="1"/>
               <a:t>lifecycle</a:t>
             </a:r>
-            <a:endParaRPr lang="pl-PL" sz="2400" dirty="0"/>
-          </a:p>
-          <a:p>
-            <a:r>
-              <a:rPr lang="pl-PL" sz="2400" dirty="0" err="1"/>
+            <a:endParaRPr lang="pl-PL" sz="2400"/>
+          </a:p>
+          <a:p>
+            <a:r>
+              <a:rPr lang="pl-PL" sz="2400" err="1"/>
               <a:t>Nested</a:t>
             </a:r>
             <a:r>
-              <a:rPr lang="pl-PL" sz="2400" dirty="0"/>
+              <a:rPr lang="pl-PL" sz="2400"/>
               <a:t> </a:t>
             </a:r>
             <a:r>
-              <a:rPr lang="pl-PL" sz="2400" dirty="0" err="1"/>
+              <a:rPr lang="pl-PL" sz="2400" err="1"/>
               <a:t>Tests</a:t>
             </a:r>
-            <a:endParaRPr lang="pl-PL" sz="2400" dirty="0"/>
-          </a:p>
-          <a:p>
-            <a:r>
-              <a:rPr lang="pl-PL" sz="2400" dirty="0" err="1"/>
+            <a:endParaRPr lang="pl-PL" sz="2400"/>
+          </a:p>
+          <a:p>
+            <a:r>
+              <a:rPr lang="pl-PL" sz="2400" err="1"/>
               <a:t>Tags</a:t>
             </a:r>
-            <a:endParaRPr lang="pl-PL" sz="2400" dirty="0"/>
+            <a:endParaRPr lang="pl-PL" sz="2400"/>
           </a:p>
         </p:txBody>
       </p:sp>
@@ -17241,10 +17194,10 @@
           <a:lstStyle/>
           <a:p>
             <a:r>
-              <a:rPr lang="pl-PL" sz="2800" dirty="0"/>
+              <a:rPr lang="pl-PL" sz="2800"/>
               <a:t>Basics:</a:t>
             </a:r>
-            <a:endParaRPr lang="pl-PL" dirty="0"/>
+            <a:endParaRPr lang="pl-PL"/>
           </a:p>
         </p:txBody>
       </p:sp>
@@ -17273,7 +17226,6 @@
               <a:rPr lang="pl-PL"/>
               <a:t>JUNIT 5</a:t>
             </a:r>
-            <a:endParaRPr lang="pl-PL" dirty="0"/>
           </a:p>
         </p:txBody>
       </p:sp>
@@ -17300,9 +17252,9 @@
           <a:p>
             <a:fld id="{6ABC2847-D563-405E-8397-0B7C61EE83E9}" type="datetime1">
               <a:rPr lang="pl-PL" smtClean="0"/>
-              <a:t>31.12.2019</a:t>
+              <a:t>07.01.2020</a:t>
             </a:fld>
-            <a:endParaRPr lang="pl-PL" dirty="0"/>
+            <a:endParaRPr lang="pl-PL"/>
           </a:p>
         </p:txBody>
       </p:sp>
@@ -17328,19 +17280,19 @@
           <a:lstStyle/>
           <a:p>
             <a:r>
-              <a:rPr lang="pl-PL" sz="2400" dirty="0"/>
+              <a:rPr lang="pl-PL" sz="2400"/>
               <a:t>org.junit.jupiter:junit-jupiter-engine:5* (5.5.2)</a:t>
             </a:r>
           </a:p>
           <a:p>
-            <a:endParaRPr lang="pl-PL" sz="2400" dirty="0"/>
+            <a:endParaRPr lang="pl-PL" sz="2400"/>
           </a:p>
           <a:p>
             <a:pPr marL="0" indent="0">
               <a:buNone/>
             </a:pPr>
             <a:r>
-              <a:rPr lang="pl-PL" sz="2800" dirty="0" err="1">
+              <a:rPr lang="pl-PL" sz="2800" err="1">
                 <a:solidFill>
                   <a:srgbClr val="0070C0"/>
                 </a:solidFill>
@@ -17348,7 +17300,7 @@
               </a:rPr>
               <a:t>Assertions</a:t>
             </a:r>
-            <a:endParaRPr lang="pl-PL" sz="4800" dirty="0">
+            <a:endParaRPr lang="pl-PL" sz="4800">
               <a:solidFill>
                 <a:srgbClr val="0070C0"/>
               </a:solidFill>
@@ -17357,87 +17309,87 @@
           </a:p>
           <a:p>
             <a:r>
-              <a:rPr lang="pl-PL" sz="2400" dirty="0" err="1"/>
+              <a:rPr lang="pl-PL" sz="2400" err="1"/>
               <a:t>Failure</a:t>
             </a:r>
             <a:r>
-              <a:rPr lang="pl-PL" sz="2400" dirty="0"/>
+              <a:rPr lang="pl-PL" sz="2400"/>
               <a:t> </a:t>
             </a:r>
             <a:r>
-              <a:rPr lang="pl-PL" sz="2400" dirty="0" err="1"/>
+              <a:rPr lang="pl-PL" sz="2400" err="1"/>
               <a:t>message</a:t>
             </a:r>
             <a:r>
-              <a:rPr lang="pl-PL" sz="2400" dirty="0"/>
+              <a:rPr lang="pl-PL" sz="2400"/>
               <a:t> as 3th param</a:t>
             </a:r>
           </a:p>
           <a:p>
             <a:r>
-              <a:rPr lang="pl-PL" sz="2400" dirty="0" err="1"/>
+              <a:rPr lang="pl-PL" sz="2400" err="1"/>
               <a:t>Failure</a:t>
             </a:r>
             <a:r>
-              <a:rPr lang="pl-PL" sz="2400" dirty="0"/>
+              <a:rPr lang="pl-PL" sz="2400"/>
               <a:t> </a:t>
             </a:r>
             <a:r>
-              <a:rPr lang="pl-PL" sz="2400" dirty="0" err="1"/>
+              <a:rPr lang="pl-PL" sz="2400" err="1"/>
               <a:t>message</a:t>
             </a:r>
             <a:r>
-              <a:rPr lang="pl-PL" sz="2400" dirty="0"/>
+              <a:rPr lang="pl-PL" sz="2400"/>
               <a:t> </a:t>
             </a:r>
             <a:r>
-              <a:rPr lang="pl-PL" sz="2400" dirty="0" err="1"/>
+              <a:rPr lang="pl-PL" sz="2400" err="1"/>
               <a:t>supplier</a:t>
             </a:r>
-            <a:endParaRPr lang="pl-PL" sz="2400" dirty="0"/>
-          </a:p>
-          <a:p>
-            <a:r>
-              <a:rPr lang="pl-PL" sz="2400" dirty="0"/>
+            <a:endParaRPr lang="pl-PL" sz="2400"/>
+          </a:p>
+          <a:p>
+            <a:r>
+              <a:rPr lang="pl-PL" sz="2400"/>
               <a:t>No </a:t>
             </a:r>
             <a:r>
-              <a:rPr lang="pl-PL" sz="2400" dirty="0" err="1"/>
+              <a:rPr lang="pl-PL" sz="2400" err="1"/>
               <a:t>assertThat</a:t>
             </a:r>
             <a:r>
-              <a:rPr lang="pl-PL" sz="2400" dirty="0"/>
+              <a:rPr lang="pl-PL" sz="2400"/>
               <a:t> – </a:t>
             </a:r>
             <a:r>
-              <a:rPr lang="pl-PL" sz="2400" dirty="0" err="1"/>
+              <a:rPr lang="pl-PL" sz="2400" err="1"/>
               <a:t>need</a:t>
             </a:r>
             <a:r>
-              <a:rPr lang="pl-PL" sz="2400" dirty="0"/>
+              <a:rPr lang="pl-PL" sz="2400"/>
               <a:t> to </a:t>
             </a:r>
             <a:r>
-              <a:rPr lang="pl-PL" sz="2400" dirty="0" err="1"/>
+              <a:rPr lang="pl-PL" sz="2400" err="1"/>
               <a:t>use</a:t>
             </a:r>
             <a:r>
-              <a:rPr lang="pl-PL" sz="2400" dirty="0"/>
+              <a:rPr lang="pl-PL" sz="2400"/>
               <a:t> </a:t>
             </a:r>
             <a:r>
-              <a:rPr lang="pl-PL" sz="2400" dirty="0" err="1"/>
+              <a:rPr lang="pl-PL" sz="2400" err="1"/>
               <a:t>libs</a:t>
             </a:r>
             <a:r>
-              <a:rPr lang="pl-PL" sz="2400" dirty="0"/>
+              <a:rPr lang="pl-PL" sz="2400"/>
               <a:t> </a:t>
             </a:r>
             <a:r>
-              <a:rPr lang="pl-PL" sz="2400" dirty="0" err="1"/>
+              <a:rPr lang="pl-PL" sz="2400" err="1"/>
               <a:t>directly</a:t>
             </a:r>
-            <a:endParaRPr lang="pl-PL" sz="2400" dirty="0"/>
+            <a:endParaRPr lang="pl-PL" sz="2400"/>
           </a:p>
         </p:txBody>
       </p:sp>
@@ -17493,14 +17445,14 @@
           <a:lstStyle/>
           <a:p>
             <a:r>
-              <a:rPr lang="pl-PL" sz="2800" dirty="0"/>
+              <a:rPr lang="pl-PL" sz="2800"/>
               <a:t>Basics: </a:t>
             </a:r>
             <a:r>
-              <a:rPr lang="pl-PL" sz="2800" dirty="0" err="1"/>
+              <a:rPr lang="pl-PL" sz="2800" err="1"/>
               <a:t>assertAll</a:t>
             </a:r>
-            <a:endParaRPr lang="pl-PL" dirty="0"/>
+            <a:endParaRPr lang="pl-PL"/>
           </a:p>
         </p:txBody>
       </p:sp>
@@ -17529,7 +17481,6 @@
               <a:rPr lang="pl-PL"/>
               <a:t>JUNIT 5</a:t>
             </a:r>
-            <a:endParaRPr lang="pl-PL" dirty="0"/>
           </a:p>
         </p:txBody>
       </p:sp>
@@ -17556,9 +17507,9 @@
           <a:p>
             <a:fld id="{6ABC2847-D563-405E-8397-0B7C61EE83E9}" type="datetime1">
               <a:rPr lang="pl-PL" smtClean="0"/>
-              <a:t>31.12.2019</a:t>
+              <a:t>07.01.2020</a:t>
             </a:fld>
-            <a:endParaRPr lang="pl-PL" dirty="0"/>
+            <a:endParaRPr lang="pl-PL"/>
           </a:p>
         </p:txBody>
       </p:sp>
@@ -17584,82 +17535,82 @@
           <a:lstStyle/>
           <a:p>
             <a:r>
-              <a:rPr lang="pl-PL" sz="2800" dirty="0"/>
+              <a:rPr lang="pl-PL" sz="2800"/>
               <a:t>No „</a:t>
             </a:r>
             <a:r>
-              <a:rPr lang="pl-PL" sz="2800" dirty="0" err="1"/>
+              <a:rPr lang="pl-PL" sz="2800" err="1"/>
               <a:t>fail</a:t>
             </a:r>
             <a:r>
-              <a:rPr lang="pl-PL" sz="2800" dirty="0"/>
+              <a:rPr lang="pl-PL" sz="2800"/>
               <a:t> fast” -&gt; „run </a:t>
             </a:r>
             <a:r>
-              <a:rPr lang="pl-PL" sz="2800" dirty="0" err="1"/>
+              <a:rPr lang="pl-PL" sz="2800" err="1"/>
               <a:t>all</a:t>
             </a:r>
             <a:r>
-              <a:rPr lang="pl-PL" sz="2800" dirty="0"/>
+              <a:rPr lang="pl-PL" sz="2800"/>
               <a:t>, </a:t>
             </a:r>
             <a:r>
-              <a:rPr lang="pl-PL" sz="2800" dirty="0" err="1"/>
+              <a:rPr lang="pl-PL" sz="2800" err="1"/>
               <a:t>fail</a:t>
             </a:r>
             <a:r>
-              <a:rPr lang="pl-PL" sz="2800" dirty="0"/>
+              <a:rPr lang="pl-PL" sz="2800"/>
               <a:t> </a:t>
             </a:r>
             <a:r>
-              <a:rPr lang="pl-PL" sz="2800" dirty="0" err="1"/>
+              <a:rPr lang="pl-PL" sz="2800" err="1"/>
               <a:t>if</a:t>
             </a:r>
             <a:r>
-              <a:rPr lang="pl-PL" sz="2800" dirty="0"/>
+              <a:rPr lang="pl-PL" sz="2800"/>
               <a:t> 1 </a:t>
             </a:r>
             <a:r>
-              <a:rPr lang="pl-PL" sz="2800" dirty="0" err="1"/>
+              <a:rPr lang="pl-PL" sz="2800" err="1"/>
               <a:t>assert</a:t>
             </a:r>
             <a:r>
-              <a:rPr lang="pl-PL" sz="2800" dirty="0"/>
+              <a:rPr lang="pl-PL" sz="2800"/>
               <a:t> </a:t>
             </a:r>
             <a:r>
-              <a:rPr lang="pl-PL" sz="2800" dirty="0" err="1"/>
+              <a:rPr lang="pl-PL" sz="2800" err="1"/>
               <a:t>fail</a:t>
             </a:r>
             <a:r>
-              <a:rPr lang="pl-PL" sz="2800" dirty="0"/>
+              <a:rPr lang="pl-PL" sz="2800"/>
               <a:t>”</a:t>
             </a:r>
           </a:p>
           <a:p>
             <a:r>
-              <a:rPr lang="pl-PL" sz="2800" dirty="0"/>
+              <a:rPr lang="pl-PL" sz="2800"/>
               <a:t>Works </a:t>
             </a:r>
             <a:r>
-              <a:rPr lang="pl-PL" sz="2800" dirty="0" err="1"/>
+              <a:rPr lang="pl-PL" sz="2800" err="1"/>
               <a:t>like</a:t>
             </a:r>
             <a:r>
-              <a:rPr lang="pl-PL" sz="2800" dirty="0"/>
+              <a:rPr lang="pl-PL" sz="2800"/>
               <a:t> </a:t>
             </a:r>
             <a:r>
-              <a:rPr lang="pl-PL" sz="2800" dirty="0" err="1"/>
+              <a:rPr lang="pl-PL" sz="2800" err="1"/>
               <a:t>ErrorCollector</a:t>
             </a:r>
-            <a:endParaRPr lang="pl-PL" sz="2800" dirty="0"/>
+            <a:endParaRPr lang="pl-PL" sz="2800"/>
           </a:p>
           <a:p>
             <a:pPr marL="0" indent="0">
               <a:buNone/>
             </a:pPr>
-            <a:endParaRPr lang="pl-PL" sz="2800" dirty="0"/>
+            <a:endParaRPr lang="pl-PL" sz="2800"/>
           </a:p>
         </p:txBody>
       </p:sp>
@@ -17715,14 +17666,14 @@
           <a:lstStyle/>
           <a:p>
             <a:r>
-              <a:rPr lang="pl-PL" sz="2800" dirty="0"/>
+              <a:rPr lang="pl-PL" sz="2800"/>
               <a:t>Basics: </a:t>
             </a:r>
             <a:r>
-              <a:rPr lang="pl-PL" sz="2800" dirty="0" err="1"/>
+              <a:rPr lang="pl-PL" sz="2800" err="1"/>
               <a:t>assertThrows</a:t>
             </a:r>
-            <a:endParaRPr lang="pl-PL" dirty="0"/>
+            <a:endParaRPr lang="pl-PL"/>
           </a:p>
         </p:txBody>
       </p:sp>
@@ -17751,7 +17702,6 @@
               <a:rPr lang="pl-PL"/>
               <a:t>JUNIT 5</a:t>
             </a:r>
-            <a:endParaRPr lang="pl-PL" dirty="0"/>
           </a:p>
         </p:txBody>
       </p:sp>
@@ -17778,9 +17728,9 @@
           <a:p>
             <a:fld id="{6ABC2847-D563-405E-8397-0B7C61EE83E9}" type="datetime1">
               <a:rPr lang="pl-PL" smtClean="0"/>
-              <a:t>31.12.2019</a:t>
+              <a:t>07.01.2020</a:t>
             </a:fld>
-            <a:endParaRPr lang="pl-PL" dirty="0"/>
+            <a:endParaRPr lang="pl-PL"/>
           </a:p>
         </p:txBody>
       </p:sp>
@@ -17806,103 +17756,103 @@
           <a:lstStyle/>
           <a:p>
             <a:r>
-              <a:rPr lang="pl-PL" sz="2800" dirty="0" err="1"/>
+              <a:rPr lang="pl-PL" sz="2800" err="1"/>
               <a:t>Better</a:t>
             </a:r>
             <a:r>
-              <a:rPr lang="pl-PL" sz="2800" dirty="0"/>
+              <a:rPr lang="pl-PL" sz="2800"/>
               <a:t> </a:t>
             </a:r>
             <a:r>
-              <a:rPr lang="pl-PL" sz="2800" dirty="0" err="1"/>
+              <a:rPr lang="pl-PL" sz="2800" err="1"/>
               <a:t>way</a:t>
             </a:r>
             <a:r>
-              <a:rPr lang="pl-PL" sz="2800" dirty="0"/>
+              <a:rPr lang="pl-PL" sz="2800"/>
               <a:t> to test </a:t>
             </a:r>
             <a:r>
-              <a:rPr lang="pl-PL" sz="2800" dirty="0" err="1"/>
+              <a:rPr lang="pl-PL" sz="2800" err="1"/>
               <a:t>thrown</a:t>
             </a:r>
             <a:r>
-              <a:rPr lang="pl-PL" sz="2800" dirty="0"/>
+              <a:rPr lang="pl-PL" sz="2800"/>
               <a:t> </a:t>
             </a:r>
             <a:r>
-              <a:rPr lang="pl-PL" sz="2800" dirty="0" err="1"/>
+              <a:rPr lang="pl-PL" sz="2800" err="1"/>
               <a:t>Exceptions</a:t>
             </a:r>
-            <a:endParaRPr lang="pl-PL" sz="2800" dirty="0"/>
-          </a:p>
-          <a:p>
-            <a:r>
-              <a:rPr lang="pl-PL" sz="2800" dirty="0"/>
+            <a:endParaRPr lang="pl-PL" sz="2800"/>
+          </a:p>
+          <a:p>
+            <a:r>
+              <a:rPr lang="pl-PL" sz="2800"/>
               <a:t>No </a:t>
             </a:r>
             <a:r>
-              <a:rPr lang="pl-PL" sz="2800" dirty="0" err="1"/>
+              <a:rPr lang="pl-PL" sz="2800" err="1"/>
               <a:t>more</a:t>
             </a:r>
             <a:r>
-              <a:rPr lang="pl-PL" sz="2800" dirty="0"/>
+              <a:rPr lang="pl-PL" sz="2800"/>
               <a:t> </a:t>
             </a:r>
             <a:r>
-              <a:rPr lang="pl-PL" sz="2800" dirty="0" err="1"/>
+              <a:rPr lang="pl-PL" sz="2800" err="1"/>
               <a:t>expect</a:t>
             </a:r>
             <a:r>
-              <a:rPr lang="pl-PL" sz="2800" dirty="0"/>
+              <a:rPr lang="pl-PL" sz="2800"/>
               <a:t> param in @Test</a:t>
             </a:r>
           </a:p>
           <a:p>
             <a:r>
-              <a:rPr lang="pl-PL" sz="2800" dirty="0"/>
+              <a:rPr lang="pl-PL" sz="2800"/>
               <a:t>No </a:t>
             </a:r>
             <a:r>
-              <a:rPr lang="pl-PL" sz="2800" dirty="0" err="1"/>
+              <a:rPr lang="pl-PL" sz="2800" err="1"/>
               <a:t>more</a:t>
             </a:r>
             <a:r>
-              <a:rPr lang="pl-PL" sz="2800" dirty="0"/>
+              <a:rPr lang="pl-PL" sz="2800"/>
               <a:t> @</a:t>
             </a:r>
             <a:r>
-              <a:rPr lang="pl-PL" sz="2800" dirty="0" err="1"/>
+              <a:rPr lang="pl-PL" sz="2800" err="1"/>
               <a:t>Rule</a:t>
             </a:r>
             <a:r>
-              <a:rPr lang="pl-PL" sz="2800" dirty="0"/>
+              <a:rPr lang="pl-PL" sz="2800"/>
               <a:t> for </a:t>
             </a:r>
             <a:r>
-              <a:rPr lang="pl-PL" sz="2800" dirty="0" err="1"/>
+              <a:rPr lang="pl-PL" sz="2800" err="1"/>
               <a:t>Exception</a:t>
             </a:r>
             <a:r>
-              <a:rPr lang="pl-PL" sz="2800" dirty="0"/>
+              <a:rPr lang="pl-PL" sz="2800"/>
               <a:t> </a:t>
             </a:r>
             <a:r>
-              <a:rPr lang="pl-PL" sz="2800" dirty="0" err="1"/>
+              <a:rPr lang="pl-PL" sz="2800" err="1"/>
               <a:t>tests</a:t>
             </a:r>
-            <a:endParaRPr lang="pl-PL" sz="2800" dirty="0"/>
+            <a:endParaRPr lang="pl-PL" sz="2800"/>
           </a:p>
           <a:p>
             <a:pPr marL="0" indent="0">
               <a:buNone/>
             </a:pPr>
-            <a:endParaRPr lang="pl-PL" sz="2800" dirty="0"/>
+            <a:endParaRPr lang="pl-PL" sz="2800"/>
           </a:p>
           <a:p>
             <a:pPr marL="0" indent="0">
               <a:buNone/>
             </a:pPr>
-            <a:endParaRPr lang="pl-PL" sz="2800" dirty="0"/>
+            <a:endParaRPr lang="pl-PL" sz="2800"/>
           </a:p>
         </p:txBody>
       </p:sp>
@@ -18989,50 +18939,6 @@
 
 <file path=customXml/item1.xml><?xml version="1.0" encoding="utf-8"?>
 <?mso-contentType ?>
-<FormTemplates xmlns="http://schemas.microsoft.com/sharepoint/v3/contenttype/forms">
-  <Display>DocumentLibraryForm</Display>
-  <Edit>DocumentLibraryForm</Edit>
-  <New>DocumentLibraryForm</New>
-</FormTemplates>
-</file>
-
-<file path=customXml/item2.xml><?xml version="1.0" encoding="utf-8"?>
-<p:properties xmlns:p="http://schemas.microsoft.com/office/2006/metadata/properties" xmlns:xsi="http://www.w3.org/2001/XMLSchema-instance" xmlns:pc="http://schemas.microsoft.com/office/infopath/2007/PartnerControls">
-  <documentManagement>
-    <Approved_x0020_by xmlns="25fdd84a-dea2-444e-b0cf-34518ae5aa13">
-      <UserInfo>
-        <DisplayName>Rafal Lukjanowicz</DisplayName>
-        <AccountId>197</AccountId>
-        <AccountType/>
-      </UserInfo>
-    </Approved_x0020_by>
-    <Reviewed_x0020_by xmlns="25fdd84a-dea2-444e-b0cf-34518ae5aa13">
-      <UserInfo>
-        <DisplayName>Marcin Faber</DisplayName>
-        <AccountId>379</AccountId>
-        <AccountType/>
-      </UserInfo>
-    </Reviewed_x0020_by>
-    <Process_x0020_Owner_x003a_ xmlns="25fdd84a-dea2-444e-b0cf-34518ae5aa13">
-      <UserInfo>
-        <DisplayName>Marcin Faber</DisplayName>
-        <AccountId>379</AccountId>
-        <AccountType/>
-      </UserInfo>
-    </Process_x0020_Owner_x003a_>
-    <Ver_x002e_ xmlns="25fdd84a-dea2-444e-b0cf-34518ae5aa13">2</Ver_x002e_>
-    <Expiration_x0020_Date0 xmlns="25fdd84a-dea2-444e-b0cf-34518ae5aa13">2018-03-18T23:00:00+00:00</Expiration_x0020_Date0>
-    <_dlc_DocId xmlns="3708c738-35ee-46ab-80c7-a8ab2419782e">OBSS-1854273395-71</_dlc_DocId>
-    <_dlc_DocIdUrl xmlns="3708c738-35ee-46ab-80c7-a8ab2419782e">
-      <Url>https://obss.sharepoint.com/guilds/quality/_layouts/15/DocIdRedir.aspx?ID=OBSS-1854273395-71</Url>
-      <Description>OBSS-1854273395-71</Description>
-    </_dlc_DocIdUrl>
-  </documentManagement>
-</p:properties>
-</file>
-
-<file path=customXml/item3.xml><?xml version="1.0" encoding="utf-8"?>
-<?mso-contentType ?>
 <spe:Receivers xmlns:spe="http://schemas.microsoft.com/sharepoint/events">
   <Receiver>
     <Name>Document ID Generator</Name>
@@ -19079,6 +18985,50 @@
     <Filter/>
   </Receiver>
 </spe:Receivers>
+</file>
+
+<file path=customXml/item2.xml><?xml version="1.0" encoding="utf-8"?>
+<p:properties xmlns:p="http://schemas.microsoft.com/office/2006/metadata/properties" xmlns:xsi="http://www.w3.org/2001/XMLSchema-instance" xmlns:pc="http://schemas.microsoft.com/office/infopath/2007/PartnerControls">
+  <documentManagement>
+    <Approved_x0020_by xmlns="25fdd84a-dea2-444e-b0cf-34518ae5aa13">
+      <UserInfo>
+        <DisplayName>Rafal Lukjanowicz</DisplayName>
+        <AccountId>197</AccountId>
+        <AccountType/>
+      </UserInfo>
+    </Approved_x0020_by>
+    <Reviewed_x0020_by xmlns="25fdd84a-dea2-444e-b0cf-34518ae5aa13">
+      <UserInfo>
+        <DisplayName>Marcin Faber</DisplayName>
+        <AccountId>379</AccountId>
+        <AccountType/>
+      </UserInfo>
+    </Reviewed_x0020_by>
+    <Process_x0020_Owner_x003a_ xmlns="25fdd84a-dea2-444e-b0cf-34518ae5aa13">
+      <UserInfo>
+        <DisplayName>Marcin Faber</DisplayName>
+        <AccountId>379</AccountId>
+        <AccountType/>
+      </UserInfo>
+    </Process_x0020_Owner_x003a_>
+    <Ver_x002e_ xmlns="25fdd84a-dea2-444e-b0cf-34518ae5aa13">2</Ver_x002e_>
+    <Expiration_x0020_Date0 xmlns="25fdd84a-dea2-444e-b0cf-34518ae5aa13">2018-03-18T23:00:00+00:00</Expiration_x0020_Date0>
+    <_dlc_DocId xmlns="3708c738-35ee-46ab-80c7-a8ab2419782e">OBSS-1854273395-71</_dlc_DocId>
+    <_dlc_DocIdUrl xmlns="3708c738-35ee-46ab-80c7-a8ab2419782e">
+      <Url>https://obss.sharepoint.com/guilds/quality/_layouts/15/DocIdRedir.aspx?ID=OBSS-1854273395-71</Url>
+      <Description>OBSS-1854273395-71</Description>
+    </_dlc_DocIdUrl>
+  </documentManagement>
+</p:properties>
+</file>
+
+<file path=customXml/item3.xml><?xml version="1.0" encoding="utf-8"?>
+<?mso-contentType ?>
+<FormTemplates xmlns="http://schemas.microsoft.com/sharepoint/v3/contenttype/forms">
+  <Display>DocumentLibraryForm</Display>
+  <Edit>DocumentLibraryForm</Edit>
+  <New>DocumentLibraryForm</New>
+</FormTemplates>
 </file>
 
 <file path=customXml/item4.xml><?xml version="1.0" encoding="utf-8"?>
@@ -19316,9 +19266,9 @@
 </file>
 
 <file path=customXml/itemProps1.xml><?xml version="1.0" encoding="utf-8"?>
-<ds:datastoreItem xmlns:ds="http://schemas.openxmlformats.org/officeDocument/2006/customXml" ds:itemID="{5E6E26AD-AE5D-463E-BB17-50F81FC0E054}">
+<ds:datastoreItem xmlns:ds="http://schemas.openxmlformats.org/officeDocument/2006/customXml" ds:itemID="{EC30A6B1-263C-46F5-AB2A-5E46D5167165}">
   <ds:schemaRefs>
-    <ds:schemaRef ds:uri="http://schemas.microsoft.com/sharepoint/v3/contenttype/forms"/>
+    <ds:schemaRef ds:uri="http://schemas.microsoft.com/sharepoint/events"/>
   </ds:schemaRefs>
 </ds:datastoreItem>
 </file>
@@ -19341,9 +19291,9 @@
 </file>
 
 <file path=customXml/itemProps3.xml><?xml version="1.0" encoding="utf-8"?>
-<ds:datastoreItem xmlns:ds="http://schemas.openxmlformats.org/officeDocument/2006/customXml" ds:itemID="{EC30A6B1-263C-46F5-AB2A-5E46D5167165}">
+<ds:datastoreItem xmlns:ds="http://schemas.openxmlformats.org/officeDocument/2006/customXml" ds:itemID="{5E6E26AD-AE5D-463E-BB17-50F81FC0E054}">
   <ds:schemaRefs>
-    <ds:schemaRef ds:uri="http://schemas.microsoft.com/sharepoint/events"/>
+    <ds:schemaRef ds:uri="http://schemas.microsoft.com/sharepoint/v3/contenttype/forms"/>
   </ds:schemaRefs>
 </ds:datastoreItem>
 </file>

</xml_diff>